<commit_message>
Millores a la presentació compendi 1-4 Afegit PDF del manual de la placa de control del motor (No la del PID encara)
</commit_message>
<xml_diff>
--- a/Presentacions/Resultats de l’Anàlisi de la Planta de DS - Compendi 1-4 .pptx
+++ b/Presentacions/Resultats de l’Anàlisi de la Planta de DS - Compendi 1-4 .pptx
@@ -5,10 +5,10 @@
     <p:sldMasterId id="2147483648" r:id="rId4"/>
   </p:sldMasterIdLst>
   <p:notesMasterIdLst>
-    <p:notesMasterId r:id="rId36"/>
+    <p:notesMasterId r:id="rId37"/>
   </p:notesMasterIdLst>
   <p:handoutMasterIdLst>
-    <p:handoutMasterId r:id="rId37"/>
+    <p:handoutMasterId r:id="rId38"/>
   </p:handoutMasterIdLst>
   <p:sldIdLst>
     <p:sldId id="282" r:id="rId5"/>
@@ -19,14 +19,14 @@
     <p:sldId id="301" r:id="rId10"/>
     <p:sldId id="309" r:id="rId11"/>
     <p:sldId id="310" r:id="rId12"/>
-    <p:sldId id="311" r:id="rId13"/>
-    <p:sldId id="312" r:id="rId14"/>
-    <p:sldId id="293" r:id="rId15"/>
-    <p:sldId id="294" r:id="rId16"/>
-    <p:sldId id="295" r:id="rId17"/>
-    <p:sldId id="313" r:id="rId18"/>
-    <p:sldId id="297" r:id="rId19"/>
-    <p:sldId id="318" r:id="rId20"/>
+    <p:sldId id="318" r:id="rId13"/>
+    <p:sldId id="311" r:id="rId14"/>
+    <p:sldId id="312" r:id="rId15"/>
+    <p:sldId id="293" r:id="rId16"/>
+    <p:sldId id="294" r:id="rId17"/>
+    <p:sldId id="295" r:id="rId18"/>
+    <p:sldId id="313" r:id="rId19"/>
+    <p:sldId id="297" r:id="rId20"/>
     <p:sldId id="314" r:id="rId21"/>
     <p:sldId id="315" r:id="rId22"/>
     <p:sldId id="316" r:id="rId23"/>
@@ -41,7 +41,8 @@
     <p:sldId id="327" r:id="rId32"/>
     <p:sldId id="329" r:id="rId33"/>
     <p:sldId id="328" r:id="rId34"/>
-    <p:sldId id="296" r:id="rId35"/>
+    <p:sldId id="330" r:id="rId35"/>
+    <p:sldId id="296" r:id="rId36"/>
   </p:sldIdLst>
   <p:sldSz cx="12192000" cy="6858000"/>
   <p:notesSz cx="6858000" cy="9144000"/>
@@ -247,7 +248,7 @@
             <a:pPr rtl="0"/>
             <a:fld id="{A0CB070B-93E8-4E3F-93BA-4C6F4F890423}" type="datetime1">
               <a:rPr lang="es-ES" smtClean="0"/>
-              <a:t>22/03/2022</a:t>
+              <a:t>23/03/2022</a:t>
             </a:fld>
             <a:endParaRPr lang="es-ES"/>
           </a:p>
@@ -429,7 +430,7 @@
             <a:pPr rtl="0"/>
             <a:fld id="{09EAA754-C899-4020-AF30-0F80416D4F92}" type="datetime1">
               <a:rPr lang="es-ES" noProof="0" smtClean="0"/>
-              <a:t>22/03/2022</a:t>
+              <a:t>23/03/2022</a:t>
             </a:fld>
             <a:endParaRPr lang="es-ES" noProof="0"/>
           </a:p>
@@ -853,7 +854,7 @@
             <a:pPr rtl="0"/>
             <a:fld id="{8530193B-564F-4854-8A52-728F3FB19C85}" type="slidenum">
               <a:rPr lang="es-ES" smtClean="0"/>
-              <a:t>10</a:t>
+              <a:t>11</a:t>
             </a:fld>
             <a:endParaRPr lang="es-ES" dirty="0"/>
           </a:p>
@@ -939,7 +940,7 @@
             <a:pPr rtl="0"/>
             <a:fld id="{8530193B-564F-4854-8A52-728F3FB19C85}" type="slidenum">
               <a:rPr lang="es-ES" smtClean="0"/>
-              <a:t>11</a:t>
+              <a:t>12</a:t>
             </a:fld>
             <a:endParaRPr lang="es-ES" dirty="0"/>
           </a:p>
@@ -1025,7 +1026,7 @@
             <a:pPr rtl="0"/>
             <a:fld id="{8530193B-564F-4854-8A52-728F3FB19C85}" type="slidenum">
               <a:rPr lang="es-ES" smtClean="0"/>
-              <a:t>12</a:t>
+              <a:t>13</a:t>
             </a:fld>
             <a:endParaRPr lang="es-ES" dirty="0"/>
           </a:p>
@@ -1111,7 +1112,7 @@
             <a:pPr rtl="0"/>
             <a:fld id="{8530193B-564F-4854-8A52-728F3FB19C85}" type="slidenum">
               <a:rPr lang="es-ES" smtClean="0"/>
-              <a:t>13</a:t>
+              <a:t>14</a:t>
             </a:fld>
             <a:endParaRPr lang="es-ES" dirty="0"/>
           </a:p>
@@ -1197,7 +1198,7 @@
             <a:pPr rtl="0"/>
             <a:fld id="{8530193B-564F-4854-8A52-728F3FB19C85}" type="slidenum">
               <a:rPr lang="es-ES" smtClean="0"/>
-              <a:t>14</a:t>
+              <a:t>15</a:t>
             </a:fld>
             <a:endParaRPr lang="es-ES" dirty="0"/>
           </a:p>
@@ -1283,7 +1284,7 @@
             <a:pPr rtl="0"/>
             <a:fld id="{8530193B-564F-4854-8A52-728F3FB19C85}" type="slidenum">
               <a:rPr lang="es-ES" smtClean="0"/>
-              <a:t>15</a:t>
+              <a:t>16</a:t>
             </a:fld>
             <a:endParaRPr lang="es-ES" dirty="0"/>
           </a:p>
@@ -2699,6 +2700,94 @@
       </p:grpSpPr>
       <p:sp>
         <p:nvSpPr>
+          <p:cNvPr id="2" name="Contenidor d'imatge de diapositiva 1"/>
+          <p:cNvSpPr>
+            <a:spLocks noGrp="1" noRot="1" noChangeAspect="1"/>
+          </p:cNvSpPr>
+          <p:nvPr>
+            <p:ph type="sldImg"/>
+          </p:nvPr>
+        </p:nvSpPr>
+        <p:spPr/>
+      </p:sp>
+      <p:sp>
+        <p:nvSpPr>
+          <p:cNvPr id="3" name="Contenidor de notes 2"/>
+          <p:cNvSpPr>
+            <a:spLocks noGrp="1"/>
+          </p:cNvSpPr>
+          <p:nvPr>
+            <p:ph type="body" idx="1"/>
+          </p:nvPr>
+        </p:nvSpPr>
+        <p:spPr/>
+        <p:txBody>
+          <a:bodyPr/>
+          <a:lstStyle/>
+          <a:p>
+            <a:r>
+              <a:rPr lang="ca-ES" dirty="0"/>
+              <a:t>Modelar zona morta de velocitat (A partir de quina velocitat el motor para -&gt; Zona morta 3D en comptes de plana)</a:t>
+            </a:r>
+          </a:p>
+        </p:txBody>
+      </p:sp>
+      <p:sp>
+        <p:nvSpPr>
+          <p:cNvPr id="4" name="Contenidor de número de diapositiva 3"/>
+          <p:cNvSpPr>
+            <a:spLocks noGrp="1"/>
+          </p:cNvSpPr>
+          <p:nvPr>
+            <p:ph type="sldNum" sz="quarter" idx="5"/>
+          </p:nvPr>
+        </p:nvSpPr>
+        <p:spPr/>
+        <p:txBody>
+          <a:bodyPr/>
+          <a:lstStyle/>
+          <a:p>
+            <a:pPr rtl="0"/>
+            <a:fld id="{8530193B-564F-4854-8A52-728F3FB19C85}" type="slidenum">
+              <a:rPr lang="es-ES" noProof="0" smtClean="0"/>
+              <a:t>31</a:t>
+            </a:fld>
+            <a:endParaRPr lang="es-ES" noProof="0"/>
+          </a:p>
+        </p:txBody>
+      </p:sp>
+    </p:spTree>
+    <p:extLst>
+      <p:ext uri="{BB962C8B-B14F-4D97-AF65-F5344CB8AC3E}">
+        <p14:creationId xmlns:p14="http://schemas.microsoft.com/office/powerpoint/2010/main" val="23897768"/>
+      </p:ext>
+    </p:extLst>
+  </p:cSld>
+  <p:clrMapOvr>
+    <a:masterClrMapping/>
+  </p:clrMapOvr>
+</p:notes>
+</file>
+
+<file path=ppt/notesSlides/notesSlide31.xml><?xml version="1.0" encoding="utf-8"?>
+<p:notes xmlns:a="http://schemas.openxmlformats.org/drawingml/2006/main" xmlns:r="http://schemas.openxmlformats.org/officeDocument/2006/relationships" xmlns:p="http://schemas.openxmlformats.org/presentationml/2006/main">
+  <p:cSld>
+    <p:spTree>
+      <p:nvGrpSpPr>
+        <p:cNvPr id="1" name=""/>
+        <p:cNvGrpSpPr/>
+        <p:nvPr/>
+      </p:nvGrpSpPr>
+      <p:grpSpPr>
+        <a:xfrm>
+          <a:off x="0" y="0"/>
+          <a:ext cx="0" cy="0"/>
+          <a:chOff x="0" y="0"/>
+          <a:chExt cx="0" cy="0"/>
+        </a:xfrm>
+      </p:grpSpPr>
+      <p:sp>
+        <p:nvSpPr>
           <p:cNvPr id="2" name="Marcador de posición de imagen de diapositiva 1"/>
           <p:cNvSpPr>
             <a:spLocks noGrp="1" noRot="1" noChangeAspect="1"/>
@@ -2747,7 +2836,7 @@
             <a:pPr rtl="0"/>
             <a:fld id="{8530193B-564F-4854-8A52-728F3FB19C85}" type="slidenum">
               <a:rPr lang="es-ES" smtClean="0"/>
-              <a:t>31</a:t>
+              <a:t>32</a:t>
             </a:fld>
             <a:endParaRPr lang="es-ES"/>
           </a:p>
@@ -3263,7 +3352,7 @@
             <a:pPr rtl="0"/>
             <a:fld id="{8530193B-564F-4854-8A52-728F3FB19C85}" type="slidenum">
               <a:rPr lang="es-ES" smtClean="0"/>
-              <a:t>9</a:t>
+              <a:t>10</a:t>
             </a:fld>
             <a:endParaRPr lang="es-ES"/>
           </a:p>
@@ -10730,6 +10819,13 @@
   <p:clrMapOvr>
     <a:masterClrMapping/>
   </p:clrMapOvr>
+  <p:timing>
+    <p:tnLst>
+      <p:par>
+        <p:cTn id="1" dur="indefinite" restart="never" nodeType="tmRoot"/>
+      </p:par>
+    </p:tnLst>
+  </p:timing>
 </p:sld>
 </file>
 
@@ -10752,64 +10848,51 @@
       </p:grpSpPr>
       <p:sp>
         <p:nvSpPr>
-          <p:cNvPr id="2" name="Título 1">
-            <a:extLst>
-              <a:ext uri="{FF2B5EF4-FFF2-40B4-BE49-F238E27FC236}">
-                <a16:creationId xmlns:a16="http://schemas.microsoft.com/office/drawing/2014/main" id="{AEA5083B-CC27-4F1C-AD03-E3DBEC1C9E78}"/>
-              </a:ext>
-            </a:extLst>
-          </p:cNvPr>
-          <p:cNvSpPr>
-            <a:spLocks noGrp="1"/>
-          </p:cNvSpPr>
-          <p:nvPr>
-            <p:ph type="title"/>
-          </p:nvPr>
-        </p:nvSpPr>
-        <p:spPr>
-          <a:xfrm>
-            <a:off x="170779" y="143111"/>
-            <a:ext cx="9480626" cy="985983"/>
+          <p:cNvPr id="3" name="Título 2">
+            <a:extLst>
+              <a:ext uri="{FF2B5EF4-FFF2-40B4-BE49-F238E27FC236}">
+                <a16:creationId xmlns:a16="http://schemas.microsoft.com/office/drawing/2014/main" id="{200B3D2B-613A-41BE-987D-E6A1324B456D}"/>
+              </a:ext>
+            </a:extLst>
+          </p:cNvPr>
+          <p:cNvSpPr>
+            <a:spLocks noGrp="1"/>
+          </p:cNvSpPr>
+          <p:nvPr>
+            <p:ph type="ctrTitle"/>
+          </p:nvPr>
+        </p:nvSpPr>
+        <p:spPr>
+          <a:xfrm>
+            <a:off x="0" y="3647191"/>
+            <a:ext cx="7262075" cy="2195386"/>
           </a:xfrm>
         </p:spPr>
         <p:txBody>
           <a:bodyPr rtlCol="0"/>
           <a:lstStyle/>
           <a:p>
-            <a:pPr rtl="0"/>
-            <a:r>
-              <a:rPr lang="ca-ES" sz="2800" dirty="0"/>
-              <a:t>Descompensació</a:t>
-            </a:r>
-            <a:r>
-              <a:rPr lang="es-ES" sz="2800" dirty="0"/>
-              <a:t> de la Massa (</a:t>
-            </a:r>
-            <a:r>
-              <a:rPr lang="es-ES" sz="2800" dirty="0" err="1"/>
+            <a:r>
+              <a:rPr lang="ca-ES" sz="4000" dirty="0"/>
+              <a:t>Control de Posició amb controlador proporcional (</a:t>
+            </a:r>
+            <a:r>
+              <a:rPr lang="ca-ES" sz="4000" dirty="0" err="1"/>
               <a:t>Kp</a:t>
             </a:r>
             <a:r>
-              <a:rPr lang="es-ES" sz="2800" dirty="0"/>
-              <a:t> = 2, 2V)</a:t>
-            </a:r>
-            <a:br>
-              <a:rPr lang="es-ES" sz="2800" dirty="0"/>
-            </a:br>
-            <a:r>
-              <a:rPr lang="ca-ES" sz="2800" dirty="0"/>
-              <a:t>Fregament</a:t>
-            </a:r>
-            <a:endParaRPr lang="es-ES" sz="2800" dirty="0"/>
-          </a:p>
-        </p:txBody>
-      </p:sp>
-      <p:sp>
-        <p:nvSpPr>
-          <p:cNvPr id="10" name="Rectángulo 9">
-            <a:extLst>
-              <a:ext uri="{FF2B5EF4-FFF2-40B4-BE49-F238E27FC236}">
-                <a16:creationId xmlns:a16="http://schemas.microsoft.com/office/drawing/2014/main" id="{2EF7F631-717C-4283-B2CA-33A0C8D9E561}"/>
+              <a:rPr lang="ca-ES" sz="4000" dirty="0"/>
+              <a:t> baixes)</a:t>
+            </a:r>
+          </a:p>
+        </p:txBody>
+      </p:sp>
+      <p:sp>
+        <p:nvSpPr>
+          <p:cNvPr id="8" name="Rectángulo 7">
+            <a:extLst>
+              <a:ext uri="{FF2B5EF4-FFF2-40B4-BE49-F238E27FC236}">
+                <a16:creationId xmlns:a16="http://schemas.microsoft.com/office/drawing/2014/main" id="{0F2F1659-815F-46D5-B4BA-92407E18AEDC}"/>
               </a:ext>
             </a:extLst>
           </p:cNvPr>
@@ -10818,8 +10901,8 @@
         </p:nvSpPr>
         <p:spPr>
           <a:xfrm>
-            <a:off x="10126980" y="6263640"/>
-            <a:ext cx="2065020" cy="594360"/>
+            <a:off x="10071652" y="6175513"/>
+            <a:ext cx="2120348" cy="682487"/>
           </a:xfrm>
           <a:prstGeom prst="rect">
             <a:avLst/>
@@ -10852,16 +10935,16 @@
           <a:lstStyle/>
           <a:p>
             <a:pPr algn="ctr"/>
-            <a:endParaRPr lang="es-ES" dirty="0"/>
+            <a:endParaRPr lang="es-ES"/>
           </a:p>
         </p:txBody>
       </p:sp>
       <p:pic>
         <p:nvPicPr>
-          <p:cNvPr id="13" name="Imagen 12">
-            <a:extLst>
-              <a:ext uri="{FF2B5EF4-FFF2-40B4-BE49-F238E27FC236}">
-                <a16:creationId xmlns:a16="http://schemas.microsoft.com/office/drawing/2014/main" id="{E89F97CF-DDE0-4E79-8442-F818579C9895}"/>
+          <p:cNvPr id="10" name="Marcador de posición de imagen 6">
+            <a:extLst>
+              <a:ext uri="{FF2B5EF4-FFF2-40B4-BE49-F238E27FC236}">
+                <a16:creationId xmlns:a16="http://schemas.microsoft.com/office/drawing/2014/main" id="{A0CB8A26-6A12-4725-927A-D6238DB830E9}"/>
               </a:ext>
             </a:extLst>
           </p:cNvPr>
@@ -10871,20 +10954,14 @@
           <p:nvPr/>
         </p:nvPicPr>
         <p:blipFill rotWithShape="1">
-          <a:blip r:embed="rId3">
-            <a:extLst>
-              <a:ext uri="{28A0092B-C50C-407E-A947-70E740481C1C}">
-                <a14:useLocalDpi xmlns:a14="http://schemas.microsoft.com/office/drawing/2010/main" val="0"/>
-              </a:ext>
-            </a:extLst>
-          </a:blip>
-          <a:srcRect r="12624"/>
+          <a:blip r:embed="rId3"/>
+          <a:srcRect l="70582" t="3209" r="3840" b="2716"/>
           <a:stretch/>
         </p:blipFill>
         <p:spPr>
           <a:xfrm>
-            <a:off x="80768" y="1128634"/>
-            <a:ext cx="9911730" cy="5660014"/>
+            <a:off x="9804400" y="0"/>
+            <a:ext cx="2387601" cy="6858000"/>
           </a:xfrm>
           <a:prstGeom prst="rect">
             <a:avLst/>
@@ -10893,95 +10970,61 @@
       </p:pic>
       <p:sp>
         <p:nvSpPr>
-          <p:cNvPr id="11" name="CuadroTexto 10">
-            <a:extLst>
-              <a:ext uri="{FF2B5EF4-FFF2-40B4-BE49-F238E27FC236}">
-                <a16:creationId xmlns:a16="http://schemas.microsoft.com/office/drawing/2014/main" id="{10B90111-7D2D-45B4-B3F2-7559AFE0FA14}"/>
-              </a:ext>
-            </a:extLst>
-          </p:cNvPr>
-          <p:cNvSpPr txBox="1"/>
-          <p:nvPr/>
-        </p:nvSpPr>
-        <p:spPr>
-          <a:xfrm>
-            <a:off x="10007710" y="143111"/>
-            <a:ext cx="2184290" cy="1754326"/>
-          </a:xfrm>
-          <a:prstGeom prst="rect">
-            <a:avLst/>
-          </a:prstGeom>
-          <a:noFill/>
-        </p:spPr>
-        <p:txBody>
-          <a:bodyPr wrap="square" rtlCol="0">
-            <a:spAutoFit/>
-          </a:bodyPr>
-          <a:lstStyle/>
-          <a:p>
-            <a:r>
-              <a:rPr lang="es-ES" dirty="0"/>
-              <a:t>REF: 0V Controlador</a:t>
-            </a:r>
-          </a:p>
-          <a:p>
+          <p:cNvPr id="9" name="Subtítulo 3">
+            <a:extLst>
+              <a:ext uri="{FF2B5EF4-FFF2-40B4-BE49-F238E27FC236}">
+                <a16:creationId xmlns:a16="http://schemas.microsoft.com/office/drawing/2014/main" id="{C23E924E-4905-4260-BAD0-E8A52F9195E5}"/>
+              </a:ext>
+            </a:extLst>
+          </p:cNvPr>
+          <p:cNvSpPr>
+            <a:spLocks noGrp="1"/>
+          </p:cNvSpPr>
+          <p:nvPr>
+            <p:ph type="subTitle" idx="1"/>
+          </p:nvPr>
+        </p:nvSpPr>
+        <p:spPr>
+          <a:xfrm>
+            <a:off x="7606747" y="4026716"/>
+            <a:ext cx="3126409" cy="1815861"/>
+          </a:xfrm>
+          <a:ln w="12700">
+            <a:solidFill>
+              <a:schemeClr val="tx1"/>
+            </a:solidFill>
+          </a:ln>
+        </p:spPr>
+        <p:txBody>
+          <a:bodyPr rtlCol="0"/>
+          <a:lstStyle/>
+          <a:p>
+            <a:pPr algn="ctr" rtl="0"/>
+            <a:r>
+              <a:rPr lang="es-ES" sz="4000" dirty="0"/>
+              <a:t>Extra</a:t>
+            </a:r>
             <a:endParaRPr lang="es-ES" dirty="0"/>
-          </a:p>
-          <a:p>
-            <a:r>
-              <a:rPr lang="ca-ES" dirty="0"/>
-              <a:t>Groc</a:t>
-            </a:r>
-            <a:r>
-              <a:rPr lang="es-ES" dirty="0"/>
-              <a:t> – </a:t>
-            </a:r>
-            <a:r>
-              <a:rPr lang="ca-ES" dirty="0"/>
-              <a:t>Referència</a:t>
-            </a:r>
-            <a:r>
-              <a:rPr lang="es-ES" dirty="0"/>
-              <a:t> 0V Motor</a:t>
-            </a:r>
-          </a:p>
-          <a:p>
-            <a:endParaRPr lang="es-ES" dirty="0"/>
-          </a:p>
-          <a:p>
-            <a:r>
-              <a:rPr lang="es-ES" dirty="0"/>
-              <a:t>Vermell – </a:t>
-            </a:r>
-            <a:r>
-              <a:rPr lang="es-ES" dirty="0" err="1"/>
-              <a:t>Vout</a:t>
-            </a:r>
-            <a:r>
-              <a:rPr lang="es-ES" dirty="0"/>
-              <a:t> </a:t>
-            </a:r>
-            <a:r>
-              <a:rPr lang="es-ES" dirty="0" err="1"/>
-              <a:t>Pot</a:t>
-            </a:r>
-            <a:r>
-              <a:rPr lang="es-ES" dirty="0"/>
-              <a:t>.</a:t>
-            </a:r>
           </a:p>
         </p:txBody>
       </p:sp>
     </p:spTree>
     <p:extLst>
       <p:ext uri="{BB962C8B-B14F-4D97-AF65-F5344CB8AC3E}">
-        <p14:creationId xmlns:p14="http://schemas.microsoft.com/office/powerpoint/2010/main" val="1400757574"/>
+        <p14:creationId xmlns:p14="http://schemas.microsoft.com/office/powerpoint/2010/main" val="953185911"/>
       </p:ext>
     </p:extLst>
   </p:cSld>
   <p:clrMapOvr>
     <a:masterClrMapping/>
   </p:clrMapOvr>
+  <p:timing>
+    <p:tnLst>
+      <p:par>
+        <p:cTn id="1" dur="indefinite" restart="never" nodeType="tmRoot"/>
+      </p:par>
+    </p:tnLst>
+  </p:timing>
 </p:sld>
 </file>
 
@@ -11043,7 +11086,7 @@
             </a:r>
             <a:r>
               <a:rPr lang="es-ES" sz="2800" dirty="0"/>
-              <a:t> = 1, 2V)</a:t>
+              <a:t> = 2, 2V)</a:t>
             </a:r>
             <a:br>
               <a:rPr lang="es-ES" sz="2800" dirty="0"/>
@@ -11130,13 +11173,13 @@
               </a:ext>
             </a:extLst>
           </a:blip>
-          <a:srcRect r="12697"/>
+          <a:srcRect r="12624"/>
           <a:stretch/>
         </p:blipFill>
         <p:spPr>
           <a:xfrm>
             <a:off x="80768" y="1128634"/>
-            <a:ext cx="9903492" cy="5660013"/>
+            <a:ext cx="9911730" cy="5660014"/>
           </a:xfrm>
           <a:prstGeom prst="rect">
             <a:avLst/>
@@ -11227,13 +11270,20 @@
     </p:spTree>
     <p:extLst>
       <p:ext uri="{BB962C8B-B14F-4D97-AF65-F5344CB8AC3E}">
-        <p14:creationId xmlns:p14="http://schemas.microsoft.com/office/powerpoint/2010/main" val="71096754"/>
+        <p14:creationId xmlns:p14="http://schemas.microsoft.com/office/powerpoint/2010/main" val="1400757574"/>
       </p:ext>
     </p:extLst>
   </p:cSld>
   <p:clrMapOvr>
     <a:masterClrMapping/>
   </p:clrMapOvr>
+  <p:timing>
+    <p:tnLst>
+      <p:par>
+        <p:cTn id="1" dur="indefinite" restart="never" nodeType="tmRoot"/>
+      </p:par>
+    </p:tnLst>
+  </p:timing>
 </p:sld>
 </file>
 
@@ -11295,7 +11345,7 @@
             </a:r>
             <a:r>
               <a:rPr lang="es-ES" sz="2800" dirty="0"/>
-              <a:t> = 2, 3V)</a:t>
+              <a:t> = 1, 2V)</a:t>
             </a:r>
             <a:br>
               <a:rPr lang="es-ES" sz="2800" dirty="0"/>
@@ -11382,13 +11432,13 @@
               </a:ext>
             </a:extLst>
           </a:blip>
-          <a:srcRect r="12770"/>
+          <a:srcRect r="12697"/>
           <a:stretch/>
         </p:blipFill>
         <p:spPr>
           <a:xfrm>
-            <a:off x="80769" y="1128634"/>
-            <a:ext cx="9895254" cy="5660013"/>
+            <a:off x="80768" y="1128634"/>
+            <a:ext cx="9903492" cy="5660013"/>
           </a:xfrm>
           <a:prstGeom prst="rect">
             <a:avLst/>
@@ -11476,46 +11526,23 @@
           </a:p>
         </p:txBody>
       </p:sp>
-      <p:sp>
-        <p:nvSpPr>
-          <p:cNvPr id="3" name="QuadreDeText 2"/>
-          <p:cNvSpPr txBox="1"/>
-          <p:nvPr/>
-        </p:nvSpPr>
-        <p:spPr>
-          <a:xfrm>
-            <a:off x="6812691" y="2636108"/>
-            <a:ext cx="1416909" cy="369332"/>
-          </a:xfrm>
-          <a:prstGeom prst="rect">
-            <a:avLst/>
-          </a:prstGeom>
-          <a:noFill/>
-        </p:spPr>
-        <p:txBody>
-          <a:bodyPr wrap="square" rtlCol="0">
-            <a:spAutoFit/>
-          </a:bodyPr>
-          <a:lstStyle/>
-          <a:p>
-            <a:r>
-              <a:rPr lang="ca-ES" dirty="0"/>
-              <a:t>0,2*2 = 0,4</a:t>
-            </a:r>
-            <a:endParaRPr lang="es-ES" dirty="0"/>
-          </a:p>
-        </p:txBody>
-      </p:sp>
     </p:spTree>
     <p:extLst>
       <p:ext uri="{BB962C8B-B14F-4D97-AF65-F5344CB8AC3E}">
-        <p14:creationId xmlns:p14="http://schemas.microsoft.com/office/powerpoint/2010/main" val="2826037251"/>
+        <p14:creationId xmlns:p14="http://schemas.microsoft.com/office/powerpoint/2010/main" val="71096754"/>
       </p:ext>
     </p:extLst>
   </p:cSld>
   <p:clrMapOvr>
     <a:masterClrMapping/>
   </p:clrMapOvr>
+  <p:timing>
+    <p:tnLst>
+      <p:par>
+        <p:cTn id="1" dur="indefinite" restart="never" nodeType="tmRoot"/>
+      </p:par>
+    </p:tnLst>
+  </p:timing>
 </p:sld>
 </file>
 
@@ -11577,7 +11604,7 @@
             </a:r>
             <a:r>
               <a:rPr lang="es-ES" sz="2800" dirty="0"/>
-              <a:t> = 1, 3V)</a:t>
+              <a:t> = 2, 3V)</a:t>
             </a:r>
             <a:br>
               <a:rPr lang="es-ES" sz="2800" dirty="0"/>
@@ -11664,13 +11691,13 @@
               </a:ext>
             </a:extLst>
           </a:blip>
-          <a:srcRect r="12842"/>
+          <a:srcRect r="12770"/>
           <a:stretch/>
         </p:blipFill>
         <p:spPr>
           <a:xfrm>
             <a:off x="80769" y="1128634"/>
-            <a:ext cx="9887016" cy="5660012"/>
+            <a:ext cx="9895254" cy="5660013"/>
           </a:xfrm>
           <a:prstGeom prst="rect">
             <a:avLst/>
@@ -11760,7 +11787,7 @@
       </p:sp>
       <p:sp>
         <p:nvSpPr>
-          <p:cNvPr id="6" name="QuadreDeText 5"/>
+          <p:cNvPr id="3" name="QuadreDeText 2"/>
           <p:cNvSpPr txBox="1"/>
           <p:nvPr/>
         </p:nvSpPr>
@@ -11782,7 +11809,7 @@
           <a:p>
             <a:r>
               <a:rPr lang="ca-ES" dirty="0"/>
-              <a:t>0,4*1 = 0,4</a:t>
+              <a:t>0,2*2 = 0,4</a:t>
             </a:r>
             <a:endParaRPr lang="es-ES" dirty="0"/>
           </a:p>
@@ -11791,13 +11818,20 @@
     </p:spTree>
     <p:extLst>
       <p:ext uri="{BB962C8B-B14F-4D97-AF65-F5344CB8AC3E}">
-        <p14:creationId xmlns:p14="http://schemas.microsoft.com/office/powerpoint/2010/main" val="1169189821"/>
+        <p14:creationId xmlns:p14="http://schemas.microsoft.com/office/powerpoint/2010/main" val="2826037251"/>
       </p:ext>
     </p:extLst>
   </p:cSld>
   <p:clrMapOvr>
     <a:masterClrMapping/>
   </p:clrMapOvr>
+  <p:timing>
+    <p:tnLst>
+      <p:par>
+        <p:cTn id="1" dur="indefinite" restart="never" nodeType="tmRoot"/>
+      </p:par>
+    </p:tnLst>
+  </p:timing>
 </p:sld>
 </file>
 
@@ -11859,7 +11893,7 @@
             </a:r>
             <a:r>
               <a:rPr lang="es-ES" sz="2800" dirty="0"/>
-              <a:t> = 0.5, 3V)</a:t>
+              <a:t> = 1, 3V)</a:t>
             </a:r>
             <a:br>
               <a:rPr lang="es-ES" sz="2800" dirty="0"/>
@@ -11946,13 +11980,13 @@
               </a:ext>
             </a:extLst>
           </a:blip>
-          <a:srcRect r="12770"/>
+          <a:srcRect r="12842"/>
           <a:stretch/>
         </p:blipFill>
         <p:spPr>
           <a:xfrm>
             <a:off x="80769" y="1128634"/>
-            <a:ext cx="9895253" cy="5660012"/>
+            <a:ext cx="9887016" cy="5660012"/>
           </a:xfrm>
           <a:prstGeom prst="rect">
             <a:avLst/>
@@ -12049,7 +12083,7 @@
         <p:spPr>
           <a:xfrm>
             <a:off x="6812691" y="2636108"/>
-            <a:ext cx="1688758" cy="369332"/>
+            <a:ext cx="1416909" cy="369332"/>
           </a:xfrm>
           <a:prstGeom prst="rect">
             <a:avLst/>
@@ -12064,7 +12098,7 @@
           <a:p>
             <a:r>
               <a:rPr lang="ca-ES" dirty="0"/>
-              <a:t>0,9*0,5 = 0,45</a:t>
+              <a:t>0,4*1 = 0,4</a:t>
             </a:r>
             <a:endParaRPr lang="es-ES" dirty="0"/>
           </a:p>
@@ -12073,13 +12107,20 @@
     </p:spTree>
     <p:extLst>
       <p:ext uri="{BB962C8B-B14F-4D97-AF65-F5344CB8AC3E}">
-        <p14:creationId xmlns:p14="http://schemas.microsoft.com/office/powerpoint/2010/main" val="214267898"/>
+        <p14:creationId xmlns:p14="http://schemas.microsoft.com/office/powerpoint/2010/main" val="1169189821"/>
       </p:ext>
     </p:extLst>
   </p:cSld>
   <p:clrMapOvr>
     <a:masterClrMapping/>
   </p:clrMapOvr>
+  <p:timing>
+    <p:tnLst>
+      <p:par>
+        <p:cTn id="1" dur="indefinite" restart="never" nodeType="tmRoot"/>
+      </p:par>
+    </p:tnLst>
+  </p:timing>
 </p:sld>
 </file>
 
@@ -12141,7 +12182,7 @@
             </a:r>
             <a:r>
               <a:rPr lang="es-ES" sz="2800" dirty="0"/>
-              <a:t> = 1, 3V)</a:t>
+              <a:t> = 0.5, 3V)</a:t>
             </a:r>
             <a:br>
               <a:rPr lang="es-ES" sz="2800" dirty="0"/>
@@ -12234,7 +12275,7 @@
         <p:spPr>
           <a:xfrm>
             <a:off x="80769" y="1128634"/>
-            <a:ext cx="9895253" cy="5660011"/>
+            <a:ext cx="9895253" cy="5660012"/>
           </a:xfrm>
           <a:prstGeom prst="rect">
             <a:avLst/>
@@ -12271,7 +12312,7 @@
           <a:p>
             <a:r>
               <a:rPr lang="es-ES" dirty="0"/>
-              <a:t>REF: 0V Motor</a:t>
+              <a:t>REF: 0V Controlador</a:t>
             </a:r>
           </a:p>
           <a:p>
@@ -12292,7 +12333,7 @@
             </a:r>
             <a:r>
               <a:rPr lang="es-ES" dirty="0"/>
-              <a:t> 0V Controlador</a:t>
+              <a:t> 0V Motor</a:t>
             </a:r>
           </a:p>
           <a:p>
@@ -12346,7 +12387,7 @@
           <a:p>
             <a:r>
               <a:rPr lang="ca-ES" dirty="0"/>
-              <a:t>0,4*1 = 0,4</a:t>
+              <a:t>0,9*0,5 = 0,45</a:t>
             </a:r>
             <a:endParaRPr lang="es-ES" dirty="0"/>
           </a:p>
@@ -12355,13 +12396,20 @@
     </p:spTree>
     <p:extLst>
       <p:ext uri="{BB962C8B-B14F-4D97-AF65-F5344CB8AC3E}">
-        <p14:creationId xmlns:p14="http://schemas.microsoft.com/office/powerpoint/2010/main" val="2454053163"/>
+        <p14:creationId xmlns:p14="http://schemas.microsoft.com/office/powerpoint/2010/main" val="214267898"/>
       </p:ext>
     </p:extLst>
   </p:cSld>
   <p:clrMapOvr>
     <a:masterClrMapping/>
   </p:clrMapOvr>
+  <p:timing>
+    <p:tnLst>
+      <p:par>
+        <p:cTn id="1" dur="indefinite" restart="never" nodeType="tmRoot"/>
+      </p:par>
+    </p:tnLst>
+  </p:timing>
 </p:sld>
 </file>
 
@@ -12384,46 +12432,10 @@
       </p:grpSpPr>
       <p:sp>
         <p:nvSpPr>
-          <p:cNvPr id="2" name="Contenidor de contingut 1">
-            <a:extLst>
-              <a:ext uri="{FF2B5EF4-FFF2-40B4-BE49-F238E27FC236}">
-                <a16:creationId xmlns:a16="http://schemas.microsoft.com/office/drawing/2014/main" id="{90BA015A-20AF-440F-8413-D939C69EAB2F}"/>
-              </a:ext>
-            </a:extLst>
-          </p:cNvPr>
-          <p:cNvSpPr>
-            <a:spLocks noGrp="1"/>
-          </p:cNvSpPr>
-          <p:nvPr>
-            <p:ph sz="half" idx="1"/>
-          </p:nvPr>
-        </p:nvSpPr>
-        <p:spPr>
-          <a:xfrm>
-            <a:off x="3498209" y="1432151"/>
-            <a:ext cx="3367233" cy="1348527"/>
-          </a:xfrm>
-        </p:spPr>
-        <p:txBody>
-          <a:bodyPr/>
-          <a:lstStyle/>
-          <a:p>
-            <a:pPr marL="0" indent="0" algn="just">
-              <a:buNone/>
-            </a:pPr>
-            <a:r>
-              <a:rPr lang="ca-ES" dirty="0"/>
-              <a:t>Connectar el controlador en sèrie amb la planta, d’aquesta manera es minimitza la caiguda de tensió entre les dues.</a:t>
-            </a:r>
-          </a:p>
-        </p:txBody>
-      </p:sp>
-      <p:sp>
-        <p:nvSpPr>
-          <p:cNvPr id="5" name="Títol 4">
-            <a:extLst>
-              <a:ext uri="{FF2B5EF4-FFF2-40B4-BE49-F238E27FC236}">
-                <a16:creationId xmlns:a16="http://schemas.microsoft.com/office/drawing/2014/main" id="{A0961E97-8F98-4B4D-96F2-5C4364E6ACD3}"/>
+          <p:cNvPr id="2" name="Título 1">
+            <a:extLst>
+              <a:ext uri="{FF2B5EF4-FFF2-40B4-BE49-F238E27FC236}">
+                <a16:creationId xmlns:a16="http://schemas.microsoft.com/office/drawing/2014/main" id="{AEA5083B-CC27-4F1C-AD03-E3DBEC1C9E78}"/>
               </a:ext>
             </a:extLst>
           </p:cNvPr>
@@ -12436,27 +12448,48 @@
         </p:nvSpPr>
         <p:spPr>
           <a:xfrm>
-            <a:off x="239053" y="429930"/>
-            <a:ext cx="9131100" cy="432000"/>
-          </a:xfrm>
-        </p:spPr>
-        <p:txBody>
-          <a:bodyPr/>
-          <a:lstStyle/>
-          <a:p>
-            <a:r>
-              <a:rPr lang="ca-ES" dirty="0"/>
-              <a:t>Solució</a:t>
-            </a:r>
-          </a:p>
-        </p:txBody>
-      </p:sp>
-      <p:sp>
-        <p:nvSpPr>
-          <p:cNvPr id="7" name="Rectángulo 9">
-            <a:extLst>
-              <a:ext uri="{FF2B5EF4-FFF2-40B4-BE49-F238E27FC236}">
-                <a16:creationId xmlns:a16="http://schemas.microsoft.com/office/drawing/2014/main" id="{CCB320B0-EB9E-4107-9824-08DC54BF4B4A}"/>
+            <a:off x="170779" y="143111"/>
+            <a:ext cx="9480626" cy="985983"/>
+          </a:xfrm>
+        </p:spPr>
+        <p:txBody>
+          <a:bodyPr rtlCol="0"/>
+          <a:lstStyle/>
+          <a:p>
+            <a:pPr rtl="0"/>
+            <a:r>
+              <a:rPr lang="ca-ES" sz="2800" dirty="0"/>
+              <a:t>Descompensació</a:t>
+            </a:r>
+            <a:r>
+              <a:rPr lang="es-ES" sz="2800" dirty="0"/>
+              <a:t> de la Massa (</a:t>
+            </a:r>
+            <a:r>
+              <a:rPr lang="es-ES" sz="2800" dirty="0" err="1"/>
+              <a:t>Kp</a:t>
+            </a:r>
+            <a:r>
+              <a:rPr lang="es-ES" sz="2800" dirty="0"/>
+              <a:t> = 1, 3V)</a:t>
+            </a:r>
+            <a:br>
+              <a:rPr lang="es-ES" sz="2800" dirty="0"/>
+            </a:br>
+            <a:r>
+              <a:rPr lang="ca-ES" sz="2800" dirty="0"/>
+              <a:t>Fregament</a:t>
+            </a:r>
+            <a:endParaRPr lang="es-ES" sz="2800" dirty="0"/>
+          </a:p>
+        </p:txBody>
+      </p:sp>
+      <p:sp>
+        <p:nvSpPr>
+          <p:cNvPr id="10" name="Rectángulo 9">
+            <a:extLst>
+              <a:ext uri="{FF2B5EF4-FFF2-40B4-BE49-F238E27FC236}">
+                <a16:creationId xmlns:a16="http://schemas.microsoft.com/office/drawing/2014/main" id="{2EF7F631-717C-4283-B2CA-33A0C8D9E561}"/>
               </a:ext>
             </a:extLst>
           </p:cNvPr>
@@ -12503,615 +12536,47 @@
           </a:p>
         </p:txBody>
       </p:sp>
-      <p:sp>
-        <p:nvSpPr>
-          <p:cNvPr id="8" name="Rectangle 7">
-            <a:extLst>
-              <a:ext uri="{FF2B5EF4-FFF2-40B4-BE49-F238E27FC236}">
-                <a16:creationId xmlns:a16="http://schemas.microsoft.com/office/drawing/2014/main" id="{9F545665-EC68-4BA4-B0EB-25C447D7BC7C}"/>
-              </a:ext>
-            </a:extLst>
-          </p:cNvPr>
-          <p:cNvSpPr/>
+      <p:pic>
+        <p:nvPicPr>
+          <p:cNvPr id="13" name="Imagen 12">
+            <a:extLst>
+              <a:ext uri="{FF2B5EF4-FFF2-40B4-BE49-F238E27FC236}">
+                <a16:creationId xmlns:a16="http://schemas.microsoft.com/office/drawing/2014/main" id="{E89F97CF-DDE0-4E79-8442-F818579C9895}"/>
+              </a:ext>
+            </a:extLst>
+          </p:cNvPr>
+          <p:cNvPicPr>
+            <a:picLocks noChangeAspect="1"/>
+          </p:cNvPicPr>
           <p:nvPr/>
-        </p:nvSpPr>
-        <p:spPr>
-          <a:xfrm>
-            <a:off x="1509667" y="3489120"/>
-            <a:ext cx="2407640" cy="432000"/>
+        </p:nvPicPr>
+        <p:blipFill rotWithShape="1">
+          <a:blip r:embed="rId3">
+            <a:extLst>
+              <a:ext uri="{28A0092B-C50C-407E-A947-70E740481C1C}">
+                <a14:useLocalDpi xmlns:a14="http://schemas.microsoft.com/office/drawing/2010/main" val="0"/>
+              </a:ext>
+            </a:extLst>
+          </a:blip>
+          <a:srcRect r="12770"/>
+          <a:stretch/>
+        </p:blipFill>
+        <p:spPr>
+          <a:xfrm>
+            <a:off x="80769" y="1128634"/>
+            <a:ext cx="9895253" cy="5660011"/>
           </a:xfrm>
           <a:prstGeom prst="rect">
             <a:avLst/>
           </a:prstGeom>
-          <a:solidFill>
-            <a:schemeClr val="tx1"/>
-          </a:solidFill>
-          <a:ln>
-            <a:noFill/>
-          </a:ln>
-        </p:spPr>
-        <p:style>
-          <a:lnRef idx="2">
-            <a:schemeClr val="accent1">
-              <a:shade val="50000"/>
-            </a:schemeClr>
-          </a:lnRef>
-          <a:fillRef idx="1">
-            <a:schemeClr val="accent1"/>
-          </a:fillRef>
-          <a:effectRef idx="0">
-            <a:schemeClr val="accent1"/>
-          </a:effectRef>
-          <a:fontRef idx="minor">
-            <a:schemeClr val="lt1"/>
-          </a:fontRef>
-        </p:style>
-        <p:txBody>
-          <a:bodyPr rtlCol="0" anchor="ctr"/>
-          <a:lstStyle/>
-          <a:p>
-            <a:pPr algn="ctr"/>
-            <a:r>
-              <a:rPr lang="ca-ES" dirty="0"/>
-              <a:t>PSU</a:t>
-            </a:r>
-          </a:p>
-        </p:txBody>
-      </p:sp>
-      <p:sp>
-        <p:nvSpPr>
-          <p:cNvPr id="10" name="Rectangle 9">
-            <a:extLst>
-              <a:ext uri="{FF2B5EF4-FFF2-40B4-BE49-F238E27FC236}">
-                <a16:creationId xmlns:a16="http://schemas.microsoft.com/office/drawing/2014/main" id="{E24F5ABF-F6D7-4838-B463-AC9B89950576}"/>
-              </a:ext>
-            </a:extLst>
-          </p:cNvPr>
-          <p:cNvSpPr/>
-          <p:nvPr/>
-        </p:nvSpPr>
-        <p:spPr>
-          <a:xfrm>
-            <a:off x="750463" y="4778695"/>
-            <a:ext cx="1518407" cy="591489"/>
-          </a:xfrm>
-          <a:prstGeom prst="rect">
-            <a:avLst/>
-          </a:prstGeom>
-          <a:solidFill>
-            <a:schemeClr val="tx1"/>
-          </a:solidFill>
-          <a:ln>
-            <a:noFill/>
-          </a:ln>
-        </p:spPr>
-        <p:style>
-          <a:lnRef idx="2">
-            <a:schemeClr val="accent1">
-              <a:shade val="50000"/>
-            </a:schemeClr>
-          </a:lnRef>
-          <a:fillRef idx="1">
-            <a:schemeClr val="accent1"/>
-          </a:fillRef>
-          <a:effectRef idx="0">
-            <a:schemeClr val="accent1"/>
-          </a:effectRef>
-          <a:fontRef idx="minor">
-            <a:schemeClr val="lt1"/>
-          </a:fontRef>
-        </p:style>
-        <p:txBody>
-          <a:bodyPr rtlCol="0" anchor="ctr"/>
-          <a:lstStyle/>
-          <a:p>
-            <a:pPr algn="ctr"/>
-            <a:r>
-              <a:rPr lang="ca-ES" dirty="0"/>
-              <a:t>Planta</a:t>
-            </a:r>
-          </a:p>
-        </p:txBody>
-      </p:sp>
-      <p:sp>
-        <p:nvSpPr>
-          <p:cNvPr id="12" name="Rectangle 11">
-            <a:extLst>
-              <a:ext uri="{FF2B5EF4-FFF2-40B4-BE49-F238E27FC236}">
-                <a16:creationId xmlns:a16="http://schemas.microsoft.com/office/drawing/2014/main" id="{D08595CC-484E-4875-86FF-D80660D40F3A}"/>
-              </a:ext>
-            </a:extLst>
-          </p:cNvPr>
-          <p:cNvSpPr/>
-          <p:nvPr/>
-        </p:nvSpPr>
-        <p:spPr>
-          <a:xfrm>
-            <a:off x="3158103" y="4778695"/>
-            <a:ext cx="1518408" cy="591490"/>
-          </a:xfrm>
-          <a:prstGeom prst="rect">
-            <a:avLst/>
-          </a:prstGeom>
-          <a:solidFill>
-            <a:schemeClr val="tx1"/>
-          </a:solidFill>
-          <a:ln>
-            <a:noFill/>
-          </a:ln>
-        </p:spPr>
-        <p:style>
-          <a:lnRef idx="2">
-            <a:schemeClr val="accent1">
-              <a:shade val="50000"/>
-            </a:schemeClr>
-          </a:lnRef>
-          <a:fillRef idx="1">
-            <a:schemeClr val="accent1"/>
-          </a:fillRef>
-          <a:effectRef idx="0">
-            <a:schemeClr val="accent1"/>
-          </a:effectRef>
-          <a:fontRef idx="minor">
-            <a:schemeClr val="lt1"/>
-          </a:fontRef>
-        </p:style>
-        <p:txBody>
-          <a:bodyPr rtlCol="0" anchor="ctr"/>
-          <a:lstStyle/>
-          <a:p>
-            <a:pPr algn="ctr"/>
-            <a:r>
-              <a:rPr lang="ca-ES" dirty="0"/>
-              <a:t>Controlador</a:t>
-            </a:r>
-          </a:p>
-        </p:txBody>
-      </p:sp>
-      <p:cxnSp>
-        <p:nvCxnSpPr>
-          <p:cNvPr id="14" name="Connector: angular 13">
-            <a:extLst>
-              <a:ext uri="{FF2B5EF4-FFF2-40B4-BE49-F238E27FC236}">
-                <a16:creationId xmlns:a16="http://schemas.microsoft.com/office/drawing/2014/main" id="{50D5D9D9-24F3-447D-8A65-53A73A440240}"/>
-              </a:ext>
-            </a:extLst>
-          </p:cNvPr>
-          <p:cNvCxnSpPr>
-            <a:stCxn id="8" idx="1"/>
-            <a:endCxn id="10" idx="0"/>
-          </p:cNvCxnSpPr>
-          <p:nvPr/>
-        </p:nvCxnSpPr>
-        <p:spPr>
-          <a:xfrm rot="10800000" flipV="1">
-            <a:off x="1509667" y="3705119"/>
-            <a:ext cx="12700" cy="1073575"/>
-          </a:xfrm>
-          <a:prstGeom prst="bentConnector4">
-            <a:avLst>
-              <a:gd name="adj1" fmla="val 115598"/>
-              <a:gd name="adj2" fmla="val 60060"/>
-            </a:avLst>
-          </a:prstGeom>
-          <a:ln w="57150">
-            <a:solidFill>
-              <a:srgbClr val="FF0000"/>
-            </a:solidFill>
-            <a:tailEnd type="triangle"/>
-          </a:ln>
-        </p:spPr>
-        <p:style>
-          <a:lnRef idx="1">
-            <a:schemeClr val="accent3"/>
-          </a:lnRef>
-          <a:fillRef idx="0">
-            <a:schemeClr val="accent3"/>
-          </a:fillRef>
-          <a:effectRef idx="0">
-            <a:schemeClr val="accent3"/>
-          </a:effectRef>
-          <a:fontRef idx="minor">
-            <a:schemeClr val="tx1"/>
-          </a:fontRef>
-        </p:style>
-      </p:cxnSp>
-      <p:cxnSp>
-        <p:nvCxnSpPr>
-          <p:cNvPr id="17" name="Connector de fletxa recta 16">
-            <a:extLst>
-              <a:ext uri="{FF2B5EF4-FFF2-40B4-BE49-F238E27FC236}">
-                <a16:creationId xmlns:a16="http://schemas.microsoft.com/office/drawing/2014/main" id="{97F0F599-B794-4006-BEBA-5DFCFB43AB09}"/>
-              </a:ext>
-            </a:extLst>
-          </p:cNvPr>
-          <p:cNvCxnSpPr>
-            <a:stCxn id="8" idx="3"/>
-            <a:endCxn id="12" idx="0"/>
-          </p:cNvCxnSpPr>
-          <p:nvPr/>
-        </p:nvCxnSpPr>
-        <p:spPr>
-          <a:xfrm>
-            <a:off x="3917307" y="3705120"/>
-            <a:ext cx="0" cy="1073575"/>
-          </a:xfrm>
-          <a:prstGeom prst="straightConnector1">
-            <a:avLst/>
-          </a:prstGeom>
-          <a:ln w="12700">
-            <a:solidFill>
-              <a:srgbClr val="FF0000"/>
-            </a:solidFill>
-            <a:tailEnd type="triangle"/>
-          </a:ln>
-        </p:spPr>
-        <p:style>
-          <a:lnRef idx="1">
-            <a:schemeClr val="accent3"/>
-          </a:lnRef>
-          <a:fillRef idx="0">
-            <a:schemeClr val="accent3"/>
-          </a:fillRef>
-          <a:effectRef idx="0">
-            <a:schemeClr val="accent3"/>
-          </a:effectRef>
-          <a:fontRef idx="minor">
-            <a:schemeClr val="tx1"/>
-          </a:fontRef>
-        </p:style>
-      </p:cxnSp>
-      <p:cxnSp>
-        <p:nvCxnSpPr>
-          <p:cNvPr id="19" name="Connector de fletxa recta 18">
-            <a:extLst>
-              <a:ext uri="{FF2B5EF4-FFF2-40B4-BE49-F238E27FC236}">
-                <a16:creationId xmlns:a16="http://schemas.microsoft.com/office/drawing/2014/main" id="{95CFFC38-A58F-469B-A73C-B4F968869E35}"/>
-              </a:ext>
-            </a:extLst>
-          </p:cNvPr>
-          <p:cNvCxnSpPr>
-            <a:stCxn id="10" idx="3"/>
-            <a:endCxn id="12" idx="1"/>
-          </p:cNvCxnSpPr>
-          <p:nvPr/>
-        </p:nvCxnSpPr>
-        <p:spPr>
-          <a:xfrm>
-            <a:off x="2268870" y="5074440"/>
-            <a:ext cx="889233" cy="0"/>
-          </a:xfrm>
-          <a:prstGeom prst="straightConnector1">
-            <a:avLst/>
-          </a:prstGeom>
-          <a:ln w="12700">
-            <a:prstDash val="lgDash"/>
-            <a:headEnd type="arrow" w="med" len="med"/>
-            <a:tailEnd type="arrow" w="med" len="med"/>
-          </a:ln>
-        </p:spPr>
-        <p:style>
-          <a:lnRef idx="1">
-            <a:schemeClr val="accent5"/>
-          </a:lnRef>
-          <a:fillRef idx="0">
-            <a:schemeClr val="accent5"/>
-          </a:fillRef>
-          <a:effectRef idx="0">
-            <a:schemeClr val="accent5"/>
-          </a:effectRef>
-          <a:fontRef idx="minor">
-            <a:schemeClr val="tx1"/>
-          </a:fontRef>
-        </p:style>
-      </p:cxnSp>
-      <p:sp>
-        <p:nvSpPr>
-          <p:cNvPr id="20" name="Rectangle 19">
-            <a:extLst>
-              <a:ext uri="{FF2B5EF4-FFF2-40B4-BE49-F238E27FC236}">
-                <a16:creationId xmlns:a16="http://schemas.microsoft.com/office/drawing/2014/main" id="{00DD195A-CF89-408E-9154-999B747713E4}"/>
-              </a:ext>
-            </a:extLst>
-          </p:cNvPr>
-          <p:cNvSpPr/>
-          <p:nvPr/>
-        </p:nvSpPr>
-        <p:spPr>
-          <a:xfrm>
-            <a:off x="6396256" y="3489121"/>
-            <a:ext cx="2407640" cy="432000"/>
-          </a:xfrm>
-          <a:prstGeom prst="rect">
-            <a:avLst/>
-          </a:prstGeom>
-          <a:solidFill>
-            <a:schemeClr val="tx1"/>
-          </a:solidFill>
-          <a:ln>
-            <a:noFill/>
-          </a:ln>
-        </p:spPr>
-        <p:style>
-          <a:lnRef idx="2">
-            <a:schemeClr val="accent1">
-              <a:shade val="50000"/>
-            </a:schemeClr>
-          </a:lnRef>
-          <a:fillRef idx="1">
-            <a:schemeClr val="accent1"/>
-          </a:fillRef>
-          <a:effectRef idx="0">
-            <a:schemeClr val="accent1"/>
-          </a:effectRef>
-          <a:fontRef idx="minor">
-            <a:schemeClr val="lt1"/>
-          </a:fontRef>
-        </p:style>
-        <p:txBody>
-          <a:bodyPr rtlCol="0" anchor="ctr"/>
-          <a:lstStyle/>
-          <a:p>
-            <a:pPr algn="ctr"/>
-            <a:r>
-              <a:rPr lang="ca-ES" dirty="0"/>
-              <a:t>PSU</a:t>
-            </a:r>
-          </a:p>
-        </p:txBody>
-      </p:sp>
-      <p:sp>
-        <p:nvSpPr>
-          <p:cNvPr id="21" name="Rectangle 20">
-            <a:extLst>
-              <a:ext uri="{FF2B5EF4-FFF2-40B4-BE49-F238E27FC236}">
-                <a16:creationId xmlns:a16="http://schemas.microsoft.com/office/drawing/2014/main" id="{7391B80E-350D-453E-9342-D8B70DF35DF6}"/>
-              </a:ext>
-            </a:extLst>
-          </p:cNvPr>
-          <p:cNvSpPr/>
-          <p:nvPr/>
-        </p:nvSpPr>
-        <p:spPr>
-          <a:xfrm>
-            <a:off x="5637052" y="4778696"/>
-            <a:ext cx="1518407" cy="591489"/>
-          </a:xfrm>
-          <a:prstGeom prst="rect">
-            <a:avLst/>
-          </a:prstGeom>
-          <a:solidFill>
-            <a:schemeClr val="tx1"/>
-          </a:solidFill>
-          <a:ln>
-            <a:noFill/>
-          </a:ln>
-        </p:spPr>
-        <p:style>
-          <a:lnRef idx="2">
-            <a:schemeClr val="accent1">
-              <a:shade val="50000"/>
-            </a:schemeClr>
-          </a:lnRef>
-          <a:fillRef idx="1">
-            <a:schemeClr val="accent1"/>
-          </a:fillRef>
-          <a:effectRef idx="0">
-            <a:schemeClr val="accent1"/>
-          </a:effectRef>
-          <a:fontRef idx="minor">
-            <a:schemeClr val="lt1"/>
-          </a:fontRef>
-        </p:style>
-        <p:txBody>
-          <a:bodyPr rtlCol="0" anchor="ctr"/>
-          <a:lstStyle/>
-          <a:p>
-            <a:pPr algn="ctr"/>
-            <a:r>
-              <a:rPr lang="ca-ES" dirty="0"/>
-              <a:t>Planta</a:t>
-            </a:r>
-          </a:p>
-        </p:txBody>
-      </p:sp>
-      <p:sp>
-        <p:nvSpPr>
-          <p:cNvPr id="22" name="Rectangle 21">
-            <a:extLst>
-              <a:ext uri="{FF2B5EF4-FFF2-40B4-BE49-F238E27FC236}">
-                <a16:creationId xmlns:a16="http://schemas.microsoft.com/office/drawing/2014/main" id="{154211AB-44F6-4DB0-80B6-398AEE97FA17}"/>
-              </a:ext>
-            </a:extLst>
-          </p:cNvPr>
-          <p:cNvSpPr/>
-          <p:nvPr/>
-        </p:nvSpPr>
-        <p:spPr>
-          <a:xfrm>
-            <a:off x="8044692" y="4778696"/>
-            <a:ext cx="1518408" cy="591490"/>
-          </a:xfrm>
-          <a:prstGeom prst="rect">
-            <a:avLst/>
-          </a:prstGeom>
-          <a:solidFill>
-            <a:schemeClr val="tx1"/>
-          </a:solidFill>
-          <a:ln>
-            <a:noFill/>
-          </a:ln>
-        </p:spPr>
-        <p:style>
-          <a:lnRef idx="2">
-            <a:schemeClr val="accent1">
-              <a:shade val="50000"/>
-            </a:schemeClr>
-          </a:lnRef>
-          <a:fillRef idx="1">
-            <a:schemeClr val="accent1"/>
-          </a:fillRef>
-          <a:effectRef idx="0">
-            <a:schemeClr val="accent1"/>
-          </a:effectRef>
-          <a:fontRef idx="minor">
-            <a:schemeClr val="lt1"/>
-          </a:fontRef>
-        </p:style>
-        <p:txBody>
-          <a:bodyPr rtlCol="0" anchor="ctr"/>
-          <a:lstStyle/>
-          <a:p>
-            <a:pPr algn="ctr"/>
-            <a:r>
-              <a:rPr lang="ca-ES" dirty="0"/>
-              <a:t>Controlador</a:t>
-            </a:r>
-          </a:p>
-        </p:txBody>
-      </p:sp>
-      <p:cxnSp>
-        <p:nvCxnSpPr>
-          <p:cNvPr id="23" name="Connector: angular 22">
-            <a:extLst>
-              <a:ext uri="{FF2B5EF4-FFF2-40B4-BE49-F238E27FC236}">
-                <a16:creationId xmlns:a16="http://schemas.microsoft.com/office/drawing/2014/main" id="{AA8E9B61-A204-4900-9D57-798EFA0CFD6C}"/>
-              </a:ext>
-            </a:extLst>
-          </p:cNvPr>
-          <p:cNvCxnSpPr>
-            <a:stCxn id="20" idx="1"/>
-            <a:endCxn id="21" idx="0"/>
-          </p:cNvCxnSpPr>
-          <p:nvPr/>
-        </p:nvCxnSpPr>
-        <p:spPr>
-          <a:xfrm rot="10800000" flipV="1">
-            <a:off x="6396256" y="3705120"/>
-            <a:ext cx="12700" cy="1073575"/>
-          </a:xfrm>
-          <a:prstGeom prst="bentConnector4">
-            <a:avLst>
-              <a:gd name="adj1" fmla="val 115598"/>
-              <a:gd name="adj2" fmla="val 60060"/>
-            </a:avLst>
-          </a:prstGeom>
-          <a:ln w="57150">
-            <a:solidFill>
-              <a:srgbClr val="FF0000"/>
-            </a:solidFill>
-            <a:tailEnd type="triangle"/>
-          </a:ln>
-        </p:spPr>
-        <p:style>
-          <a:lnRef idx="1">
-            <a:schemeClr val="accent3"/>
-          </a:lnRef>
-          <a:fillRef idx="0">
-            <a:schemeClr val="accent3"/>
-          </a:fillRef>
-          <a:effectRef idx="0">
-            <a:schemeClr val="accent3"/>
-          </a:effectRef>
-          <a:fontRef idx="minor">
-            <a:schemeClr val="tx1"/>
-          </a:fontRef>
-        </p:style>
-      </p:cxnSp>
-      <p:cxnSp>
-        <p:nvCxnSpPr>
-          <p:cNvPr id="25" name="Connector de fletxa recta 24">
-            <a:extLst>
-              <a:ext uri="{FF2B5EF4-FFF2-40B4-BE49-F238E27FC236}">
-                <a16:creationId xmlns:a16="http://schemas.microsoft.com/office/drawing/2014/main" id="{AF936376-277B-4A30-A653-86B47528BE8F}"/>
-              </a:ext>
-            </a:extLst>
-          </p:cNvPr>
-          <p:cNvCxnSpPr>
-            <a:cxnSpLocks/>
-          </p:cNvCxnSpPr>
-          <p:nvPr/>
-        </p:nvCxnSpPr>
-        <p:spPr>
-          <a:xfrm>
-            <a:off x="7155459" y="5208665"/>
-            <a:ext cx="889233" cy="0"/>
-          </a:xfrm>
-          <a:prstGeom prst="straightConnector1">
-            <a:avLst/>
-          </a:prstGeom>
-          <a:ln w="12700">
-            <a:prstDash val="lgDash"/>
-            <a:headEnd type="arrow" w="med" len="med"/>
-            <a:tailEnd type="arrow" w="med" len="med"/>
-          </a:ln>
-        </p:spPr>
-        <p:style>
-          <a:lnRef idx="1">
-            <a:schemeClr val="accent5"/>
-          </a:lnRef>
-          <a:fillRef idx="0">
-            <a:schemeClr val="accent5"/>
-          </a:fillRef>
-          <a:effectRef idx="0">
-            <a:schemeClr val="accent5"/>
-          </a:effectRef>
-          <a:fontRef idx="minor">
-            <a:schemeClr val="tx1"/>
-          </a:fontRef>
-        </p:style>
-      </p:cxnSp>
-      <p:cxnSp>
-        <p:nvCxnSpPr>
-          <p:cNvPr id="28" name="Connector de fletxa recta 27">
-            <a:extLst>
-              <a:ext uri="{FF2B5EF4-FFF2-40B4-BE49-F238E27FC236}">
-                <a16:creationId xmlns:a16="http://schemas.microsoft.com/office/drawing/2014/main" id="{2282E0B7-084C-4638-BDF5-9D4FF2885916}"/>
-              </a:ext>
-            </a:extLst>
-          </p:cNvPr>
-          <p:cNvCxnSpPr>
-            <a:cxnSpLocks/>
-          </p:cNvCxnSpPr>
-          <p:nvPr/>
-        </p:nvCxnSpPr>
-        <p:spPr>
-          <a:xfrm>
-            <a:off x="7155459" y="4966783"/>
-            <a:ext cx="889233" cy="0"/>
-          </a:xfrm>
-          <a:prstGeom prst="straightConnector1">
-            <a:avLst/>
-          </a:prstGeom>
-          <a:ln w="12700">
-            <a:solidFill>
-              <a:srgbClr val="FF0000"/>
-            </a:solidFill>
-            <a:headEnd type="none" w="med" len="med"/>
-            <a:tailEnd type="triangle" w="med" len="med"/>
-          </a:ln>
-        </p:spPr>
-        <p:style>
-          <a:lnRef idx="1">
-            <a:schemeClr val="accent5"/>
-          </a:lnRef>
-          <a:fillRef idx="0">
-            <a:schemeClr val="accent5"/>
-          </a:fillRef>
-          <a:effectRef idx="0">
-            <a:schemeClr val="accent5"/>
-          </a:effectRef>
-          <a:fontRef idx="minor">
-            <a:schemeClr val="tx1"/>
-          </a:fontRef>
-        </p:style>
-      </p:cxnSp>
-      <p:sp>
-        <p:nvSpPr>
-          <p:cNvPr id="30" name="QuadreDeText 29">
-            <a:extLst>
-              <a:ext uri="{FF2B5EF4-FFF2-40B4-BE49-F238E27FC236}">
-                <a16:creationId xmlns:a16="http://schemas.microsoft.com/office/drawing/2014/main" id="{4621B3ED-B916-4C18-B5DB-52C576E5C2CA}"/>
+        </p:spPr>
+      </p:pic>
+      <p:sp>
+        <p:nvSpPr>
+          <p:cNvPr id="11" name="CuadroTexto 10">
+            <a:extLst>
+              <a:ext uri="{FF2B5EF4-FFF2-40B4-BE49-F238E27FC236}">
+                <a16:creationId xmlns:a16="http://schemas.microsoft.com/office/drawing/2014/main" id="{10B90111-7D2D-45B4-B3F2-7559AFE0FA14}"/>
               </a:ext>
             </a:extLst>
           </p:cNvPr>
@@ -13120,8 +12585,8 @@
         </p:nvSpPr>
         <p:spPr>
           <a:xfrm>
-            <a:off x="5444691" y="4044899"/>
-            <a:ext cx="864066" cy="338554"/>
+            <a:off x="10007710" y="143111"/>
+            <a:ext cx="2184290" cy="1754326"/>
           </a:xfrm>
           <a:prstGeom prst="rect">
             <a:avLst/>
@@ -13135,40 +12600,68 @@
           <a:lstStyle/>
           <a:p>
             <a:r>
-              <a:rPr lang="el-GR" sz="1600" dirty="0">
-                <a:solidFill>
-                  <a:srgbClr val="FF0000"/>
-                </a:solidFill>
-              </a:rPr>
-              <a:t>Δ</a:t>
-            </a:r>
-            <a:r>
-              <a:rPr lang="ca-ES" sz="1600" dirty="0">
-                <a:solidFill>
-                  <a:srgbClr val="FF0000"/>
-                </a:solidFill>
-              </a:rPr>
-              <a:t>V &gt; 0</a:t>
-            </a:r>
-          </a:p>
-        </p:txBody>
-      </p:sp>
-      <p:sp>
-        <p:nvSpPr>
-          <p:cNvPr id="31" name="QuadreDeText 30">
-            <a:extLst>
-              <a:ext uri="{FF2B5EF4-FFF2-40B4-BE49-F238E27FC236}">
-                <a16:creationId xmlns:a16="http://schemas.microsoft.com/office/drawing/2014/main" id="{953D5F51-6C03-4369-AD1D-66488BCA17B2}"/>
-              </a:ext>
-            </a:extLst>
-          </p:cNvPr>
+              <a:rPr lang="es-ES" dirty="0"/>
+              <a:t>REF: 0V Motor</a:t>
+            </a:r>
+          </a:p>
+          <a:p>
+            <a:endParaRPr lang="es-ES" dirty="0"/>
+          </a:p>
+          <a:p>
+            <a:r>
+              <a:rPr lang="ca-ES" dirty="0"/>
+              <a:t>Groc</a:t>
+            </a:r>
+            <a:r>
+              <a:rPr lang="es-ES" dirty="0"/>
+              <a:t> – </a:t>
+            </a:r>
+            <a:r>
+              <a:rPr lang="ca-ES" dirty="0"/>
+              <a:t>Referència</a:t>
+            </a:r>
+            <a:r>
+              <a:rPr lang="es-ES" dirty="0"/>
+              <a:t> 0V Controlador</a:t>
+            </a:r>
+          </a:p>
+          <a:p>
+            <a:endParaRPr lang="es-ES" dirty="0"/>
+          </a:p>
+          <a:p>
+            <a:r>
+              <a:rPr lang="es-ES" dirty="0"/>
+              <a:t>Vermell – </a:t>
+            </a:r>
+            <a:r>
+              <a:rPr lang="es-ES" dirty="0" err="1"/>
+              <a:t>Vout</a:t>
+            </a:r>
+            <a:r>
+              <a:rPr lang="es-ES" dirty="0"/>
+              <a:t> </a:t>
+            </a:r>
+            <a:r>
+              <a:rPr lang="es-ES" dirty="0" err="1"/>
+              <a:t>Pot</a:t>
+            </a:r>
+            <a:r>
+              <a:rPr lang="es-ES" dirty="0"/>
+              <a:t>.</a:t>
+            </a:r>
+          </a:p>
+        </p:txBody>
+      </p:sp>
+      <p:sp>
+        <p:nvSpPr>
+          <p:cNvPr id="6" name="QuadreDeText 5"/>
           <p:cNvSpPr txBox="1"/>
           <p:nvPr/>
         </p:nvSpPr>
         <p:spPr>
           <a:xfrm>
-            <a:off x="4004806" y="4050375"/>
-            <a:ext cx="864066" cy="338554"/>
+            <a:off x="6812691" y="2636108"/>
+            <a:ext cx="1688758" cy="369332"/>
           </a:xfrm>
           <a:prstGeom prst="rect">
             <a:avLst/>
@@ -13182,222 +12675,30 @@
           <a:lstStyle/>
           <a:p>
             <a:r>
-              <a:rPr lang="el-GR" sz="1600" dirty="0">
-                <a:solidFill>
-                  <a:srgbClr val="FF0000"/>
-                </a:solidFill>
-              </a:rPr>
-              <a:t>Δ</a:t>
-            </a:r>
-            <a:r>
-              <a:rPr lang="ca-ES" sz="1600" dirty="0">
-                <a:solidFill>
-                  <a:srgbClr val="FF0000"/>
-                </a:solidFill>
-              </a:rPr>
-              <a:t>V ≈ 0</a:t>
-            </a:r>
-          </a:p>
-        </p:txBody>
-      </p:sp>
-      <p:sp>
-        <p:nvSpPr>
-          <p:cNvPr id="32" name="QuadreDeText 31">
-            <a:extLst>
-              <a:ext uri="{FF2B5EF4-FFF2-40B4-BE49-F238E27FC236}">
-                <a16:creationId xmlns:a16="http://schemas.microsoft.com/office/drawing/2014/main" id="{142C49B8-1914-4AFA-8AF0-D3C5E9C71A64}"/>
-              </a:ext>
-            </a:extLst>
-          </p:cNvPr>
-          <p:cNvSpPr txBox="1"/>
-          <p:nvPr/>
-        </p:nvSpPr>
-        <p:spPr>
-          <a:xfrm>
-            <a:off x="2329807" y="4710337"/>
-            <a:ext cx="864066" cy="338554"/>
-          </a:xfrm>
-          <a:prstGeom prst="rect">
-            <a:avLst/>
-          </a:prstGeom>
-          <a:noFill/>
-        </p:spPr>
-        <p:txBody>
-          <a:bodyPr wrap="square" rtlCol="0">
-            <a:spAutoFit/>
-          </a:bodyPr>
-          <a:lstStyle/>
-          <a:p>
-            <a:r>
-              <a:rPr lang="el-GR" sz="1600" dirty="0">
-                <a:solidFill>
-                  <a:schemeClr val="accent5"/>
-                </a:solidFill>
-              </a:rPr>
-              <a:t>Δ</a:t>
-            </a:r>
-            <a:r>
-              <a:rPr lang="ca-ES" sz="1600" dirty="0">
-                <a:solidFill>
-                  <a:schemeClr val="accent5"/>
-                </a:solidFill>
-              </a:rPr>
-              <a:t>V &gt; 0</a:t>
-            </a:r>
-          </a:p>
-        </p:txBody>
-      </p:sp>
-      <p:sp>
-        <p:nvSpPr>
-          <p:cNvPr id="33" name="QuadreDeText 32">
-            <a:extLst>
-              <a:ext uri="{FF2B5EF4-FFF2-40B4-BE49-F238E27FC236}">
-                <a16:creationId xmlns:a16="http://schemas.microsoft.com/office/drawing/2014/main" id="{649DDD5A-6C9B-4CBF-A025-C91C63CE5FEF}"/>
-              </a:ext>
-            </a:extLst>
-          </p:cNvPr>
-          <p:cNvSpPr txBox="1"/>
-          <p:nvPr/>
-        </p:nvSpPr>
-        <p:spPr>
-          <a:xfrm>
-            <a:off x="7168042" y="5305337"/>
-            <a:ext cx="864066" cy="338554"/>
-          </a:xfrm>
-          <a:prstGeom prst="rect">
-            <a:avLst/>
-          </a:prstGeom>
-          <a:noFill/>
-        </p:spPr>
-        <p:txBody>
-          <a:bodyPr wrap="square" rtlCol="0">
-            <a:spAutoFit/>
-          </a:bodyPr>
-          <a:lstStyle/>
-          <a:p>
-            <a:r>
-              <a:rPr lang="el-GR" sz="1600" dirty="0">
-                <a:solidFill>
-                  <a:schemeClr val="accent5"/>
-                </a:solidFill>
-              </a:rPr>
-              <a:t>Δ</a:t>
-            </a:r>
-            <a:r>
-              <a:rPr lang="ca-ES" sz="1600" dirty="0">
-                <a:solidFill>
-                  <a:schemeClr val="accent5"/>
-                </a:solidFill>
-              </a:rPr>
-              <a:t>V ≈ 0</a:t>
-            </a:r>
-          </a:p>
-        </p:txBody>
-      </p:sp>
-      <p:sp>
-        <p:nvSpPr>
-          <p:cNvPr id="34" name="QuadreDeText 33">
-            <a:extLst>
-              <a:ext uri="{FF2B5EF4-FFF2-40B4-BE49-F238E27FC236}">
-                <a16:creationId xmlns:a16="http://schemas.microsoft.com/office/drawing/2014/main" id="{E1112745-3CFD-4033-9E3B-DAAAAE35BB52}"/>
-              </a:ext>
-            </a:extLst>
-          </p:cNvPr>
-          <p:cNvSpPr txBox="1"/>
-          <p:nvPr/>
-        </p:nvSpPr>
-        <p:spPr>
-          <a:xfrm>
-            <a:off x="785124" y="4225029"/>
-            <a:ext cx="864066" cy="338554"/>
-          </a:xfrm>
-          <a:prstGeom prst="rect">
-            <a:avLst/>
-          </a:prstGeom>
-          <a:noFill/>
-        </p:spPr>
-        <p:txBody>
-          <a:bodyPr wrap="square" rtlCol="0">
-            <a:spAutoFit/>
-          </a:bodyPr>
-          <a:lstStyle/>
-          <a:p>
-            <a:r>
-              <a:rPr lang="el-GR" sz="1600" dirty="0">
-                <a:solidFill>
-                  <a:srgbClr val="FF0000"/>
-                </a:solidFill>
-              </a:rPr>
-              <a:t>Δ</a:t>
-            </a:r>
-            <a:r>
-              <a:rPr lang="ca-ES" sz="1600" dirty="0">
-                <a:solidFill>
-                  <a:srgbClr val="FF0000"/>
-                </a:solidFill>
-              </a:rPr>
-              <a:t>V &gt; 0</a:t>
-            </a:r>
-          </a:p>
-        </p:txBody>
-      </p:sp>
-      <p:sp>
-        <p:nvSpPr>
-          <p:cNvPr id="35" name="QuadreDeText 34">
-            <a:extLst>
-              <a:ext uri="{FF2B5EF4-FFF2-40B4-BE49-F238E27FC236}">
-                <a16:creationId xmlns:a16="http://schemas.microsoft.com/office/drawing/2014/main" id="{0D3393E5-1026-40AF-ADA1-FED7E61C124C}"/>
-              </a:ext>
-            </a:extLst>
-          </p:cNvPr>
-          <p:cNvSpPr txBox="1"/>
-          <p:nvPr/>
-        </p:nvSpPr>
-        <p:spPr>
-          <a:xfrm>
-            <a:off x="7168042" y="4579894"/>
-            <a:ext cx="864066" cy="338554"/>
-          </a:xfrm>
-          <a:prstGeom prst="rect">
-            <a:avLst/>
-          </a:prstGeom>
-          <a:noFill/>
-        </p:spPr>
-        <p:txBody>
-          <a:bodyPr wrap="square" rtlCol="0">
-            <a:spAutoFit/>
-          </a:bodyPr>
-          <a:lstStyle/>
-          <a:p>
-            <a:r>
-              <a:rPr lang="el-GR" sz="1600" dirty="0">
-                <a:solidFill>
-                  <a:srgbClr val="FF0000"/>
-                </a:solidFill>
-              </a:rPr>
-              <a:t>Δ</a:t>
-            </a:r>
-            <a:r>
-              <a:rPr lang="ca-ES" sz="1600" dirty="0">
-                <a:solidFill>
-                  <a:srgbClr val="FF0000"/>
-                </a:solidFill>
-              </a:rPr>
-              <a:t>V ≈ 0</a:t>
-            </a:r>
+              <a:rPr lang="ca-ES" dirty="0"/>
+              <a:t>0,4*1 = 0,4</a:t>
+            </a:r>
+            <a:endParaRPr lang="es-ES" dirty="0"/>
           </a:p>
         </p:txBody>
       </p:sp>
     </p:spTree>
     <p:extLst>
       <p:ext uri="{BB962C8B-B14F-4D97-AF65-F5344CB8AC3E}">
-        <p14:creationId xmlns:p14="http://schemas.microsoft.com/office/powerpoint/2010/main" val="4193717302"/>
+        <p14:creationId xmlns:p14="http://schemas.microsoft.com/office/powerpoint/2010/main" val="2454053163"/>
       </p:ext>
     </p:extLst>
   </p:cSld>
   <p:clrMapOvr>
     <a:masterClrMapping/>
   </p:clrMapOvr>
+  <p:timing>
+    <p:tnLst>
+      <p:par>
+        <p:cTn id="1" dur="indefinite" restart="never" nodeType="tmRoot"/>
+      </p:par>
+    </p:tnLst>
+  </p:timing>
 </p:sld>
 </file>
 
@@ -13582,6 +12883,13 @@
   <p:clrMapOvr>
     <a:masterClrMapping/>
   </p:clrMapOvr>
+  <p:timing>
+    <p:tnLst>
+      <p:par>
+        <p:cTn id="1" dur="indefinite" restart="never" nodeType="tmRoot"/>
+      </p:par>
+    </p:tnLst>
+  </p:timing>
 </p:sld>
 </file>
 
@@ -13786,6 +13094,13 @@
   <p:clrMapOvr>
     <a:masterClrMapping/>
   </p:clrMapOvr>
+  <p:timing>
+    <p:tnLst>
+      <p:par>
+        <p:cTn id="1" dur="indefinite" restart="never" nodeType="tmRoot"/>
+      </p:par>
+    </p:tnLst>
+  </p:timing>
 </p:sld>
 </file>
 
@@ -14068,6 +13383,13 @@
   <p:clrMapOvr>
     <a:masterClrMapping/>
   </p:clrMapOvr>
+  <p:timing>
+    <p:tnLst>
+      <p:par>
+        <p:cTn id="1" dur="indefinite" restart="never" nodeType="tmRoot"/>
+      </p:par>
+    </p:tnLst>
+  </p:timing>
 </p:sld>
 </file>
 
@@ -14259,6 +13581,13 @@
   <p:clrMapOvr>
     <a:masterClrMapping/>
   </p:clrMapOvr>
+  <p:timing>
+    <p:tnLst>
+      <p:par>
+        <p:cTn id="1" dur="indefinite" restart="never" nodeType="tmRoot"/>
+      </p:par>
+    </p:tnLst>
+  </p:timing>
 </p:sld>
 </file>
 
@@ -14297,8 +13626,8 @@
         </p:nvSpPr>
         <p:spPr>
           <a:xfrm>
-            <a:off x="3453817" y="2007457"/>
-            <a:ext cx="3735548" cy="3017549"/>
+            <a:off x="3453817" y="2007458"/>
+            <a:ext cx="3735548" cy="2638434"/>
           </a:xfrm>
         </p:spPr>
         <p:txBody>
@@ -14345,37 +13674,30 @@
               <a:buNone/>
             </a:pPr>
             <a:r>
+              <a:rPr lang="ca-ES" sz="1800" dirty="0" smtClean="0"/>
+              <a:t>(</a:t>
+            </a:r>
+            <a:r>
+              <a:rPr lang="ca-ES" sz="1800" dirty="0" err="1" smtClean="0"/>
+              <a:t>Histerèsi</a:t>
+            </a:r>
+            <a:r>
+              <a:rPr lang="ca-ES" sz="1800" dirty="0" smtClean="0"/>
+              <a:t> </a:t>
+            </a:r>
+            <a:r>
               <a:rPr lang="ca-ES" sz="1800" dirty="0"/>
-              <a:t>(</a:t>
-            </a:r>
-            <a:r>
-              <a:rPr lang="ca-ES" sz="1800" dirty="0" err="1"/>
-              <a:t>Vin</a:t>
-            </a:r>
-            <a:r>
-              <a:rPr lang="ca-ES" sz="1800" dirty="0"/>
-              <a:t> = u ±</a:t>
-            </a:r>
-            <a:r>
-              <a:rPr lang="ca-ES" sz="1800" dirty="0" err="1"/>
-              <a:t>Vd</a:t>
-            </a:r>
-            <a:r>
-              <a:rPr lang="ca-ES" sz="1800" dirty="0"/>
-              <a:t> i fem servir K 61)</a:t>
+              <a:t>i fem servir K 61</a:t>
+            </a:r>
+            <a:r>
+              <a:rPr lang="ca-ES" sz="1800" dirty="0" smtClean="0"/>
+              <a:t>)</a:t>
             </a:r>
           </a:p>
           <a:p>
             <a:pPr algn="just"/>
             <a:r>
-              <a:rPr lang="ca-ES" dirty="0"/>
-              <a:t>Modelar K(V)</a:t>
-            </a:r>
-          </a:p>
-          <a:p>
-            <a:pPr algn="just"/>
-            <a:r>
-              <a:rPr lang="ca-ES" dirty="0" err="1"/>
+              <a:rPr lang="ca-ES" dirty="0" err="1" smtClean="0"/>
               <a:t>Etc</a:t>
             </a:r>
             <a:endParaRPr lang="ca-ES" dirty="0"/>
@@ -14477,6 +13799,13 @@
   <p:clrMapOvr>
     <a:masterClrMapping/>
   </p:clrMapOvr>
+  <p:timing>
+    <p:tnLst>
+      <p:par>
+        <p:cTn id="1" dur="indefinite" restart="never" nodeType="tmRoot"/>
+      </p:par>
+    </p:tnLst>
+  </p:timing>
 </p:sld>
 </file>
 
@@ -14663,141 +13992,6 @@
           </a:p>
         </p:txBody>
       </p:sp>
-      <p:sp>
-        <p:nvSpPr>
-          <p:cNvPr id="2" name="QuadreDeText 1">
-            <a:extLst>
-              <a:ext uri="{FF2B5EF4-FFF2-40B4-BE49-F238E27FC236}">
-                <a16:creationId xmlns:a16="http://schemas.microsoft.com/office/drawing/2014/main" id="{98985DDA-6F35-4894-835A-2016A8B55081}"/>
-              </a:ext>
-            </a:extLst>
-          </p:cNvPr>
-          <p:cNvSpPr txBox="1"/>
-          <p:nvPr/>
-        </p:nvSpPr>
-        <p:spPr>
-          <a:xfrm>
-            <a:off x="2080469" y="1098958"/>
-            <a:ext cx="5276675" cy="923330"/>
-          </a:xfrm>
-          <a:prstGeom prst="rect">
-            <a:avLst/>
-          </a:prstGeom>
-          <a:noFill/>
-        </p:spPr>
-        <p:txBody>
-          <a:bodyPr wrap="square" rtlCol="0">
-            <a:spAutoFit/>
-          </a:bodyPr>
-          <a:lstStyle/>
-          <a:p>
-            <a:r>
-              <a:rPr lang="ca-ES" dirty="0">
-                <a:solidFill>
-                  <a:schemeClr val="bg1"/>
-                </a:solidFill>
-              </a:rPr>
-              <a:t>Soroll i guany del derivador</a:t>
-            </a:r>
-          </a:p>
-          <a:p>
-            <a:r>
-              <a:rPr lang="ca-ES" dirty="0">
-                <a:solidFill>
-                  <a:schemeClr val="bg1"/>
-                </a:solidFill>
-              </a:rPr>
-              <a:t>Perquè està el filtre abans del derivador?</a:t>
-            </a:r>
-          </a:p>
-          <a:p>
-            <a:r>
-              <a:rPr lang="ca-ES" dirty="0">
-                <a:solidFill>
-                  <a:schemeClr val="bg1"/>
-                </a:solidFill>
-              </a:rPr>
-              <a:t>L3-4 </a:t>
-            </a:r>
-            <a:r>
-              <a:rPr lang="ca-ES" dirty="0" err="1">
-                <a:solidFill>
-                  <a:schemeClr val="bg1"/>
-                </a:solidFill>
-              </a:rPr>
-              <a:t>Kp</a:t>
-            </a:r>
-            <a:r>
-              <a:rPr lang="ca-ES" dirty="0">
-                <a:solidFill>
-                  <a:schemeClr val="bg1"/>
-                </a:solidFill>
-              </a:rPr>
-              <a:t> = 3-4 | </a:t>
-            </a:r>
-            <a:r>
-              <a:rPr lang="ca-ES" dirty="0" err="1">
-                <a:solidFill>
-                  <a:schemeClr val="bg1"/>
-                </a:solidFill>
-              </a:rPr>
-              <a:t>Ki</a:t>
-            </a:r>
-            <a:r>
-              <a:rPr lang="ca-ES" dirty="0">
-                <a:solidFill>
-                  <a:schemeClr val="bg1"/>
-                </a:solidFill>
-              </a:rPr>
-              <a:t> = 12 Provar altre cop</a:t>
-            </a:r>
-          </a:p>
-        </p:txBody>
-      </p:sp>
-      <p:sp>
-        <p:nvSpPr>
-          <p:cNvPr id="4" name="QuadreDeText 3">
-            <a:extLst>
-              <a:ext uri="{FF2B5EF4-FFF2-40B4-BE49-F238E27FC236}">
-                <a16:creationId xmlns:a16="http://schemas.microsoft.com/office/drawing/2014/main" id="{7894446C-C87F-4778-9C0B-ADBB813D5D56}"/>
-              </a:ext>
-            </a:extLst>
-          </p:cNvPr>
-          <p:cNvSpPr txBox="1"/>
-          <p:nvPr/>
-        </p:nvSpPr>
-        <p:spPr>
-          <a:xfrm>
-            <a:off x="1669409" y="698848"/>
-            <a:ext cx="1080745" cy="400110"/>
-          </a:xfrm>
-          <a:prstGeom prst="rect">
-            <a:avLst/>
-          </a:prstGeom>
-          <a:noFill/>
-        </p:spPr>
-        <p:txBody>
-          <a:bodyPr wrap="none" rtlCol="0">
-            <a:spAutoFit/>
-          </a:bodyPr>
-          <a:lstStyle/>
-          <a:p>
-            <a:r>
-              <a:rPr lang="ca-ES" sz="2000" dirty="0">
-                <a:solidFill>
-                  <a:schemeClr val="bg1"/>
-                </a:solidFill>
-              </a:rPr>
-              <a:t>Pendent:</a:t>
-            </a:r>
-            <a:endParaRPr lang="ca-ES" dirty="0">
-              <a:solidFill>
-                <a:schemeClr val="bg1"/>
-              </a:solidFill>
-            </a:endParaRPr>
-          </a:p>
-        </p:txBody>
-      </p:sp>
     </p:spTree>
     <p:extLst>
       <p:ext uri="{BB962C8B-B14F-4D97-AF65-F5344CB8AC3E}">
@@ -14808,6 +14002,13 @@
   <p:clrMapOvr>
     <a:masterClrMapping/>
   </p:clrMapOvr>
+  <p:timing>
+    <p:tnLst>
+      <p:par>
+        <p:cTn id="1" dur="indefinite" restart="never" nodeType="tmRoot"/>
+      </p:par>
+    </p:tnLst>
+  </p:timing>
 </p:sld>
 </file>
 
@@ -15018,6 +14219,13 @@
   <p:clrMapOvr>
     <a:masterClrMapping/>
   </p:clrMapOvr>
+  <p:timing>
+    <p:tnLst>
+      <p:par>
+        <p:cTn id="1" dur="indefinite" restart="never" nodeType="tmRoot"/>
+      </p:par>
+    </p:tnLst>
+  </p:timing>
 </p:sld>
 </file>
 
@@ -15228,6 +14436,13 @@
   <p:clrMapOvr>
     <a:masterClrMapping/>
   </p:clrMapOvr>
+  <p:timing>
+    <p:tnLst>
+      <p:par>
+        <p:cTn id="1" dur="indefinite" restart="never" nodeType="tmRoot"/>
+      </p:par>
+    </p:tnLst>
+  </p:timing>
 </p:sld>
 </file>
 
@@ -15487,6 +14702,13 @@
   <p:clrMapOvr>
     <a:masterClrMapping/>
   </p:clrMapOvr>
+  <p:timing>
+    <p:tnLst>
+      <p:par>
+        <p:cTn id="1" dur="indefinite" restart="never" nodeType="tmRoot"/>
+      </p:par>
+    </p:tnLst>
+  </p:timing>
 </p:sld>
 </file>
 
@@ -15781,6 +15003,13 @@
   <p:clrMapOvr>
     <a:masterClrMapping/>
   </p:clrMapOvr>
+  <p:timing>
+    <p:tnLst>
+      <p:par>
+        <p:cTn id="1" dur="indefinite" restart="never" nodeType="tmRoot"/>
+      </p:par>
+    </p:tnLst>
+  </p:timing>
 </p:sld>
 </file>
 
@@ -16075,6 +15304,13 @@
   <p:clrMapOvr>
     <a:masterClrMapping/>
   </p:clrMapOvr>
+  <p:timing>
+    <p:tnLst>
+      <p:par>
+        <p:cTn id="1" dur="indefinite" restart="never" nodeType="tmRoot"/>
+      </p:par>
+    </p:tnLst>
+  </p:timing>
 </p:sld>
 </file>
 
@@ -16148,15 +15384,15 @@
             </a:r>
             <a:r>
               <a:rPr lang="ca-ES" sz="2800" dirty="0"/>
-              <a:t> = 3,06 ~ (</a:t>
-            </a:r>
-            <a:r>
-              <a:rPr lang="ca-ES" sz="2800" dirty="0" err="1"/>
-              <a:t>Marg</a:t>
+              <a:t> = 3,06 ~ </a:t>
+            </a:r>
+            <a:r>
+              <a:rPr lang="ca-ES" sz="2800" dirty="0" smtClean="0"/>
+              <a:t>(A vegades)</a:t>
             </a:r>
             <a:r>
               <a:rPr lang="ca-ES" sz="2800" dirty="0"/>
-              <a:t>)</a:t>
+              <a:t/>
             </a:r>
             <a:br>
               <a:rPr lang="ca-ES" sz="2800" dirty="0"/>
@@ -16342,6 +15578,13 @@
   <p:clrMapOvr>
     <a:masterClrMapping/>
   </p:clrMapOvr>
+  <p:timing>
+    <p:tnLst>
+      <p:par>
+        <p:cTn id="1" dur="indefinite" restart="never" nodeType="tmRoot"/>
+      </p:par>
+    </p:tnLst>
+  </p:timing>
 </p:sld>
 </file>
 
@@ -16601,6 +15844,13 @@
   <p:clrMapOvr>
     <a:masterClrMapping/>
   </p:clrMapOvr>
+  <p:timing>
+    <p:tnLst>
+      <p:par>
+        <p:cTn id="1" dur="indefinite" restart="never" nodeType="tmRoot"/>
+      </p:par>
+    </p:tnLst>
+  </p:timing>
 </p:sld>
 </file>
 
@@ -16834,6 +16084,42 @@
           </a:p>
         </p:txBody>
       </p:sp>
+      <p:sp>
+        <p:nvSpPr>
+          <p:cNvPr id="6" name="QuadreDeText 5">
+            <a:extLst>
+              <a:ext uri="{FF2B5EF4-FFF2-40B4-BE49-F238E27FC236}">
+                <a16:creationId xmlns:a16="http://schemas.microsoft.com/office/drawing/2014/main" id="{B53F5619-971A-4E60-9C0F-CCF3086A7AA9}"/>
+              </a:ext>
+            </a:extLst>
+          </p:cNvPr>
+          <p:cNvSpPr txBox="1"/>
+          <p:nvPr/>
+        </p:nvSpPr>
+        <p:spPr>
+          <a:xfrm>
+            <a:off x="1726248" y="1921114"/>
+            <a:ext cx="2476298" cy="923330"/>
+          </a:xfrm>
+          <a:prstGeom prst="rect">
+            <a:avLst/>
+          </a:prstGeom>
+          <a:noFill/>
+        </p:spPr>
+        <p:txBody>
+          <a:bodyPr wrap="square" rtlCol="0">
+            <a:spAutoFit/>
+          </a:bodyPr>
+          <a:lstStyle/>
+          <a:p>
+            <a:r>
+              <a:rPr lang="ca-ES" dirty="0" smtClean="0"/>
+              <a:t>La zona morta impedeix oscil·lacions d’amplitud petita</a:t>
+            </a:r>
+            <a:endParaRPr lang="ca-ES" dirty="0"/>
+          </a:p>
+        </p:txBody>
+      </p:sp>
     </p:spTree>
     <p:extLst>
       <p:ext uri="{BB962C8B-B14F-4D97-AF65-F5344CB8AC3E}">
@@ -16844,6 +16130,13 @@
   <p:clrMapOvr>
     <a:masterClrMapping/>
   </p:clrMapOvr>
+  <p:timing>
+    <p:tnLst>
+      <p:par>
+        <p:cTn id="1" dur="indefinite" restart="never" nodeType="tmRoot"/>
+      </p:par>
+    </p:tnLst>
+  </p:timing>
 </p:sld>
 </file>
 
@@ -17073,6 +16366,13 @@
   <p:clrMapOvr>
     <a:masterClrMapping/>
   </p:clrMapOvr>
+  <p:timing>
+    <p:tnLst>
+      <p:par>
+        <p:cTn id="1" dur="indefinite" restart="never" nodeType="tmRoot"/>
+      </p:par>
+    </p:tnLst>
+  </p:timing>
 </p:sld>
 </file>
 
@@ -17316,6 +16616,13 @@
   <p:clrMapOvr>
     <a:masterClrMapping/>
   </p:clrMapOvr>
+  <p:timing>
+    <p:tnLst>
+      <p:par>
+        <p:cTn id="1" dur="indefinite" restart="never" nodeType="tmRoot"/>
+      </p:par>
+    </p:tnLst>
+  </p:timing>
 </p:sld>
 </file>
 
@@ -17338,6 +16645,192 @@
       </p:grpSpPr>
       <p:sp>
         <p:nvSpPr>
+          <p:cNvPr id="2" name="Contenidor de contingut 1">
+            <a:extLst>
+              <a:ext uri="{FF2B5EF4-FFF2-40B4-BE49-F238E27FC236}">
+                <a16:creationId xmlns:a16="http://schemas.microsoft.com/office/drawing/2014/main" id="{90BA015A-20AF-440F-8413-D939C69EAB2F}"/>
+              </a:ext>
+            </a:extLst>
+          </p:cNvPr>
+          <p:cNvSpPr>
+            <a:spLocks noGrp="1"/>
+          </p:cNvSpPr>
+          <p:nvPr>
+            <p:ph sz="half" idx="1"/>
+          </p:nvPr>
+        </p:nvSpPr>
+        <p:spPr>
+          <a:xfrm>
+            <a:off x="3453817" y="2007458"/>
+            <a:ext cx="3735548" cy="2638434"/>
+          </a:xfrm>
+        </p:spPr>
+        <p:txBody>
+          <a:bodyPr/>
+          <a:lstStyle/>
+          <a:p>
+            <a:pPr marL="0" indent="0" algn="just">
+              <a:buNone/>
+            </a:pPr>
+            <a:r>
+              <a:rPr lang="ca-ES" dirty="0" smtClean="0"/>
+              <a:t>No activar el filtre si no és necessari</a:t>
+            </a:r>
+          </a:p>
+          <a:p>
+            <a:pPr marL="0" indent="0" algn="just">
+              <a:buNone/>
+            </a:pPr>
+            <a:r>
+              <a:rPr lang="ca-ES" dirty="0" smtClean="0"/>
+              <a:t>Per evitar zona morta fer servir PID en velocitat</a:t>
+            </a:r>
+          </a:p>
+          <a:p>
+            <a:pPr marL="0" indent="0" algn="just">
+              <a:buNone/>
+            </a:pPr>
+            <a:r>
+              <a:rPr lang="ca-ES" dirty="0" smtClean="0"/>
+              <a:t>Perquè filtre abans de </a:t>
+            </a:r>
+            <a:r>
+              <a:rPr lang="ca-ES" dirty="0" err="1" smtClean="0"/>
+              <a:t>Kd</a:t>
+            </a:r>
+            <a:r>
+              <a:rPr lang="ca-ES" dirty="0" smtClean="0"/>
+              <a:t> i no després?</a:t>
+            </a:r>
+            <a:endParaRPr lang="ca-ES" dirty="0"/>
+          </a:p>
+        </p:txBody>
+      </p:sp>
+      <p:sp>
+        <p:nvSpPr>
+          <p:cNvPr id="5" name="Títol 4">
+            <a:extLst>
+              <a:ext uri="{FF2B5EF4-FFF2-40B4-BE49-F238E27FC236}">
+                <a16:creationId xmlns:a16="http://schemas.microsoft.com/office/drawing/2014/main" id="{A0961E97-8F98-4B4D-96F2-5C4364E6ACD3}"/>
+              </a:ext>
+            </a:extLst>
+          </p:cNvPr>
+          <p:cNvSpPr>
+            <a:spLocks noGrp="1"/>
+          </p:cNvSpPr>
+          <p:nvPr>
+            <p:ph type="title"/>
+          </p:nvPr>
+        </p:nvSpPr>
+        <p:spPr>
+          <a:xfrm>
+            <a:off x="247442" y="423611"/>
+            <a:ext cx="9131100" cy="432000"/>
+          </a:xfrm>
+        </p:spPr>
+        <p:txBody>
+          <a:bodyPr/>
+          <a:lstStyle/>
+          <a:p>
+            <a:r>
+              <a:rPr lang="ca-ES" dirty="0" smtClean="0"/>
+              <a:t>Punts pendents i propostes</a:t>
+            </a:r>
+            <a:endParaRPr lang="ca-ES" dirty="0"/>
+          </a:p>
+        </p:txBody>
+      </p:sp>
+      <p:sp>
+        <p:nvSpPr>
+          <p:cNvPr id="7" name="Rectángulo 9">
+            <a:extLst>
+              <a:ext uri="{FF2B5EF4-FFF2-40B4-BE49-F238E27FC236}">
+                <a16:creationId xmlns:a16="http://schemas.microsoft.com/office/drawing/2014/main" id="{CCB320B0-EB9E-4107-9824-08DC54BF4B4A}"/>
+              </a:ext>
+            </a:extLst>
+          </p:cNvPr>
+          <p:cNvSpPr/>
+          <p:nvPr/>
+        </p:nvSpPr>
+        <p:spPr>
+          <a:xfrm>
+            <a:off x="10126980" y="6263640"/>
+            <a:ext cx="2065020" cy="594360"/>
+          </a:xfrm>
+          <a:prstGeom prst="rect">
+            <a:avLst/>
+          </a:prstGeom>
+          <a:solidFill>
+            <a:schemeClr val="bg1"/>
+          </a:solidFill>
+          <a:ln>
+            <a:noFill/>
+          </a:ln>
+        </p:spPr>
+        <p:style>
+          <a:lnRef idx="2">
+            <a:schemeClr val="accent1">
+              <a:shade val="50000"/>
+            </a:schemeClr>
+          </a:lnRef>
+          <a:fillRef idx="1">
+            <a:schemeClr val="accent1"/>
+          </a:fillRef>
+          <a:effectRef idx="0">
+            <a:schemeClr val="accent1"/>
+          </a:effectRef>
+          <a:fontRef idx="minor">
+            <a:schemeClr val="lt1"/>
+          </a:fontRef>
+        </p:style>
+        <p:txBody>
+          <a:bodyPr rtlCol="0" anchor="ctr"/>
+          <a:lstStyle/>
+          <a:p>
+            <a:pPr algn="ctr"/>
+            <a:endParaRPr lang="es-ES" dirty="0"/>
+          </a:p>
+        </p:txBody>
+      </p:sp>
+    </p:spTree>
+    <p:extLst>
+      <p:ext uri="{BB962C8B-B14F-4D97-AF65-F5344CB8AC3E}">
+        <p14:creationId xmlns:p14="http://schemas.microsoft.com/office/powerpoint/2010/main" val="243485827"/>
+      </p:ext>
+    </p:extLst>
+  </p:cSld>
+  <p:clrMapOvr>
+    <a:masterClrMapping/>
+  </p:clrMapOvr>
+  <p:timing>
+    <p:tnLst>
+      <p:par>
+        <p:cTn id="1" dur="indefinite" restart="never" nodeType="tmRoot"/>
+      </p:par>
+    </p:tnLst>
+  </p:timing>
+</p:sld>
+</file>
+
+<file path=ppt/slides/slide32.xml><?xml version="1.0" encoding="utf-8"?>
+<p:sld xmlns:a="http://schemas.openxmlformats.org/drawingml/2006/main" xmlns:r="http://schemas.openxmlformats.org/officeDocument/2006/relationships" xmlns:p="http://schemas.openxmlformats.org/presentationml/2006/main">
+  <p:cSld>
+    <p:spTree>
+      <p:nvGrpSpPr>
+        <p:cNvPr id="1" name=""/>
+        <p:cNvGrpSpPr/>
+        <p:nvPr/>
+      </p:nvGrpSpPr>
+      <p:grpSpPr>
+        <a:xfrm>
+          <a:off x="0" y="0"/>
+          <a:ext cx="0" cy="0"/>
+          <a:chOff x="0" y="0"/>
+          <a:chExt cx="0" cy="0"/>
+        </a:xfrm>
+      </p:grpSpPr>
+      <p:sp>
+        <p:nvSpPr>
           <p:cNvPr id="20" name="Título 19">
             <a:extLst>
               <a:ext uri="{FF2B5EF4-FFF2-40B4-BE49-F238E27FC236}">
@@ -17375,6 +16868,13 @@
   <p:clrMapOvr>
     <a:masterClrMapping/>
   </p:clrMapOvr>
+  <p:timing>
+    <p:tnLst>
+      <p:par>
+        <p:cTn id="1" dur="indefinite" restart="never" nodeType="tmRoot"/>
+      </p:par>
+    </p:tnLst>
+  </p:timing>
 </p:sld>
 </file>
 
@@ -17612,6 +17112,13 @@
   <p:clrMapOvr>
     <a:masterClrMapping/>
   </p:clrMapOvr>
+  <p:timing>
+    <p:tnLst>
+      <p:par>
+        <p:cTn id="1" dur="indefinite" restart="never" nodeType="tmRoot"/>
+      </p:par>
+    </p:tnLst>
+  </p:timing>
 </p:sld>
 </file>
 
@@ -17849,6 +17356,13 @@
   <p:clrMapOvr>
     <a:masterClrMapping/>
   </p:clrMapOvr>
+  <p:timing>
+    <p:tnLst>
+      <p:par>
+        <p:cTn id="1" dur="indefinite" restart="never" nodeType="tmRoot"/>
+      </p:par>
+    </p:tnLst>
+  </p:timing>
 </p:sld>
 </file>
 
@@ -18086,6 +17600,13 @@
   <p:clrMapOvr>
     <a:masterClrMapping/>
   </p:clrMapOvr>
+  <p:timing>
+    <p:tnLst>
+      <p:par>
+        <p:cTn id="1" dur="indefinite" restart="never" nodeType="tmRoot"/>
+      </p:par>
+    </p:tnLst>
+  </p:timing>
 </p:sld>
 </file>
 
@@ -18306,6 +17827,13 @@
   <p:clrMapOvr>
     <a:masterClrMapping/>
   </p:clrMapOvr>
+  <p:timing>
+    <p:tnLst>
+      <p:par>
+        <p:cTn id="1" dur="indefinite" restart="never" nodeType="tmRoot"/>
+      </p:par>
+    </p:tnLst>
+  </p:timing>
 </p:sld>
 </file>
 
@@ -18526,6 +18054,13 @@
   <p:clrMapOvr>
     <a:masterClrMapping/>
   </p:clrMapOvr>
+  <p:timing>
+    <p:tnLst>
+      <p:par>
+        <p:cTn id="1" dur="indefinite" restart="never" nodeType="tmRoot"/>
+      </p:par>
+    </p:tnLst>
+  </p:timing>
 </p:sld>
 </file>
 
@@ -18548,51 +18083,79 @@
       </p:grpSpPr>
       <p:sp>
         <p:nvSpPr>
-          <p:cNvPr id="3" name="Título 2">
-            <a:extLst>
-              <a:ext uri="{FF2B5EF4-FFF2-40B4-BE49-F238E27FC236}">
-                <a16:creationId xmlns:a16="http://schemas.microsoft.com/office/drawing/2014/main" id="{200B3D2B-613A-41BE-987D-E6A1324B456D}"/>
-              </a:ext>
-            </a:extLst>
-          </p:cNvPr>
-          <p:cNvSpPr>
-            <a:spLocks noGrp="1"/>
-          </p:cNvSpPr>
-          <p:nvPr>
-            <p:ph type="ctrTitle"/>
-          </p:nvPr>
-        </p:nvSpPr>
-        <p:spPr>
-          <a:xfrm>
-            <a:off x="0" y="3647191"/>
-            <a:ext cx="7262075" cy="2195386"/>
-          </a:xfrm>
-        </p:spPr>
-        <p:txBody>
-          <a:bodyPr rtlCol="0"/>
-          <a:lstStyle/>
-          <a:p>
-            <a:r>
-              <a:rPr lang="ca-ES" sz="4000" dirty="0"/>
-              <a:t>Control de Posició amb controlador proporcional (</a:t>
-            </a:r>
-            <a:r>
-              <a:rPr lang="ca-ES" sz="4000" dirty="0" err="1"/>
-              <a:t>Kp</a:t>
-            </a:r>
-            <a:r>
-              <a:rPr lang="ca-ES" sz="4000" dirty="0"/>
-              <a:t> baixes)</a:t>
-            </a:r>
-          </a:p>
-        </p:txBody>
-      </p:sp>
-      <p:sp>
-        <p:nvSpPr>
-          <p:cNvPr id="8" name="Rectángulo 7">
-            <a:extLst>
-              <a:ext uri="{FF2B5EF4-FFF2-40B4-BE49-F238E27FC236}">
-                <a16:creationId xmlns:a16="http://schemas.microsoft.com/office/drawing/2014/main" id="{0F2F1659-815F-46D5-B4BA-92407E18AEDC}"/>
+          <p:cNvPr id="2" name="Contenidor de contingut 1">
+            <a:extLst>
+              <a:ext uri="{FF2B5EF4-FFF2-40B4-BE49-F238E27FC236}">
+                <a16:creationId xmlns:a16="http://schemas.microsoft.com/office/drawing/2014/main" id="{90BA015A-20AF-440F-8413-D939C69EAB2F}"/>
+              </a:ext>
+            </a:extLst>
+          </p:cNvPr>
+          <p:cNvSpPr>
+            <a:spLocks noGrp="1"/>
+          </p:cNvSpPr>
+          <p:nvPr>
+            <p:ph sz="half" idx="1"/>
+          </p:nvPr>
+        </p:nvSpPr>
+        <p:spPr>
+          <a:xfrm>
+            <a:off x="3498209" y="1432151"/>
+            <a:ext cx="3367233" cy="1348527"/>
+          </a:xfrm>
+        </p:spPr>
+        <p:txBody>
+          <a:bodyPr/>
+          <a:lstStyle/>
+          <a:p>
+            <a:pPr marL="0" indent="0" algn="just">
+              <a:buNone/>
+            </a:pPr>
+            <a:r>
+              <a:rPr lang="ca-ES" dirty="0"/>
+              <a:t>Connectar el controlador en sèrie amb la planta, d’aquesta manera es minimitza la caiguda de tensió entre les dues.</a:t>
+            </a:r>
+          </a:p>
+        </p:txBody>
+      </p:sp>
+      <p:sp>
+        <p:nvSpPr>
+          <p:cNvPr id="5" name="Títol 4">
+            <a:extLst>
+              <a:ext uri="{FF2B5EF4-FFF2-40B4-BE49-F238E27FC236}">
+                <a16:creationId xmlns:a16="http://schemas.microsoft.com/office/drawing/2014/main" id="{A0961E97-8F98-4B4D-96F2-5C4364E6ACD3}"/>
+              </a:ext>
+            </a:extLst>
+          </p:cNvPr>
+          <p:cNvSpPr>
+            <a:spLocks noGrp="1"/>
+          </p:cNvSpPr>
+          <p:nvPr>
+            <p:ph type="title"/>
+          </p:nvPr>
+        </p:nvSpPr>
+        <p:spPr>
+          <a:xfrm>
+            <a:off x="239053" y="429930"/>
+            <a:ext cx="9131100" cy="432000"/>
+          </a:xfrm>
+        </p:spPr>
+        <p:txBody>
+          <a:bodyPr/>
+          <a:lstStyle/>
+          <a:p>
+            <a:r>
+              <a:rPr lang="ca-ES" dirty="0"/>
+              <a:t>Solució</a:t>
+            </a:r>
+          </a:p>
+        </p:txBody>
+      </p:sp>
+      <p:sp>
+        <p:nvSpPr>
+          <p:cNvPr id="7" name="Rectángulo 9">
+            <a:extLst>
+              <a:ext uri="{FF2B5EF4-FFF2-40B4-BE49-F238E27FC236}">
+                <a16:creationId xmlns:a16="http://schemas.microsoft.com/office/drawing/2014/main" id="{CCB320B0-EB9E-4107-9824-08DC54BF4B4A}"/>
               </a:ext>
             </a:extLst>
           </p:cNvPr>
@@ -18601,8 +18164,8 @@
         </p:nvSpPr>
         <p:spPr>
           <a:xfrm>
-            <a:off x="10071652" y="6175513"/>
-            <a:ext cx="2120348" cy="682487"/>
+            <a:off x="10126980" y="6263640"/>
+            <a:ext cx="2065020" cy="594360"/>
           </a:xfrm>
           <a:prstGeom prst="rect">
             <a:avLst/>
@@ -18635,89 +18198,912 @@
           <a:lstStyle/>
           <a:p>
             <a:pPr algn="ctr"/>
-            <a:endParaRPr lang="es-ES"/>
-          </a:p>
-        </p:txBody>
-      </p:sp>
-      <p:pic>
-        <p:nvPicPr>
-          <p:cNvPr id="10" name="Marcador de posición de imagen 6">
-            <a:extLst>
-              <a:ext uri="{FF2B5EF4-FFF2-40B4-BE49-F238E27FC236}">
-                <a16:creationId xmlns:a16="http://schemas.microsoft.com/office/drawing/2014/main" id="{A0CB8A26-6A12-4725-927A-D6238DB830E9}"/>
-              </a:ext>
-            </a:extLst>
-          </p:cNvPr>
-          <p:cNvPicPr>
-            <a:picLocks noChangeAspect="1"/>
-          </p:cNvPicPr>
+            <a:endParaRPr lang="es-ES" dirty="0"/>
+          </a:p>
+        </p:txBody>
+      </p:sp>
+      <p:sp>
+        <p:nvSpPr>
+          <p:cNvPr id="8" name="Rectangle 7">
+            <a:extLst>
+              <a:ext uri="{FF2B5EF4-FFF2-40B4-BE49-F238E27FC236}">
+                <a16:creationId xmlns:a16="http://schemas.microsoft.com/office/drawing/2014/main" id="{9F545665-EC68-4BA4-B0EB-25C447D7BC7C}"/>
+              </a:ext>
+            </a:extLst>
+          </p:cNvPr>
+          <p:cNvSpPr/>
           <p:nvPr/>
-        </p:nvPicPr>
-        <p:blipFill rotWithShape="1">
-          <a:blip r:embed="rId3"/>
-          <a:srcRect l="70582" t="3209" r="3840" b="2716"/>
-          <a:stretch/>
-        </p:blipFill>
-        <p:spPr>
-          <a:xfrm>
-            <a:off x="9804400" y="0"/>
-            <a:ext cx="2387601" cy="6858000"/>
+        </p:nvSpPr>
+        <p:spPr>
+          <a:xfrm>
+            <a:off x="1509667" y="3489120"/>
+            <a:ext cx="2407640" cy="432000"/>
           </a:xfrm>
           <a:prstGeom prst="rect">
             <a:avLst/>
           </a:prstGeom>
-        </p:spPr>
-      </p:pic>
-      <p:sp>
-        <p:nvSpPr>
-          <p:cNvPr id="9" name="Subtítulo 3">
-            <a:extLst>
-              <a:ext uri="{FF2B5EF4-FFF2-40B4-BE49-F238E27FC236}">
-                <a16:creationId xmlns:a16="http://schemas.microsoft.com/office/drawing/2014/main" id="{C23E924E-4905-4260-BAD0-E8A52F9195E5}"/>
-              </a:ext>
-            </a:extLst>
-          </p:cNvPr>
-          <p:cNvSpPr>
-            <a:spLocks noGrp="1"/>
-          </p:cNvSpPr>
-          <p:nvPr>
-            <p:ph type="subTitle" idx="1"/>
-          </p:nvPr>
-        </p:nvSpPr>
-        <p:spPr>
-          <a:xfrm>
-            <a:off x="7606747" y="4026716"/>
-            <a:ext cx="3126409" cy="1815861"/>
-          </a:xfrm>
+          <a:solidFill>
+            <a:schemeClr val="tx1"/>
+          </a:solidFill>
+          <a:ln>
+            <a:noFill/>
+          </a:ln>
+        </p:spPr>
+        <p:style>
+          <a:lnRef idx="2">
+            <a:schemeClr val="accent1">
+              <a:shade val="50000"/>
+            </a:schemeClr>
+          </a:lnRef>
+          <a:fillRef idx="1">
+            <a:schemeClr val="accent1"/>
+          </a:fillRef>
+          <a:effectRef idx="0">
+            <a:schemeClr val="accent1"/>
+          </a:effectRef>
+          <a:fontRef idx="minor">
+            <a:schemeClr val="lt1"/>
+          </a:fontRef>
+        </p:style>
+        <p:txBody>
+          <a:bodyPr rtlCol="0" anchor="ctr"/>
+          <a:lstStyle/>
+          <a:p>
+            <a:pPr algn="ctr"/>
+            <a:r>
+              <a:rPr lang="ca-ES" dirty="0"/>
+              <a:t>PSU</a:t>
+            </a:r>
+          </a:p>
+        </p:txBody>
+      </p:sp>
+      <p:sp>
+        <p:nvSpPr>
+          <p:cNvPr id="10" name="Rectangle 9">
+            <a:extLst>
+              <a:ext uri="{FF2B5EF4-FFF2-40B4-BE49-F238E27FC236}">
+                <a16:creationId xmlns:a16="http://schemas.microsoft.com/office/drawing/2014/main" id="{E24F5ABF-F6D7-4838-B463-AC9B89950576}"/>
+              </a:ext>
+            </a:extLst>
+          </p:cNvPr>
+          <p:cNvSpPr/>
+          <p:nvPr/>
+        </p:nvSpPr>
+        <p:spPr>
+          <a:xfrm>
+            <a:off x="750463" y="4778695"/>
+            <a:ext cx="1518407" cy="591489"/>
+          </a:xfrm>
+          <a:prstGeom prst="rect">
+            <a:avLst/>
+          </a:prstGeom>
+          <a:solidFill>
+            <a:schemeClr val="tx1"/>
+          </a:solidFill>
+          <a:ln>
+            <a:noFill/>
+          </a:ln>
+        </p:spPr>
+        <p:style>
+          <a:lnRef idx="2">
+            <a:schemeClr val="accent1">
+              <a:shade val="50000"/>
+            </a:schemeClr>
+          </a:lnRef>
+          <a:fillRef idx="1">
+            <a:schemeClr val="accent1"/>
+          </a:fillRef>
+          <a:effectRef idx="0">
+            <a:schemeClr val="accent1"/>
+          </a:effectRef>
+          <a:fontRef idx="minor">
+            <a:schemeClr val="lt1"/>
+          </a:fontRef>
+        </p:style>
+        <p:txBody>
+          <a:bodyPr rtlCol="0" anchor="ctr"/>
+          <a:lstStyle/>
+          <a:p>
+            <a:pPr algn="ctr"/>
+            <a:r>
+              <a:rPr lang="ca-ES" dirty="0"/>
+              <a:t>Planta</a:t>
+            </a:r>
+          </a:p>
+        </p:txBody>
+      </p:sp>
+      <p:sp>
+        <p:nvSpPr>
+          <p:cNvPr id="12" name="Rectangle 11">
+            <a:extLst>
+              <a:ext uri="{FF2B5EF4-FFF2-40B4-BE49-F238E27FC236}">
+                <a16:creationId xmlns:a16="http://schemas.microsoft.com/office/drawing/2014/main" id="{D08595CC-484E-4875-86FF-D80660D40F3A}"/>
+              </a:ext>
+            </a:extLst>
+          </p:cNvPr>
+          <p:cNvSpPr/>
+          <p:nvPr/>
+        </p:nvSpPr>
+        <p:spPr>
+          <a:xfrm>
+            <a:off x="3158103" y="4778695"/>
+            <a:ext cx="1518408" cy="591490"/>
+          </a:xfrm>
+          <a:prstGeom prst="rect">
+            <a:avLst/>
+          </a:prstGeom>
+          <a:solidFill>
+            <a:schemeClr val="tx1"/>
+          </a:solidFill>
+          <a:ln>
+            <a:noFill/>
+          </a:ln>
+        </p:spPr>
+        <p:style>
+          <a:lnRef idx="2">
+            <a:schemeClr val="accent1">
+              <a:shade val="50000"/>
+            </a:schemeClr>
+          </a:lnRef>
+          <a:fillRef idx="1">
+            <a:schemeClr val="accent1"/>
+          </a:fillRef>
+          <a:effectRef idx="0">
+            <a:schemeClr val="accent1"/>
+          </a:effectRef>
+          <a:fontRef idx="minor">
+            <a:schemeClr val="lt1"/>
+          </a:fontRef>
+        </p:style>
+        <p:txBody>
+          <a:bodyPr rtlCol="0" anchor="ctr"/>
+          <a:lstStyle/>
+          <a:p>
+            <a:pPr algn="ctr"/>
+            <a:r>
+              <a:rPr lang="ca-ES" dirty="0"/>
+              <a:t>Controlador</a:t>
+            </a:r>
+          </a:p>
+        </p:txBody>
+      </p:sp>
+      <p:cxnSp>
+        <p:nvCxnSpPr>
+          <p:cNvPr id="14" name="Connector: angular 13">
+            <a:extLst>
+              <a:ext uri="{FF2B5EF4-FFF2-40B4-BE49-F238E27FC236}">
+                <a16:creationId xmlns:a16="http://schemas.microsoft.com/office/drawing/2014/main" id="{50D5D9D9-24F3-447D-8A65-53A73A440240}"/>
+              </a:ext>
+            </a:extLst>
+          </p:cNvPr>
+          <p:cNvCxnSpPr>
+            <a:stCxn id="8" idx="1"/>
+            <a:endCxn id="10" idx="0"/>
+          </p:cNvCxnSpPr>
+          <p:nvPr/>
+        </p:nvCxnSpPr>
+        <p:spPr>
+          <a:xfrm rot="10800000" flipV="1">
+            <a:off x="1509667" y="3705119"/>
+            <a:ext cx="12700" cy="1073575"/>
+          </a:xfrm>
+          <a:prstGeom prst="bentConnector4">
+            <a:avLst>
+              <a:gd name="adj1" fmla="val 115598"/>
+              <a:gd name="adj2" fmla="val 60060"/>
+            </a:avLst>
+          </a:prstGeom>
+          <a:ln w="57150">
+            <a:solidFill>
+              <a:srgbClr val="FF0000"/>
+            </a:solidFill>
+            <a:tailEnd type="triangle"/>
+          </a:ln>
+        </p:spPr>
+        <p:style>
+          <a:lnRef idx="1">
+            <a:schemeClr val="accent3"/>
+          </a:lnRef>
+          <a:fillRef idx="0">
+            <a:schemeClr val="accent3"/>
+          </a:fillRef>
+          <a:effectRef idx="0">
+            <a:schemeClr val="accent3"/>
+          </a:effectRef>
+          <a:fontRef idx="minor">
+            <a:schemeClr val="tx1"/>
+          </a:fontRef>
+        </p:style>
+      </p:cxnSp>
+      <p:cxnSp>
+        <p:nvCxnSpPr>
+          <p:cNvPr id="17" name="Connector de fletxa recta 16">
+            <a:extLst>
+              <a:ext uri="{FF2B5EF4-FFF2-40B4-BE49-F238E27FC236}">
+                <a16:creationId xmlns:a16="http://schemas.microsoft.com/office/drawing/2014/main" id="{97F0F599-B794-4006-BEBA-5DFCFB43AB09}"/>
+              </a:ext>
+            </a:extLst>
+          </p:cNvPr>
+          <p:cNvCxnSpPr>
+            <a:stCxn id="8" idx="3"/>
+            <a:endCxn id="12" idx="0"/>
+          </p:cNvCxnSpPr>
+          <p:nvPr/>
+        </p:nvCxnSpPr>
+        <p:spPr>
+          <a:xfrm>
+            <a:off x="3917307" y="3705120"/>
+            <a:ext cx="0" cy="1073575"/>
+          </a:xfrm>
+          <a:prstGeom prst="straightConnector1">
+            <a:avLst/>
+          </a:prstGeom>
           <a:ln w="12700">
             <a:solidFill>
-              <a:schemeClr val="tx1"/>
+              <a:srgbClr val="FF0000"/>
             </a:solidFill>
+            <a:tailEnd type="triangle"/>
           </a:ln>
         </p:spPr>
-        <p:txBody>
-          <a:bodyPr rtlCol="0"/>
-          <a:lstStyle/>
-          <a:p>
-            <a:pPr algn="ctr" rtl="0"/>
-            <a:r>
-              <a:rPr lang="es-ES" sz="4000" dirty="0"/>
-              <a:t>Extra</a:t>
-            </a:r>
-            <a:endParaRPr lang="es-ES" dirty="0"/>
+        <p:style>
+          <a:lnRef idx="1">
+            <a:schemeClr val="accent3"/>
+          </a:lnRef>
+          <a:fillRef idx="0">
+            <a:schemeClr val="accent3"/>
+          </a:fillRef>
+          <a:effectRef idx="0">
+            <a:schemeClr val="accent3"/>
+          </a:effectRef>
+          <a:fontRef idx="minor">
+            <a:schemeClr val="tx1"/>
+          </a:fontRef>
+        </p:style>
+      </p:cxnSp>
+      <p:cxnSp>
+        <p:nvCxnSpPr>
+          <p:cNvPr id="19" name="Connector de fletxa recta 18">
+            <a:extLst>
+              <a:ext uri="{FF2B5EF4-FFF2-40B4-BE49-F238E27FC236}">
+                <a16:creationId xmlns:a16="http://schemas.microsoft.com/office/drawing/2014/main" id="{95CFFC38-A58F-469B-A73C-B4F968869E35}"/>
+              </a:ext>
+            </a:extLst>
+          </p:cNvPr>
+          <p:cNvCxnSpPr>
+            <a:stCxn id="10" idx="3"/>
+            <a:endCxn id="12" idx="1"/>
+          </p:cNvCxnSpPr>
+          <p:nvPr/>
+        </p:nvCxnSpPr>
+        <p:spPr>
+          <a:xfrm>
+            <a:off x="2268870" y="5074440"/>
+            <a:ext cx="889233" cy="0"/>
+          </a:xfrm>
+          <a:prstGeom prst="straightConnector1">
+            <a:avLst/>
+          </a:prstGeom>
+          <a:ln w="12700">
+            <a:prstDash val="lgDash"/>
+            <a:headEnd type="arrow" w="med" len="med"/>
+            <a:tailEnd type="arrow" w="med" len="med"/>
+          </a:ln>
+        </p:spPr>
+        <p:style>
+          <a:lnRef idx="1">
+            <a:schemeClr val="accent5"/>
+          </a:lnRef>
+          <a:fillRef idx="0">
+            <a:schemeClr val="accent5"/>
+          </a:fillRef>
+          <a:effectRef idx="0">
+            <a:schemeClr val="accent5"/>
+          </a:effectRef>
+          <a:fontRef idx="minor">
+            <a:schemeClr val="tx1"/>
+          </a:fontRef>
+        </p:style>
+      </p:cxnSp>
+      <p:sp>
+        <p:nvSpPr>
+          <p:cNvPr id="20" name="Rectangle 19">
+            <a:extLst>
+              <a:ext uri="{FF2B5EF4-FFF2-40B4-BE49-F238E27FC236}">
+                <a16:creationId xmlns:a16="http://schemas.microsoft.com/office/drawing/2014/main" id="{00DD195A-CF89-408E-9154-999B747713E4}"/>
+              </a:ext>
+            </a:extLst>
+          </p:cNvPr>
+          <p:cNvSpPr/>
+          <p:nvPr/>
+        </p:nvSpPr>
+        <p:spPr>
+          <a:xfrm>
+            <a:off x="6396256" y="3489121"/>
+            <a:ext cx="2407640" cy="432000"/>
+          </a:xfrm>
+          <a:prstGeom prst="rect">
+            <a:avLst/>
+          </a:prstGeom>
+          <a:solidFill>
+            <a:schemeClr val="tx1"/>
+          </a:solidFill>
+          <a:ln>
+            <a:noFill/>
+          </a:ln>
+        </p:spPr>
+        <p:style>
+          <a:lnRef idx="2">
+            <a:schemeClr val="accent1">
+              <a:shade val="50000"/>
+            </a:schemeClr>
+          </a:lnRef>
+          <a:fillRef idx="1">
+            <a:schemeClr val="accent1"/>
+          </a:fillRef>
+          <a:effectRef idx="0">
+            <a:schemeClr val="accent1"/>
+          </a:effectRef>
+          <a:fontRef idx="minor">
+            <a:schemeClr val="lt1"/>
+          </a:fontRef>
+        </p:style>
+        <p:txBody>
+          <a:bodyPr rtlCol="0" anchor="ctr"/>
+          <a:lstStyle/>
+          <a:p>
+            <a:pPr algn="ctr"/>
+            <a:r>
+              <a:rPr lang="ca-ES" dirty="0"/>
+              <a:t>PSU</a:t>
+            </a:r>
+          </a:p>
+        </p:txBody>
+      </p:sp>
+      <p:sp>
+        <p:nvSpPr>
+          <p:cNvPr id="21" name="Rectangle 20">
+            <a:extLst>
+              <a:ext uri="{FF2B5EF4-FFF2-40B4-BE49-F238E27FC236}">
+                <a16:creationId xmlns:a16="http://schemas.microsoft.com/office/drawing/2014/main" id="{7391B80E-350D-453E-9342-D8B70DF35DF6}"/>
+              </a:ext>
+            </a:extLst>
+          </p:cNvPr>
+          <p:cNvSpPr/>
+          <p:nvPr/>
+        </p:nvSpPr>
+        <p:spPr>
+          <a:xfrm>
+            <a:off x="5637052" y="4778696"/>
+            <a:ext cx="1518407" cy="591489"/>
+          </a:xfrm>
+          <a:prstGeom prst="rect">
+            <a:avLst/>
+          </a:prstGeom>
+          <a:solidFill>
+            <a:schemeClr val="tx1"/>
+          </a:solidFill>
+          <a:ln>
+            <a:noFill/>
+          </a:ln>
+        </p:spPr>
+        <p:style>
+          <a:lnRef idx="2">
+            <a:schemeClr val="accent1">
+              <a:shade val="50000"/>
+            </a:schemeClr>
+          </a:lnRef>
+          <a:fillRef idx="1">
+            <a:schemeClr val="accent1"/>
+          </a:fillRef>
+          <a:effectRef idx="0">
+            <a:schemeClr val="accent1"/>
+          </a:effectRef>
+          <a:fontRef idx="minor">
+            <a:schemeClr val="lt1"/>
+          </a:fontRef>
+        </p:style>
+        <p:txBody>
+          <a:bodyPr rtlCol="0" anchor="ctr"/>
+          <a:lstStyle/>
+          <a:p>
+            <a:pPr algn="ctr"/>
+            <a:r>
+              <a:rPr lang="ca-ES" dirty="0"/>
+              <a:t>Planta</a:t>
+            </a:r>
+          </a:p>
+        </p:txBody>
+      </p:sp>
+      <p:sp>
+        <p:nvSpPr>
+          <p:cNvPr id="22" name="Rectangle 21">
+            <a:extLst>
+              <a:ext uri="{FF2B5EF4-FFF2-40B4-BE49-F238E27FC236}">
+                <a16:creationId xmlns:a16="http://schemas.microsoft.com/office/drawing/2014/main" id="{154211AB-44F6-4DB0-80B6-398AEE97FA17}"/>
+              </a:ext>
+            </a:extLst>
+          </p:cNvPr>
+          <p:cNvSpPr/>
+          <p:nvPr/>
+        </p:nvSpPr>
+        <p:spPr>
+          <a:xfrm>
+            <a:off x="8044692" y="4778696"/>
+            <a:ext cx="1518408" cy="591490"/>
+          </a:xfrm>
+          <a:prstGeom prst="rect">
+            <a:avLst/>
+          </a:prstGeom>
+          <a:solidFill>
+            <a:schemeClr val="tx1"/>
+          </a:solidFill>
+          <a:ln>
+            <a:noFill/>
+          </a:ln>
+        </p:spPr>
+        <p:style>
+          <a:lnRef idx="2">
+            <a:schemeClr val="accent1">
+              <a:shade val="50000"/>
+            </a:schemeClr>
+          </a:lnRef>
+          <a:fillRef idx="1">
+            <a:schemeClr val="accent1"/>
+          </a:fillRef>
+          <a:effectRef idx="0">
+            <a:schemeClr val="accent1"/>
+          </a:effectRef>
+          <a:fontRef idx="minor">
+            <a:schemeClr val="lt1"/>
+          </a:fontRef>
+        </p:style>
+        <p:txBody>
+          <a:bodyPr rtlCol="0" anchor="ctr"/>
+          <a:lstStyle/>
+          <a:p>
+            <a:pPr algn="ctr"/>
+            <a:r>
+              <a:rPr lang="ca-ES" dirty="0"/>
+              <a:t>Controlador</a:t>
+            </a:r>
+          </a:p>
+        </p:txBody>
+      </p:sp>
+      <p:cxnSp>
+        <p:nvCxnSpPr>
+          <p:cNvPr id="23" name="Connector: angular 22">
+            <a:extLst>
+              <a:ext uri="{FF2B5EF4-FFF2-40B4-BE49-F238E27FC236}">
+                <a16:creationId xmlns:a16="http://schemas.microsoft.com/office/drawing/2014/main" id="{AA8E9B61-A204-4900-9D57-798EFA0CFD6C}"/>
+              </a:ext>
+            </a:extLst>
+          </p:cNvPr>
+          <p:cNvCxnSpPr>
+            <a:stCxn id="20" idx="1"/>
+            <a:endCxn id="21" idx="0"/>
+          </p:cNvCxnSpPr>
+          <p:nvPr/>
+        </p:nvCxnSpPr>
+        <p:spPr>
+          <a:xfrm rot="10800000" flipV="1">
+            <a:off x="6396256" y="3705120"/>
+            <a:ext cx="12700" cy="1073575"/>
+          </a:xfrm>
+          <a:prstGeom prst="bentConnector4">
+            <a:avLst>
+              <a:gd name="adj1" fmla="val 115598"/>
+              <a:gd name="adj2" fmla="val 60060"/>
+            </a:avLst>
+          </a:prstGeom>
+          <a:ln w="57150">
+            <a:solidFill>
+              <a:srgbClr val="FF0000"/>
+            </a:solidFill>
+            <a:tailEnd type="triangle"/>
+          </a:ln>
+        </p:spPr>
+        <p:style>
+          <a:lnRef idx="1">
+            <a:schemeClr val="accent3"/>
+          </a:lnRef>
+          <a:fillRef idx="0">
+            <a:schemeClr val="accent3"/>
+          </a:fillRef>
+          <a:effectRef idx="0">
+            <a:schemeClr val="accent3"/>
+          </a:effectRef>
+          <a:fontRef idx="minor">
+            <a:schemeClr val="tx1"/>
+          </a:fontRef>
+        </p:style>
+      </p:cxnSp>
+      <p:cxnSp>
+        <p:nvCxnSpPr>
+          <p:cNvPr id="25" name="Connector de fletxa recta 24">
+            <a:extLst>
+              <a:ext uri="{FF2B5EF4-FFF2-40B4-BE49-F238E27FC236}">
+                <a16:creationId xmlns:a16="http://schemas.microsoft.com/office/drawing/2014/main" id="{AF936376-277B-4A30-A653-86B47528BE8F}"/>
+              </a:ext>
+            </a:extLst>
+          </p:cNvPr>
+          <p:cNvCxnSpPr>
+            <a:cxnSpLocks/>
+          </p:cNvCxnSpPr>
+          <p:nvPr/>
+        </p:nvCxnSpPr>
+        <p:spPr>
+          <a:xfrm>
+            <a:off x="7155459" y="5208665"/>
+            <a:ext cx="889233" cy="0"/>
+          </a:xfrm>
+          <a:prstGeom prst="straightConnector1">
+            <a:avLst/>
+          </a:prstGeom>
+          <a:ln w="12700">
+            <a:prstDash val="lgDash"/>
+            <a:headEnd type="arrow" w="med" len="med"/>
+            <a:tailEnd type="arrow" w="med" len="med"/>
+          </a:ln>
+        </p:spPr>
+        <p:style>
+          <a:lnRef idx="1">
+            <a:schemeClr val="accent5"/>
+          </a:lnRef>
+          <a:fillRef idx="0">
+            <a:schemeClr val="accent5"/>
+          </a:fillRef>
+          <a:effectRef idx="0">
+            <a:schemeClr val="accent5"/>
+          </a:effectRef>
+          <a:fontRef idx="minor">
+            <a:schemeClr val="tx1"/>
+          </a:fontRef>
+        </p:style>
+      </p:cxnSp>
+      <p:cxnSp>
+        <p:nvCxnSpPr>
+          <p:cNvPr id="28" name="Connector de fletxa recta 27">
+            <a:extLst>
+              <a:ext uri="{FF2B5EF4-FFF2-40B4-BE49-F238E27FC236}">
+                <a16:creationId xmlns:a16="http://schemas.microsoft.com/office/drawing/2014/main" id="{2282E0B7-084C-4638-BDF5-9D4FF2885916}"/>
+              </a:ext>
+            </a:extLst>
+          </p:cNvPr>
+          <p:cNvCxnSpPr>
+            <a:cxnSpLocks/>
+          </p:cNvCxnSpPr>
+          <p:nvPr/>
+        </p:nvCxnSpPr>
+        <p:spPr>
+          <a:xfrm>
+            <a:off x="7155459" y="4966783"/>
+            <a:ext cx="889233" cy="0"/>
+          </a:xfrm>
+          <a:prstGeom prst="straightConnector1">
+            <a:avLst/>
+          </a:prstGeom>
+          <a:ln w="12700">
+            <a:solidFill>
+              <a:srgbClr val="FF0000"/>
+            </a:solidFill>
+            <a:headEnd type="none" w="med" len="med"/>
+            <a:tailEnd type="triangle" w="med" len="med"/>
+          </a:ln>
+        </p:spPr>
+        <p:style>
+          <a:lnRef idx="1">
+            <a:schemeClr val="accent5"/>
+          </a:lnRef>
+          <a:fillRef idx="0">
+            <a:schemeClr val="accent5"/>
+          </a:fillRef>
+          <a:effectRef idx="0">
+            <a:schemeClr val="accent5"/>
+          </a:effectRef>
+          <a:fontRef idx="minor">
+            <a:schemeClr val="tx1"/>
+          </a:fontRef>
+        </p:style>
+      </p:cxnSp>
+      <p:sp>
+        <p:nvSpPr>
+          <p:cNvPr id="30" name="QuadreDeText 29">
+            <a:extLst>
+              <a:ext uri="{FF2B5EF4-FFF2-40B4-BE49-F238E27FC236}">
+                <a16:creationId xmlns:a16="http://schemas.microsoft.com/office/drawing/2014/main" id="{4621B3ED-B916-4C18-B5DB-52C576E5C2CA}"/>
+              </a:ext>
+            </a:extLst>
+          </p:cNvPr>
+          <p:cNvSpPr txBox="1"/>
+          <p:nvPr/>
+        </p:nvSpPr>
+        <p:spPr>
+          <a:xfrm>
+            <a:off x="5444691" y="4044899"/>
+            <a:ext cx="864066" cy="338554"/>
+          </a:xfrm>
+          <a:prstGeom prst="rect">
+            <a:avLst/>
+          </a:prstGeom>
+          <a:noFill/>
+        </p:spPr>
+        <p:txBody>
+          <a:bodyPr wrap="square" rtlCol="0">
+            <a:spAutoFit/>
+          </a:bodyPr>
+          <a:lstStyle/>
+          <a:p>
+            <a:r>
+              <a:rPr lang="el-GR" sz="1600" dirty="0">
+                <a:solidFill>
+                  <a:srgbClr val="FF0000"/>
+                </a:solidFill>
+              </a:rPr>
+              <a:t>Δ</a:t>
+            </a:r>
+            <a:r>
+              <a:rPr lang="ca-ES" sz="1600" dirty="0">
+                <a:solidFill>
+                  <a:srgbClr val="FF0000"/>
+                </a:solidFill>
+              </a:rPr>
+              <a:t>V &gt; 0</a:t>
+            </a:r>
+          </a:p>
+        </p:txBody>
+      </p:sp>
+      <p:sp>
+        <p:nvSpPr>
+          <p:cNvPr id="31" name="QuadreDeText 30">
+            <a:extLst>
+              <a:ext uri="{FF2B5EF4-FFF2-40B4-BE49-F238E27FC236}">
+                <a16:creationId xmlns:a16="http://schemas.microsoft.com/office/drawing/2014/main" id="{953D5F51-6C03-4369-AD1D-66488BCA17B2}"/>
+              </a:ext>
+            </a:extLst>
+          </p:cNvPr>
+          <p:cNvSpPr txBox="1"/>
+          <p:nvPr/>
+        </p:nvSpPr>
+        <p:spPr>
+          <a:xfrm>
+            <a:off x="4004806" y="4050375"/>
+            <a:ext cx="864066" cy="338554"/>
+          </a:xfrm>
+          <a:prstGeom prst="rect">
+            <a:avLst/>
+          </a:prstGeom>
+          <a:noFill/>
+        </p:spPr>
+        <p:txBody>
+          <a:bodyPr wrap="square" rtlCol="0">
+            <a:spAutoFit/>
+          </a:bodyPr>
+          <a:lstStyle/>
+          <a:p>
+            <a:r>
+              <a:rPr lang="el-GR" sz="1600" dirty="0">
+                <a:solidFill>
+                  <a:srgbClr val="FF0000"/>
+                </a:solidFill>
+              </a:rPr>
+              <a:t>Δ</a:t>
+            </a:r>
+            <a:r>
+              <a:rPr lang="ca-ES" sz="1600" dirty="0">
+                <a:solidFill>
+                  <a:srgbClr val="FF0000"/>
+                </a:solidFill>
+              </a:rPr>
+              <a:t>V ≈ 0</a:t>
+            </a:r>
+          </a:p>
+        </p:txBody>
+      </p:sp>
+      <p:sp>
+        <p:nvSpPr>
+          <p:cNvPr id="32" name="QuadreDeText 31">
+            <a:extLst>
+              <a:ext uri="{FF2B5EF4-FFF2-40B4-BE49-F238E27FC236}">
+                <a16:creationId xmlns:a16="http://schemas.microsoft.com/office/drawing/2014/main" id="{142C49B8-1914-4AFA-8AF0-D3C5E9C71A64}"/>
+              </a:ext>
+            </a:extLst>
+          </p:cNvPr>
+          <p:cNvSpPr txBox="1"/>
+          <p:nvPr/>
+        </p:nvSpPr>
+        <p:spPr>
+          <a:xfrm>
+            <a:off x="2329807" y="4710337"/>
+            <a:ext cx="864066" cy="338554"/>
+          </a:xfrm>
+          <a:prstGeom prst="rect">
+            <a:avLst/>
+          </a:prstGeom>
+          <a:noFill/>
+        </p:spPr>
+        <p:txBody>
+          <a:bodyPr wrap="square" rtlCol="0">
+            <a:spAutoFit/>
+          </a:bodyPr>
+          <a:lstStyle/>
+          <a:p>
+            <a:r>
+              <a:rPr lang="el-GR" sz="1600" dirty="0">
+                <a:solidFill>
+                  <a:schemeClr val="accent5"/>
+                </a:solidFill>
+              </a:rPr>
+              <a:t>Δ</a:t>
+            </a:r>
+            <a:r>
+              <a:rPr lang="ca-ES" sz="1600" dirty="0">
+                <a:solidFill>
+                  <a:schemeClr val="accent5"/>
+                </a:solidFill>
+              </a:rPr>
+              <a:t>V &gt; 0</a:t>
+            </a:r>
+          </a:p>
+        </p:txBody>
+      </p:sp>
+      <p:sp>
+        <p:nvSpPr>
+          <p:cNvPr id="33" name="QuadreDeText 32">
+            <a:extLst>
+              <a:ext uri="{FF2B5EF4-FFF2-40B4-BE49-F238E27FC236}">
+                <a16:creationId xmlns:a16="http://schemas.microsoft.com/office/drawing/2014/main" id="{649DDD5A-6C9B-4CBF-A025-C91C63CE5FEF}"/>
+              </a:ext>
+            </a:extLst>
+          </p:cNvPr>
+          <p:cNvSpPr txBox="1"/>
+          <p:nvPr/>
+        </p:nvSpPr>
+        <p:spPr>
+          <a:xfrm>
+            <a:off x="7168042" y="5305337"/>
+            <a:ext cx="864066" cy="338554"/>
+          </a:xfrm>
+          <a:prstGeom prst="rect">
+            <a:avLst/>
+          </a:prstGeom>
+          <a:noFill/>
+        </p:spPr>
+        <p:txBody>
+          <a:bodyPr wrap="square" rtlCol="0">
+            <a:spAutoFit/>
+          </a:bodyPr>
+          <a:lstStyle/>
+          <a:p>
+            <a:r>
+              <a:rPr lang="el-GR" sz="1600" dirty="0">
+                <a:solidFill>
+                  <a:schemeClr val="accent5"/>
+                </a:solidFill>
+              </a:rPr>
+              <a:t>Δ</a:t>
+            </a:r>
+            <a:r>
+              <a:rPr lang="ca-ES" sz="1600" dirty="0">
+                <a:solidFill>
+                  <a:schemeClr val="accent5"/>
+                </a:solidFill>
+              </a:rPr>
+              <a:t>V ≈ 0</a:t>
+            </a:r>
+          </a:p>
+        </p:txBody>
+      </p:sp>
+      <p:sp>
+        <p:nvSpPr>
+          <p:cNvPr id="34" name="QuadreDeText 33">
+            <a:extLst>
+              <a:ext uri="{FF2B5EF4-FFF2-40B4-BE49-F238E27FC236}">
+                <a16:creationId xmlns:a16="http://schemas.microsoft.com/office/drawing/2014/main" id="{E1112745-3CFD-4033-9E3B-DAAAAE35BB52}"/>
+              </a:ext>
+            </a:extLst>
+          </p:cNvPr>
+          <p:cNvSpPr txBox="1"/>
+          <p:nvPr/>
+        </p:nvSpPr>
+        <p:spPr>
+          <a:xfrm>
+            <a:off x="785124" y="4225029"/>
+            <a:ext cx="864066" cy="338554"/>
+          </a:xfrm>
+          <a:prstGeom prst="rect">
+            <a:avLst/>
+          </a:prstGeom>
+          <a:noFill/>
+        </p:spPr>
+        <p:txBody>
+          <a:bodyPr wrap="square" rtlCol="0">
+            <a:spAutoFit/>
+          </a:bodyPr>
+          <a:lstStyle/>
+          <a:p>
+            <a:r>
+              <a:rPr lang="el-GR" sz="1600" dirty="0">
+                <a:solidFill>
+                  <a:srgbClr val="FF0000"/>
+                </a:solidFill>
+              </a:rPr>
+              <a:t>Δ</a:t>
+            </a:r>
+            <a:r>
+              <a:rPr lang="ca-ES" sz="1600" dirty="0">
+                <a:solidFill>
+                  <a:srgbClr val="FF0000"/>
+                </a:solidFill>
+              </a:rPr>
+              <a:t>V &gt; 0</a:t>
+            </a:r>
+          </a:p>
+        </p:txBody>
+      </p:sp>
+      <p:sp>
+        <p:nvSpPr>
+          <p:cNvPr id="35" name="QuadreDeText 34">
+            <a:extLst>
+              <a:ext uri="{FF2B5EF4-FFF2-40B4-BE49-F238E27FC236}">
+                <a16:creationId xmlns:a16="http://schemas.microsoft.com/office/drawing/2014/main" id="{0D3393E5-1026-40AF-ADA1-FED7E61C124C}"/>
+              </a:ext>
+            </a:extLst>
+          </p:cNvPr>
+          <p:cNvSpPr txBox="1"/>
+          <p:nvPr/>
+        </p:nvSpPr>
+        <p:spPr>
+          <a:xfrm>
+            <a:off x="7168042" y="4579894"/>
+            <a:ext cx="864066" cy="338554"/>
+          </a:xfrm>
+          <a:prstGeom prst="rect">
+            <a:avLst/>
+          </a:prstGeom>
+          <a:noFill/>
+        </p:spPr>
+        <p:txBody>
+          <a:bodyPr wrap="square" rtlCol="0">
+            <a:spAutoFit/>
+          </a:bodyPr>
+          <a:lstStyle/>
+          <a:p>
+            <a:r>
+              <a:rPr lang="el-GR" sz="1600" dirty="0">
+                <a:solidFill>
+                  <a:srgbClr val="FF0000"/>
+                </a:solidFill>
+              </a:rPr>
+              <a:t>Δ</a:t>
+            </a:r>
+            <a:r>
+              <a:rPr lang="ca-ES" sz="1600" dirty="0">
+                <a:solidFill>
+                  <a:srgbClr val="FF0000"/>
+                </a:solidFill>
+              </a:rPr>
+              <a:t>V ≈ 0</a:t>
+            </a:r>
           </a:p>
         </p:txBody>
       </p:sp>
     </p:spTree>
     <p:extLst>
       <p:ext uri="{BB962C8B-B14F-4D97-AF65-F5344CB8AC3E}">
-        <p14:creationId xmlns:p14="http://schemas.microsoft.com/office/powerpoint/2010/main" val="953185911"/>
+        <p14:creationId xmlns:p14="http://schemas.microsoft.com/office/powerpoint/2010/main" val="4193717302"/>
       </p:ext>
     </p:extLst>
   </p:cSld>
   <p:clrMapOvr>
     <a:masterClrMapping/>
   </p:clrMapOvr>
+  <p:timing>
+    <p:tnLst>
+      <p:par>
+        <p:cTn id="1" dur="indefinite" restart="never" nodeType="tmRoot"/>
+      </p:par>
+    </p:tnLst>
+  </p:timing>
 </p:sld>
 </file>
 
@@ -19754,21 +20140,21 @@
 </file>
 
 <file path=customXml/item2.xml><?xml version="1.0" encoding="utf-8"?>
+<p:properties xmlns:p="http://schemas.microsoft.com/office/2006/metadata/properties" xmlns:xsi="http://www.w3.org/2001/XMLSchema-instance" xmlns:pc="http://schemas.microsoft.com/office/infopath/2007/PartnerControls">
+  <documentManagement>
+    <_ip_UnifiedCompliancePolicyUIAction xmlns="http://schemas.microsoft.com/sharepoint/v3" xsi:nil="true"/>
+    <_ip_UnifiedCompliancePolicyProperties xmlns="http://schemas.microsoft.com/sharepoint/v3" xsi:nil="true"/>
+  </documentManagement>
+</p:properties>
+</file>
+
+<file path=customXml/item3.xml><?xml version="1.0" encoding="utf-8"?>
 <?mso-contentType ?>
 <FormTemplates xmlns="http://schemas.microsoft.com/sharepoint/v3/contenttype/forms">
   <Display>DocumentLibraryForm</Display>
   <Edit>DocumentLibraryForm</Edit>
   <New>DocumentLibraryForm</New>
 </FormTemplates>
-</file>
-
-<file path=customXml/item3.xml><?xml version="1.0" encoding="utf-8"?>
-<p:properties xmlns:p="http://schemas.microsoft.com/office/2006/metadata/properties" xmlns:xsi="http://www.w3.org/2001/XMLSchema-instance" xmlns:pc="http://schemas.microsoft.com/office/infopath/2007/PartnerControls">
-  <documentManagement>
-    <_ip_UnifiedCompliancePolicyUIAction xmlns="http://schemas.microsoft.com/sharepoint/v3" xsi:nil="true"/>
-    <_ip_UnifiedCompliancePolicyProperties xmlns="http://schemas.microsoft.com/sharepoint/v3" xsi:nil="true"/>
-  </documentManagement>
-</p:properties>
 </file>
 
 <file path=customXml/itemProps1.xml><?xml version="1.0" encoding="utf-8"?>
@@ -19792,14 +20178,6 @@
 </file>
 
 <file path=customXml/itemProps2.xml><?xml version="1.0" encoding="utf-8"?>
-<ds:datastoreItem xmlns:ds="http://schemas.openxmlformats.org/officeDocument/2006/customXml" ds:itemID="{F6CB1848-D3E0-4F10-B640-720BE758B85B}">
-  <ds:schemaRefs>
-    <ds:schemaRef ds:uri="http://schemas.microsoft.com/sharepoint/v3/contenttype/forms"/>
-  </ds:schemaRefs>
-</ds:datastoreItem>
-</file>
-
-<file path=customXml/itemProps3.xml><?xml version="1.0" encoding="utf-8"?>
 <ds:datastoreItem xmlns:ds="http://schemas.openxmlformats.org/officeDocument/2006/customXml" ds:itemID="{E4934E25-8442-49E9-ABDF-3146C4145F3B}">
   <ds:schemaRefs>
     <ds:schemaRef ds:uri="http://schemas.microsoft.com/office/infopath/2007/PartnerControls"/>
@@ -19815,4 +20193,12 @@
     <ds:schemaRef ds:uri="http://purl.org/dc/dcmitype/"/>
   </ds:schemaRefs>
 </ds:datastoreItem>
+</file>
+
+<file path=customXml/itemProps3.xml><?xml version="1.0" encoding="utf-8"?>
+<ds:datastoreItem xmlns:ds="http://schemas.openxmlformats.org/officeDocument/2006/customXml" ds:itemID="{F6CB1848-D3E0-4F10-B640-720BE758B85B}">
+  <ds:schemaRefs>
+    <ds:schemaRef ds:uri="http://schemas.microsoft.com/sharepoint/v3/contenttype/forms"/>
+  </ds:schemaRefs>
+</ds:datastoreItem>
 </file>
</xml_diff>

<commit_message>
Added Derivative action bode plot | Added Filter Bode datapoints | Added bode plots data processing live script
</commit_message>
<xml_diff>
--- a/Presentacions/Resultats de l’Anàlisi de la Planta de DS - Compendi 1-4 .pptx
+++ b/Presentacions/Resultats de l’Anàlisi de la Planta de DS - Compendi 1-4 .pptx
@@ -5,10 +5,10 @@
     <p:sldMasterId id="2147483648" r:id="rId4"/>
   </p:sldMasterIdLst>
   <p:notesMasterIdLst>
-    <p:notesMasterId r:id="rId37"/>
+    <p:notesMasterId r:id="rId41"/>
   </p:notesMasterIdLst>
   <p:handoutMasterIdLst>
-    <p:handoutMasterId r:id="rId38"/>
+    <p:handoutMasterId r:id="rId42"/>
   </p:handoutMasterIdLst>
   <p:sldIdLst>
     <p:sldId id="282" r:id="rId5"/>
@@ -41,8 +41,12 @@
     <p:sldId id="327" r:id="rId32"/>
     <p:sldId id="329" r:id="rId33"/>
     <p:sldId id="328" r:id="rId34"/>
-    <p:sldId id="330" r:id="rId35"/>
-    <p:sldId id="296" r:id="rId36"/>
+    <p:sldId id="331" r:id="rId35"/>
+    <p:sldId id="332" r:id="rId36"/>
+    <p:sldId id="334" r:id="rId37"/>
+    <p:sldId id="335" r:id="rId38"/>
+    <p:sldId id="330" r:id="rId39"/>
+    <p:sldId id="296" r:id="rId40"/>
   </p:sldIdLst>
   <p:sldSz cx="12192000" cy="6858000"/>
   <p:notesSz cx="6858000" cy="9144000"/>
@@ -248,7 +252,7 @@
             <a:pPr rtl="0"/>
             <a:fld id="{A0CB070B-93E8-4E3F-93BA-4C6F4F890423}" type="datetime1">
               <a:rPr lang="es-ES" smtClean="0"/>
-              <a:t>23/03/2022</a:t>
+              <a:t>30/03/2022</a:t>
             </a:fld>
             <a:endParaRPr lang="es-ES"/>
           </a:p>
@@ -430,7 +434,7 @@
             <a:pPr rtl="0"/>
             <a:fld id="{09EAA754-C899-4020-AF30-0F80416D4F92}" type="datetime1">
               <a:rPr lang="es-ES" noProof="0" smtClean="0"/>
-              <a:t>23/03/2022</a:t>
+              <a:t>30/03/2022</a:t>
             </a:fld>
             <a:endParaRPr lang="es-ES" noProof="0"/>
           </a:p>
@@ -2700,7 +2704,7 @@
       </p:grpSpPr>
       <p:sp>
         <p:nvSpPr>
-          <p:cNvPr id="2" name="Contenidor d'imatge de diapositiva 1"/>
+          <p:cNvPr id="2" name="Marcador de posición de imagen de diapositiva 1"/>
           <p:cNvSpPr>
             <a:spLocks noGrp="1" noRot="1" noChangeAspect="1"/>
           </p:cNvSpPr>
@@ -2712,7 +2716,7 @@
       </p:sp>
       <p:sp>
         <p:nvSpPr>
-          <p:cNvPr id="3" name="Contenidor de notes 2"/>
+          <p:cNvPr id="3" name="Marcador de posición de notas 2"/>
           <p:cNvSpPr>
             <a:spLocks noGrp="1"/>
           </p:cNvSpPr>
@@ -2722,19 +2726,17 @@
         </p:nvSpPr>
         <p:spPr/>
         <p:txBody>
-          <a:bodyPr/>
-          <a:lstStyle/>
-          <a:p>
-            <a:r>
-              <a:rPr lang="ca-ES" dirty="0"/>
-              <a:t>Modelar zona morta de velocitat (A partir de quina velocitat el motor para -&gt; Zona morta 3D en comptes de plana)</a:t>
-            </a:r>
-          </a:p>
-        </p:txBody>
-      </p:sp>
-      <p:sp>
-        <p:nvSpPr>
-          <p:cNvPr id="4" name="Contenidor de número de diapositiva 3"/>
+          <a:bodyPr rtlCol="0"/>
+          <a:lstStyle/>
+          <a:p>
+            <a:pPr rtl="0"/>
+            <a:endParaRPr lang="es-ES"/>
+          </a:p>
+        </p:txBody>
+      </p:sp>
+      <p:sp>
+        <p:nvSpPr>
+          <p:cNvPr id="4" name="Marcador de posición de número de diapositiva 3"/>
           <p:cNvSpPr>
             <a:spLocks noGrp="1"/>
           </p:cNvSpPr>
@@ -2744,22 +2746,22 @@
         </p:nvSpPr>
         <p:spPr/>
         <p:txBody>
-          <a:bodyPr/>
+          <a:bodyPr rtlCol="0"/>
           <a:lstStyle/>
           <a:p>
             <a:pPr rtl="0"/>
             <a:fld id="{8530193B-564F-4854-8A52-728F3FB19C85}" type="slidenum">
-              <a:rPr lang="es-ES" noProof="0" smtClean="0"/>
+              <a:rPr lang="es-ES" smtClean="0"/>
               <a:t>31</a:t>
             </a:fld>
-            <a:endParaRPr lang="es-ES" noProof="0"/>
+            <a:endParaRPr lang="es-ES"/>
           </a:p>
         </p:txBody>
       </p:sp>
     </p:spTree>
     <p:extLst>
       <p:ext uri="{BB962C8B-B14F-4D97-AF65-F5344CB8AC3E}">
-        <p14:creationId xmlns:p14="http://schemas.microsoft.com/office/powerpoint/2010/main" val="23897768"/>
+        <p14:creationId xmlns:p14="http://schemas.microsoft.com/office/powerpoint/2010/main" val="3383546578"/>
       </p:ext>
     </p:extLst>
   </p:cSld>
@@ -2814,13 +2816,13 @@
           <a:lstStyle/>
           <a:p>
             <a:pPr rtl="0"/>
-            <a:endParaRPr lang="es-ES"/>
-          </a:p>
-        </p:txBody>
-      </p:sp>
-      <p:sp>
-        <p:nvSpPr>
-          <p:cNvPr id="4" name="Marcador de número de diapositiva 3"/>
+            <a:endParaRPr lang="es-ES" dirty="0"/>
+          </a:p>
+        </p:txBody>
+      </p:sp>
+      <p:sp>
+        <p:nvSpPr>
+          <p:cNvPr id="4" name="Marcador de posición de número de diapositiva 3"/>
           <p:cNvSpPr>
             <a:spLocks noGrp="1"/>
           </p:cNvSpPr>
@@ -2837,6 +2839,352 @@
             <a:fld id="{8530193B-564F-4854-8A52-728F3FB19C85}" type="slidenum">
               <a:rPr lang="es-ES" smtClean="0"/>
               <a:t>32</a:t>
+            </a:fld>
+            <a:endParaRPr lang="es-ES" dirty="0"/>
+          </a:p>
+        </p:txBody>
+      </p:sp>
+    </p:spTree>
+    <p:extLst>
+      <p:ext uri="{BB962C8B-B14F-4D97-AF65-F5344CB8AC3E}">
+        <p14:creationId xmlns:p14="http://schemas.microsoft.com/office/powerpoint/2010/main" val="837093574"/>
+      </p:ext>
+    </p:extLst>
+  </p:cSld>
+  <p:clrMapOvr>
+    <a:masterClrMapping/>
+  </p:clrMapOvr>
+</p:notes>
+</file>
+
+<file path=ppt/notesSlides/notesSlide32.xml><?xml version="1.0" encoding="utf-8"?>
+<p:notes xmlns:a="http://schemas.openxmlformats.org/drawingml/2006/main" xmlns:r="http://schemas.openxmlformats.org/officeDocument/2006/relationships" xmlns:p="http://schemas.openxmlformats.org/presentationml/2006/main">
+  <p:cSld>
+    <p:spTree>
+      <p:nvGrpSpPr>
+        <p:cNvPr id="1" name=""/>
+        <p:cNvGrpSpPr/>
+        <p:nvPr/>
+      </p:nvGrpSpPr>
+      <p:grpSpPr>
+        <a:xfrm>
+          <a:off x="0" y="0"/>
+          <a:ext cx="0" cy="0"/>
+          <a:chOff x="0" y="0"/>
+          <a:chExt cx="0" cy="0"/>
+        </a:xfrm>
+      </p:grpSpPr>
+      <p:sp>
+        <p:nvSpPr>
+          <p:cNvPr id="2" name="Marcador de posición de imagen de diapositiva 1"/>
+          <p:cNvSpPr>
+            <a:spLocks noGrp="1" noRot="1" noChangeAspect="1"/>
+          </p:cNvSpPr>
+          <p:nvPr>
+            <p:ph type="sldImg"/>
+          </p:nvPr>
+        </p:nvSpPr>
+        <p:spPr/>
+      </p:sp>
+      <p:sp>
+        <p:nvSpPr>
+          <p:cNvPr id="3" name="Marcador de posición de notas 2"/>
+          <p:cNvSpPr>
+            <a:spLocks noGrp="1"/>
+          </p:cNvSpPr>
+          <p:nvPr>
+            <p:ph type="body" idx="1"/>
+          </p:nvPr>
+        </p:nvSpPr>
+        <p:spPr/>
+        <p:txBody>
+          <a:bodyPr rtlCol="0"/>
+          <a:lstStyle/>
+          <a:p>
+            <a:pPr rtl="0"/>
+            <a:endParaRPr lang="es-ES" dirty="0"/>
+          </a:p>
+        </p:txBody>
+      </p:sp>
+      <p:sp>
+        <p:nvSpPr>
+          <p:cNvPr id="4" name="Marcador de posición de número de diapositiva 3"/>
+          <p:cNvSpPr>
+            <a:spLocks noGrp="1"/>
+          </p:cNvSpPr>
+          <p:nvPr>
+            <p:ph type="sldNum" sz="quarter" idx="5"/>
+          </p:nvPr>
+        </p:nvSpPr>
+        <p:spPr/>
+        <p:txBody>
+          <a:bodyPr rtlCol="0"/>
+          <a:lstStyle/>
+          <a:p>
+            <a:pPr rtl="0"/>
+            <a:fld id="{8530193B-564F-4854-8A52-728F3FB19C85}" type="slidenum">
+              <a:rPr lang="es-ES" smtClean="0"/>
+              <a:t>33</a:t>
+            </a:fld>
+            <a:endParaRPr lang="es-ES" dirty="0"/>
+          </a:p>
+        </p:txBody>
+      </p:sp>
+    </p:spTree>
+    <p:extLst>
+      <p:ext uri="{BB962C8B-B14F-4D97-AF65-F5344CB8AC3E}">
+        <p14:creationId xmlns:p14="http://schemas.microsoft.com/office/powerpoint/2010/main" val="1930138867"/>
+      </p:ext>
+    </p:extLst>
+  </p:cSld>
+  <p:clrMapOvr>
+    <a:masterClrMapping/>
+  </p:clrMapOvr>
+</p:notes>
+</file>
+
+<file path=ppt/notesSlides/notesSlide33.xml><?xml version="1.0" encoding="utf-8"?>
+<p:notes xmlns:a="http://schemas.openxmlformats.org/drawingml/2006/main" xmlns:r="http://schemas.openxmlformats.org/officeDocument/2006/relationships" xmlns:p="http://schemas.openxmlformats.org/presentationml/2006/main">
+  <p:cSld>
+    <p:spTree>
+      <p:nvGrpSpPr>
+        <p:cNvPr id="1" name=""/>
+        <p:cNvGrpSpPr/>
+        <p:nvPr/>
+      </p:nvGrpSpPr>
+      <p:grpSpPr>
+        <a:xfrm>
+          <a:off x="0" y="0"/>
+          <a:ext cx="0" cy="0"/>
+          <a:chOff x="0" y="0"/>
+          <a:chExt cx="0" cy="0"/>
+        </a:xfrm>
+      </p:grpSpPr>
+      <p:sp>
+        <p:nvSpPr>
+          <p:cNvPr id="2" name="Marcador de posición de imagen de diapositiva 1"/>
+          <p:cNvSpPr>
+            <a:spLocks noGrp="1" noRot="1" noChangeAspect="1"/>
+          </p:cNvSpPr>
+          <p:nvPr>
+            <p:ph type="sldImg"/>
+          </p:nvPr>
+        </p:nvSpPr>
+        <p:spPr/>
+      </p:sp>
+      <p:sp>
+        <p:nvSpPr>
+          <p:cNvPr id="3" name="Marcador de posición de notas 2"/>
+          <p:cNvSpPr>
+            <a:spLocks noGrp="1"/>
+          </p:cNvSpPr>
+          <p:nvPr>
+            <p:ph type="body" idx="1"/>
+          </p:nvPr>
+        </p:nvSpPr>
+        <p:spPr/>
+        <p:txBody>
+          <a:bodyPr rtlCol="0"/>
+          <a:lstStyle/>
+          <a:p>
+            <a:pPr rtl="0"/>
+            <a:endParaRPr lang="es-ES" dirty="0"/>
+          </a:p>
+        </p:txBody>
+      </p:sp>
+      <p:sp>
+        <p:nvSpPr>
+          <p:cNvPr id="4" name="Marcador de posición de número de diapositiva 3"/>
+          <p:cNvSpPr>
+            <a:spLocks noGrp="1"/>
+          </p:cNvSpPr>
+          <p:nvPr>
+            <p:ph type="sldNum" sz="quarter" idx="5"/>
+          </p:nvPr>
+        </p:nvSpPr>
+        <p:spPr/>
+        <p:txBody>
+          <a:bodyPr rtlCol="0"/>
+          <a:lstStyle/>
+          <a:p>
+            <a:pPr rtl="0"/>
+            <a:fld id="{8530193B-564F-4854-8A52-728F3FB19C85}" type="slidenum">
+              <a:rPr lang="es-ES" smtClean="0"/>
+              <a:t>34</a:t>
+            </a:fld>
+            <a:endParaRPr lang="es-ES" dirty="0"/>
+          </a:p>
+        </p:txBody>
+      </p:sp>
+    </p:spTree>
+    <p:extLst>
+      <p:ext uri="{BB962C8B-B14F-4D97-AF65-F5344CB8AC3E}">
+        <p14:creationId xmlns:p14="http://schemas.microsoft.com/office/powerpoint/2010/main" val="3481589101"/>
+      </p:ext>
+    </p:extLst>
+  </p:cSld>
+  <p:clrMapOvr>
+    <a:masterClrMapping/>
+  </p:clrMapOvr>
+</p:notes>
+</file>
+
+<file path=ppt/notesSlides/notesSlide34.xml><?xml version="1.0" encoding="utf-8"?>
+<p:notes xmlns:a="http://schemas.openxmlformats.org/drawingml/2006/main" xmlns:r="http://schemas.openxmlformats.org/officeDocument/2006/relationships" xmlns:p="http://schemas.openxmlformats.org/presentationml/2006/main">
+  <p:cSld>
+    <p:spTree>
+      <p:nvGrpSpPr>
+        <p:cNvPr id="1" name=""/>
+        <p:cNvGrpSpPr/>
+        <p:nvPr/>
+      </p:nvGrpSpPr>
+      <p:grpSpPr>
+        <a:xfrm>
+          <a:off x="0" y="0"/>
+          <a:ext cx="0" cy="0"/>
+          <a:chOff x="0" y="0"/>
+          <a:chExt cx="0" cy="0"/>
+        </a:xfrm>
+      </p:grpSpPr>
+      <p:sp>
+        <p:nvSpPr>
+          <p:cNvPr id="2" name="Contenidor d'imatge de diapositiva 1"/>
+          <p:cNvSpPr>
+            <a:spLocks noGrp="1" noRot="1" noChangeAspect="1"/>
+          </p:cNvSpPr>
+          <p:nvPr>
+            <p:ph type="sldImg"/>
+          </p:nvPr>
+        </p:nvSpPr>
+        <p:spPr/>
+      </p:sp>
+      <p:sp>
+        <p:nvSpPr>
+          <p:cNvPr id="3" name="Contenidor de notes 2"/>
+          <p:cNvSpPr>
+            <a:spLocks noGrp="1"/>
+          </p:cNvSpPr>
+          <p:nvPr>
+            <p:ph type="body" idx="1"/>
+          </p:nvPr>
+        </p:nvSpPr>
+        <p:spPr/>
+        <p:txBody>
+          <a:bodyPr/>
+          <a:lstStyle/>
+          <a:p>
+            <a:r>
+              <a:rPr lang="ca-ES" dirty="0"/>
+              <a:t>Modelar zona morta de velocitat (A partir de quina velocitat el motor para -&gt; Zona morta 3D en comptes de plana)</a:t>
+            </a:r>
+          </a:p>
+        </p:txBody>
+      </p:sp>
+      <p:sp>
+        <p:nvSpPr>
+          <p:cNvPr id="4" name="Contenidor de número de diapositiva 3"/>
+          <p:cNvSpPr>
+            <a:spLocks noGrp="1"/>
+          </p:cNvSpPr>
+          <p:nvPr>
+            <p:ph type="sldNum" sz="quarter" idx="5"/>
+          </p:nvPr>
+        </p:nvSpPr>
+        <p:spPr/>
+        <p:txBody>
+          <a:bodyPr/>
+          <a:lstStyle/>
+          <a:p>
+            <a:pPr rtl="0"/>
+            <a:fld id="{8530193B-564F-4854-8A52-728F3FB19C85}" type="slidenum">
+              <a:rPr lang="es-ES" noProof="0" smtClean="0"/>
+              <a:t>35</a:t>
+            </a:fld>
+            <a:endParaRPr lang="es-ES" noProof="0"/>
+          </a:p>
+        </p:txBody>
+      </p:sp>
+    </p:spTree>
+    <p:extLst>
+      <p:ext uri="{BB962C8B-B14F-4D97-AF65-F5344CB8AC3E}">
+        <p14:creationId xmlns:p14="http://schemas.microsoft.com/office/powerpoint/2010/main" val="23897768"/>
+      </p:ext>
+    </p:extLst>
+  </p:cSld>
+  <p:clrMapOvr>
+    <a:masterClrMapping/>
+  </p:clrMapOvr>
+</p:notes>
+</file>
+
+<file path=ppt/notesSlides/notesSlide35.xml><?xml version="1.0" encoding="utf-8"?>
+<p:notes xmlns:a="http://schemas.openxmlformats.org/drawingml/2006/main" xmlns:r="http://schemas.openxmlformats.org/officeDocument/2006/relationships" xmlns:p="http://schemas.openxmlformats.org/presentationml/2006/main">
+  <p:cSld>
+    <p:spTree>
+      <p:nvGrpSpPr>
+        <p:cNvPr id="1" name=""/>
+        <p:cNvGrpSpPr/>
+        <p:nvPr/>
+      </p:nvGrpSpPr>
+      <p:grpSpPr>
+        <a:xfrm>
+          <a:off x="0" y="0"/>
+          <a:ext cx="0" cy="0"/>
+          <a:chOff x="0" y="0"/>
+          <a:chExt cx="0" cy="0"/>
+        </a:xfrm>
+      </p:grpSpPr>
+      <p:sp>
+        <p:nvSpPr>
+          <p:cNvPr id="2" name="Marcador de posición de imagen de diapositiva 1"/>
+          <p:cNvSpPr>
+            <a:spLocks noGrp="1" noRot="1" noChangeAspect="1"/>
+          </p:cNvSpPr>
+          <p:nvPr>
+            <p:ph type="sldImg"/>
+          </p:nvPr>
+        </p:nvSpPr>
+        <p:spPr/>
+      </p:sp>
+      <p:sp>
+        <p:nvSpPr>
+          <p:cNvPr id="3" name="Marcador de posición de notas 2"/>
+          <p:cNvSpPr>
+            <a:spLocks noGrp="1"/>
+          </p:cNvSpPr>
+          <p:nvPr>
+            <p:ph type="body" idx="1"/>
+          </p:nvPr>
+        </p:nvSpPr>
+        <p:spPr/>
+        <p:txBody>
+          <a:bodyPr rtlCol="0"/>
+          <a:lstStyle/>
+          <a:p>
+            <a:pPr rtl="0"/>
+            <a:endParaRPr lang="es-ES"/>
+          </a:p>
+        </p:txBody>
+      </p:sp>
+      <p:sp>
+        <p:nvSpPr>
+          <p:cNvPr id="4" name="Marcador de número de diapositiva 3"/>
+          <p:cNvSpPr>
+            <a:spLocks noGrp="1"/>
+          </p:cNvSpPr>
+          <p:nvPr>
+            <p:ph type="sldNum" sz="quarter" idx="5"/>
+          </p:nvPr>
+        </p:nvSpPr>
+        <p:spPr/>
+        <p:txBody>
+          <a:bodyPr rtlCol="0"/>
+          <a:lstStyle/>
+          <a:p>
+            <a:pPr rtl="0"/>
+            <a:fld id="{8530193B-564F-4854-8A52-728F3FB19C85}" type="slidenum">
+              <a:rPr lang="es-ES" smtClean="0"/>
+              <a:t>36</a:t>
             </a:fld>
             <a:endParaRPr lang="es-ES"/>
           </a:p>
@@ -10804,7 +11152,7 @@
             </a:r>
             <a:r>
               <a:rPr lang="es-ES" dirty="0"/>
-              <a:t> --/--/--</a:t>
+              <a:t> 7/4/22</a:t>
             </a:r>
           </a:p>
         </p:txBody>
@@ -10819,13 +11167,6 @@
   <p:clrMapOvr>
     <a:masterClrMapping/>
   </p:clrMapOvr>
-  <p:timing>
-    <p:tnLst>
-      <p:par>
-        <p:cTn id="1" dur="indefinite" restart="never" nodeType="tmRoot"/>
-      </p:par>
-    </p:tnLst>
-  </p:timing>
 </p:sld>
 </file>
 
@@ -11018,13 +11359,6 @@
   <p:clrMapOvr>
     <a:masterClrMapping/>
   </p:clrMapOvr>
-  <p:timing>
-    <p:tnLst>
-      <p:par>
-        <p:cTn id="1" dur="indefinite" restart="never" nodeType="tmRoot"/>
-      </p:par>
-    </p:tnLst>
-  </p:timing>
 </p:sld>
 </file>
 
@@ -11178,7 +11512,7 @@
         </p:blipFill>
         <p:spPr>
           <a:xfrm>
-            <a:off x="80768" y="1128634"/>
+            <a:off x="61914" y="1128634"/>
             <a:ext cx="9911730" cy="5660014"/>
           </a:xfrm>
           <a:prstGeom prst="rect">
@@ -11277,13 +11611,6 @@
   <p:clrMapOvr>
     <a:masterClrMapping/>
   </p:clrMapOvr>
-  <p:timing>
-    <p:tnLst>
-      <p:par>
-        <p:cTn id="1" dur="indefinite" restart="never" nodeType="tmRoot"/>
-      </p:par>
-    </p:tnLst>
-  </p:timing>
 </p:sld>
 </file>
 
@@ -11437,7 +11764,7 @@
         </p:blipFill>
         <p:spPr>
           <a:xfrm>
-            <a:off x="80768" y="1128634"/>
+            <a:off x="61914" y="1128634"/>
             <a:ext cx="9903492" cy="5660013"/>
           </a:xfrm>
           <a:prstGeom prst="rect">
@@ -11536,13 +11863,6 @@
   <p:clrMapOvr>
     <a:masterClrMapping/>
   </p:clrMapOvr>
-  <p:timing>
-    <p:tnLst>
-      <p:par>
-        <p:cTn id="1" dur="indefinite" restart="never" nodeType="tmRoot"/>
-      </p:par>
-    </p:tnLst>
-  </p:timing>
 </p:sld>
 </file>
 
@@ -11696,7 +12016,7 @@
         </p:blipFill>
         <p:spPr>
           <a:xfrm>
-            <a:off x="80769" y="1128634"/>
+            <a:off x="61915" y="1128634"/>
             <a:ext cx="9895254" cy="5660013"/>
           </a:xfrm>
           <a:prstGeom prst="rect">
@@ -11825,13 +12145,6 @@
   <p:clrMapOvr>
     <a:masterClrMapping/>
   </p:clrMapOvr>
-  <p:timing>
-    <p:tnLst>
-      <p:par>
-        <p:cTn id="1" dur="indefinite" restart="never" nodeType="tmRoot"/>
-      </p:par>
-    </p:tnLst>
-  </p:timing>
 </p:sld>
 </file>
 
@@ -11985,7 +12298,7 @@
         </p:blipFill>
         <p:spPr>
           <a:xfrm>
-            <a:off x="80769" y="1128634"/>
+            <a:off x="61915" y="1128634"/>
             <a:ext cx="9887016" cy="5660012"/>
           </a:xfrm>
           <a:prstGeom prst="rect">
@@ -12114,13 +12427,6 @@
   <p:clrMapOvr>
     <a:masterClrMapping/>
   </p:clrMapOvr>
-  <p:timing>
-    <p:tnLst>
-      <p:par>
-        <p:cTn id="1" dur="indefinite" restart="never" nodeType="tmRoot"/>
-      </p:par>
-    </p:tnLst>
-  </p:timing>
 </p:sld>
 </file>
 
@@ -12274,7 +12580,7 @@
         </p:blipFill>
         <p:spPr>
           <a:xfrm>
-            <a:off x="80769" y="1128634"/>
+            <a:off x="61915" y="1128634"/>
             <a:ext cx="9895253" cy="5660012"/>
           </a:xfrm>
           <a:prstGeom prst="rect">
@@ -12403,13 +12709,6 @@
   <p:clrMapOvr>
     <a:masterClrMapping/>
   </p:clrMapOvr>
-  <p:timing>
-    <p:tnLst>
-      <p:par>
-        <p:cTn id="1" dur="indefinite" restart="never" nodeType="tmRoot"/>
-      </p:par>
-    </p:tnLst>
-  </p:timing>
 </p:sld>
 </file>
 
@@ -12563,7 +12862,7 @@
         </p:blipFill>
         <p:spPr>
           <a:xfrm>
-            <a:off x="80769" y="1128634"/>
+            <a:off x="61915" y="1128634"/>
             <a:ext cx="9895253" cy="5660011"/>
           </a:xfrm>
           <a:prstGeom prst="rect">
@@ -12692,13 +12991,6 @@
   <p:clrMapOvr>
     <a:masterClrMapping/>
   </p:clrMapOvr>
-  <p:timing>
-    <p:tnLst>
-      <p:par>
-        <p:cTn id="1" dur="indefinite" restart="never" nodeType="tmRoot"/>
-      </p:par>
-    </p:tnLst>
-  </p:timing>
 </p:sld>
 </file>
 
@@ -12883,13 +13175,6 @@
   <p:clrMapOvr>
     <a:masterClrMapping/>
   </p:clrMapOvr>
-  <p:timing>
-    <p:tnLst>
-      <p:par>
-        <p:cTn id="1" dur="indefinite" restart="never" nodeType="tmRoot"/>
-      </p:par>
-    </p:tnLst>
-  </p:timing>
 </p:sld>
 </file>
 
@@ -13094,13 +13379,6 @@
   <p:clrMapOvr>
     <a:masterClrMapping/>
   </p:clrMapOvr>
-  <p:timing>
-    <p:tnLst>
-      <p:par>
-        <p:cTn id="1" dur="indefinite" restart="never" nodeType="tmRoot"/>
-      </p:par>
-    </p:tnLst>
-  </p:timing>
 </p:sld>
 </file>
 
@@ -13383,13 +13661,6 @@
   <p:clrMapOvr>
     <a:masterClrMapping/>
   </p:clrMapOvr>
-  <p:timing>
-    <p:tnLst>
-      <p:par>
-        <p:cTn id="1" dur="indefinite" restart="never" nodeType="tmRoot"/>
-      </p:par>
-    </p:tnLst>
-  </p:timing>
 </p:sld>
 </file>
 
@@ -13581,13 +13852,6 @@
   <p:clrMapOvr>
     <a:masterClrMapping/>
   </p:clrMapOvr>
-  <p:timing>
-    <p:tnLst>
-      <p:par>
-        <p:cTn id="1" dur="indefinite" restart="never" nodeType="tmRoot"/>
-      </p:par>
-    </p:tnLst>
-  </p:timing>
 </p:sld>
 </file>
 
@@ -13674,30 +13938,22 @@
               <a:buNone/>
             </a:pPr>
             <a:r>
-              <a:rPr lang="ca-ES" sz="1800" dirty="0" smtClean="0"/>
+              <a:rPr lang="ca-ES" sz="1800" dirty="0"/>
               <a:t>(</a:t>
             </a:r>
             <a:r>
-              <a:rPr lang="ca-ES" sz="1800" dirty="0" err="1" smtClean="0"/>
+              <a:rPr lang="ca-ES" sz="1800" dirty="0" err="1"/>
               <a:t>Histerèsi</a:t>
             </a:r>
             <a:r>
-              <a:rPr lang="ca-ES" sz="1800" dirty="0" smtClean="0"/>
-              <a:t> </a:t>
-            </a:r>
-            <a:r>
               <a:rPr lang="ca-ES" sz="1800" dirty="0"/>
-              <a:t>i fem servir K 61</a:t>
-            </a:r>
-            <a:r>
-              <a:rPr lang="ca-ES" sz="1800" dirty="0" smtClean="0"/>
-              <a:t>)</a:t>
+              <a:t> i fem servir K 61)</a:t>
             </a:r>
           </a:p>
           <a:p>
             <a:pPr algn="just"/>
             <a:r>
-              <a:rPr lang="ca-ES" dirty="0" err="1" smtClean="0"/>
+              <a:rPr lang="ca-ES" dirty="0" err="1"/>
               <a:t>Etc</a:t>
             </a:r>
             <a:endParaRPr lang="ca-ES" dirty="0"/>
@@ -13799,13 +14055,6 @@
   <p:clrMapOvr>
     <a:masterClrMapping/>
   </p:clrMapOvr>
-  <p:timing>
-    <p:tnLst>
-      <p:par>
-        <p:cTn id="1" dur="indefinite" restart="never" nodeType="tmRoot"/>
-      </p:par>
-    </p:tnLst>
-  </p:timing>
 </p:sld>
 </file>
 
@@ -14002,13 +14251,6 @@
   <p:clrMapOvr>
     <a:masterClrMapping/>
   </p:clrMapOvr>
-  <p:timing>
-    <p:tnLst>
-      <p:par>
-        <p:cTn id="1" dur="indefinite" restart="never" nodeType="tmRoot"/>
-      </p:par>
-    </p:tnLst>
-  </p:timing>
 </p:sld>
 </file>
 
@@ -14145,7 +14387,7 @@
         </p:blipFill>
         <p:spPr>
           <a:xfrm>
-            <a:off x="80768" y="1128634"/>
+            <a:off x="61914" y="1128634"/>
             <a:ext cx="9926942" cy="5660014"/>
           </a:xfrm>
           <a:prstGeom prst="rect">
@@ -14219,13 +14461,6 @@
   <p:clrMapOvr>
     <a:masterClrMapping/>
   </p:clrMapOvr>
-  <p:timing>
-    <p:tnLst>
-      <p:par>
-        <p:cTn id="1" dur="indefinite" restart="never" nodeType="tmRoot"/>
-      </p:par>
-    </p:tnLst>
-  </p:timing>
 </p:sld>
 </file>
 
@@ -14362,7 +14597,7 @@
         </p:blipFill>
         <p:spPr>
           <a:xfrm>
-            <a:off x="80768" y="1128634"/>
+            <a:off x="61914" y="1128634"/>
             <a:ext cx="9926942" cy="5660014"/>
           </a:xfrm>
           <a:prstGeom prst="rect">
@@ -14436,13 +14671,6 @@
   <p:clrMapOvr>
     <a:masterClrMapping/>
   </p:clrMapOvr>
-  <p:timing>
-    <p:tnLst>
-      <p:par>
-        <p:cTn id="1" dur="indefinite" restart="never" nodeType="tmRoot"/>
-      </p:par>
-    </p:tnLst>
-  </p:timing>
 </p:sld>
 </file>
 
@@ -14626,7 +14854,7 @@
         </p:blipFill>
         <p:spPr>
           <a:xfrm>
-            <a:off x="80768" y="1128634"/>
+            <a:off x="61914" y="1128634"/>
             <a:ext cx="9926942" cy="5660014"/>
           </a:xfrm>
           <a:prstGeom prst="rect">
@@ -14702,13 +14930,6 @@
   <p:clrMapOvr>
     <a:masterClrMapping/>
   </p:clrMapOvr>
-  <p:timing>
-    <p:tnLst>
-      <p:par>
-        <p:cTn id="1" dur="indefinite" restart="never" nodeType="tmRoot"/>
-      </p:par>
-    </p:tnLst>
-  </p:timing>
 </p:sld>
 </file>
 
@@ -14892,7 +15113,7 @@
         </p:blipFill>
         <p:spPr>
           <a:xfrm>
-            <a:off x="80768" y="1128634"/>
+            <a:off x="61914" y="1128634"/>
             <a:ext cx="9926942" cy="5660014"/>
           </a:xfrm>
           <a:prstGeom prst="rect">
@@ -15003,13 +15224,6 @@
   <p:clrMapOvr>
     <a:masterClrMapping/>
   </p:clrMapOvr>
-  <p:timing>
-    <p:tnLst>
-      <p:par>
-        <p:cTn id="1" dur="indefinite" restart="never" nodeType="tmRoot"/>
-      </p:par>
-    </p:tnLst>
-  </p:timing>
 </p:sld>
 </file>
 
@@ -15193,7 +15407,7 @@
         </p:blipFill>
         <p:spPr>
           <a:xfrm>
-            <a:off x="80768" y="1128634"/>
+            <a:off x="61914" y="1128634"/>
             <a:ext cx="9926942" cy="5660014"/>
           </a:xfrm>
           <a:prstGeom prst="rect">
@@ -15304,13 +15518,6 @@
   <p:clrMapOvr>
     <a:masterClrMapping/>
   </p:clrMapOvr>
-  <p:timing>
-    <p:tnLst>
-      <p:par>
-        <p:cTn id="1" dur="indefinite" restart="never" nodeType="tmRoot"/>
-      </p:par>
-    </p:tnLst>
-  </p:timing>
 </p:sld>
 </file>
 
@@ -15384,15 +15591,7 @@
             </a:r>
             <a:r>
               <a:rPr lang="ca-ES" sz="2800" dirty="0"/>
-              <a:t> = 3,06 ~ </a:t>
-            </a:r>
-            <a:r>
-              <a:rPr lang="ca-ES" sz="2800" dirty="0" smtClean="0"/>
-              <a:t>(A vegades)</a:t>
-            </a:r>
-            <a:r>
-              <a:rPr lang="ca-ES" sz="2800" dirty="0"/>
-              <a:t/>
+              <a:t> = 3,06 ~ (A vegades)</a:t>
             </a:r>
             <a:br>
               <a:rPr lang="ca-ES" sz="2800" dirty="0"/>
@@ -15502,7 +15701,7 @@
         </p:blipFill>
         <p:spPr>
           <a:xfrm>
-            <a:off x="80768" y="1128634"/>
+            <a:off x="61914" y="1128634"/>
             <a:ext cx="9926942" cy="5660014"/>
           </a:xfrm>
           <a:prstGeom prst="rect">
@@ -15578,13 +15777,6 @@
   <p:clrMapOvr>
     <a:masterClrMapping/>
   </p:clrMapOvr>
-  <p:timing>
-    <p:tnLst>
-      <p:par>
-        <p:cTn id="1" dur="indefinite" restart="never" nodeType="tmRoot"/>
-      </p:par>
-    </p:tnLst>
-  </p:timing>
 </p:sld>
 </file>
 
@@ -15768,7 +15960,7 @@
         </p:blipFill>
         <p:spPr>
           <a:xfrm>
-            <a:off x="80768" y="1128634"/>
+            <a:off x="61914" y="1128634"/>
             <a:ext cx="9926942" cy="5660014"/>
           </a:xfrm>
           <a:prstGeom prst="rect">
@@ -15844,13 +16036,6 @@
   <p:clrMapOvr>
     <a:masterClrMapping/>
   </p:clrMapOvr>
-  <p:timing>
-    <p:tnLst>
-      <p:par>
-        <p:cTn id="1" dur="indefinite" restart="never" nodeType="tmRoot"/>
-      </p:par>
-    </p:tnLst>
-  </p:timing>
 </p:sld>
 </file>
 
@@ -15892,7 +16077,7 @@
         </p:blipFill>
         <p:spPr>
           <a:xfrm>
-            <a:off x="59300" y="1129094"/>
+            <a:off x="68727" y="1129094"/>
             <a:ext cx="9948410" cy="5658205"/>
           </a:xfrm>
           <a:prstGeom prst="rect">
@@ -16113,10 +16298,9 @@
           <a:lstStyle/>
           <a:p>
             <a:r>
-              <a:rPr lang="ca-ES" dirty="0" smtClean="0"/>
+              <a:rPr lang="ca-ES" dirty="0"/>
               <a:t>La zona morta impedeix oscil·lacions d’amplitud petita</a:t>
             </a:r>
-            <a:endParaRPr lang="ca-ES" dirty="0"/>
           </a:p>
         </p:txBody>
       </p:sp>
@@ -16130,13 +16314,6 @@
   <p:clrMapOvr>
     <a:masterClrMapping/>
   </p:clrMapOvr>
-  <p:timing>
-    <p:tnLst>
-      <p:par>
-        <p:cTn id="1" dur="indefinite" restart="never" nodeType="tmRoot"/>
-      </p:par>
-    </p:tnLst>
-  </p:timing>
 </p:sld>
 </file>
 
@@ -16283,7 +16460,7 @@
         </p:blipFill>
         <p:spPr>
           <a:xfrm>
-            <a:off x="79514" y="1128634"/>
+            <a:off x="70087" y="1128634"/>
             <a:ext cx="9928196" cy="5660014"/>
           </a:xfrm>
           <a:prstGeom prst="rect">
@@ -16366,13 +16543,6 @@
   <p:clrMapOvr>
     <a:masterClrMapping/>
   </p:clrMapOvr>
-  <p:timing>
-    <p:tnLst>
-      <p:par>
-        <p:cTn id="1" dur="indefinite" restart="never" nodeType="tmRoot"/>
-      </p:par>
-    </p:tnLst>
-  </p:timing>
 </p:sld>
 </file>
 
@@ -16414,7 +16584,7 @@
         </p:blipFill>
         <p:spPr>
           <a:xfrm>
-            <a:off x="59299" y="1129094"/>
+            <a:off x="68726" y="1129094"/>
             <a:ext cx="9948411" cy="5658205"/>
           </a:xfrm>
           <a:prstGeom prst="rect">
@@ -16451,7 +16621,7 @@
             <a:pPr rtl="0"/>
             <a:r>
               <a:rPr lang="ca-ES" sz="2800" dirty="0"/>
-              <a:t>Càlcul de Pols</a:t>
+              <a:t>Càlcul de Pols - Simulació</a:t>
             </a:r>
             <a:br>
               <a:rPr lang="ca-ES" sz="2800" dirty="0"/>
@@ -16586,7 +16756,7 @@
             </a:r>
             <a:r>
               <a:rPr lang="es-ES" dirty="0" err="1"/>
-              <a:t>Vtac</a:t>
+              <a:t>Vin</a:t>
             </a:r>
             <a:endParaRPr lang="es-ES" dirty="0"/>
           </a:p>
@@ -16616,13 +16786,6 @@
   <p:clrMapOvr>
     <a:masterClrMapping/>
   </p:clrMapOvr>
-  <p:timing>
-    <p:tnLst>
-      <p:par>
-        <p:cTn id="1" dur="indefinite" restart="never" nodeType="tmRoot"/>
-      </p:par>
-    </p:tnLst>
-  </p:timing>
 </p:sld>
 </file>
 
@@ -16645,107 +16808,43 @@
       </p:grpSpPr>
       <p:sp>
         <p:nvSpPr>
-          <p:cNvPr id="2" name="Contenidor de contingut 1">
-            <a:extLst>
-              <a:ext uri="{FF2B5EF4-FFF2-40B4-BE49-F238E27FC236}">
-                <a16:creationId xmlns:a16="http://schemas.microsoft.com/office/drawing/2014/main" id="{90BA015A-20AF-440F-8413-D939C69EAB2F}"/>
-              </a:ext>
-            </a:extLst>
-          </p:cNvPr>
-          <p:cNvSpPr>
-            <a:spLocks noGrp="1"/>
-          </p:cNvSpPr>
-          <p:nvPr>
-            <p:ph sz="half" idx="1"/>
-          </p:nvPr>
-        </p:nvSpPr>
-        <p:spPr>
-          <a:xfrm>
-            <a:off x="3453817" y="2007458"/>
-            <a:ext cx="3735548" cy="2638434"/>
-          </a:xfrm>
-        </p:spPr>
-        <p:txBody>
-          <a:bodyPr/>
-          <a:lstStyle/>
-          <a:p>
-            <a:pPr marL="0" indent="0" algn="just">
-              <a:buNone/>
-            </a:pPr>
-            <a:r>
-              <a:rPr lang="ca-ES" dirty="0" smtClean="0"/>
-              <a:t>No activar el filtre si no és necessari</a:t>
-            </a:r>
-          </a:p>
-          <a:p>
-            <a:pPr marL="0" indent="0" algn="just">
-              <a:buNone/>
-            </a:pPr>
-            <a:r>
-              <a:rPr lang="ca-ES" dirty="0" smtClean="0"/>
-              <a:t>Per evitar zona morta fer servir PID en velocitat</a:t>
-            </a:r>
-          </a:p>
-          <a:p>
-            <a:pPr marL="0" indent="0" algn="just">
-              <a:buNone/>
-            </a:pPr>
-            <a:r>
-              <a:rPr lang="ca-ES" dirty="0" smtClean="0"/>
-              <a:t>Perquè filtre abans de </a:t>
-            </a:r>
-            <a:r>
-              <a:rPr lang="ca-ES" dirty="0" err="1" smtClean="0"/>
-              <a:t>Kd</a:t>
-            </a:r>
-            <a:r>
-              <a:rPr lang="ca-ES" dirty="0" smtClean="0"/>
-              <a:t> i no després?</a:t>
-            </a:r>
-            <a:endParaRPr lang="ca-ES" dirty="0"/>
-          </a:p>
-        </p:txBody>
-      </p:sp>
-      <p:sp>
-        <p:nvSpPr>
-          <p:cNvPr id="5" name="Títol 4">
-            <a:extLst>
-              <a:ext uri="{FF2B5EF4-FFF2-40B4-BE49-F238E27FC236}">
-                <a16:creationId xmlns:a16="http://schemas.microsoft.com/office/drawing/2014/main" id="{A0961E97-8F98-4B4D-96F2-5C4364E6ACD3}"/>
-              </a:ext>
-            </a:extLst>
-          </p:cNvPr>
-          <p:cNvSpPr>
-            <a:spLocks noGrp="1"/>
-          </p:cNvSpPr>
-          <p:nvPr>
-            <p:ph type="title"/>
-          </p:nvPr>
-        </p:nvSpPr>
-        <p:spPr>
-          <a:xfrm>
-            <a:off x="247442" y="423611"/>
-            <a:ext cx="9131100" cy="432000"/>
-          </a:xfrm>
-        </p:spPr>
-        <p:txBody>
-          <a:bodyPr/>
-          <a:lstStyle/>
-          <a:p>
-            <a:r>
-              <a:rPr lang="ca-ES" dirty="0" smtClean="0"/>
-              <a:t>Punts pendents i propostes</a:t>
-            </a:r>
-            <a:endParaRPr lang="ca-ES" dirty="0"/>
-          </a:p>
-        </p:txBody>
-      </p:sp>
-      <p:sp>
-        <p:nvSpPr>
-          <p:cNvPr id="7" name="Rectángulo 9">
-            <a:extLst>
-              <a:ext uri="{FF2B5EF4-FFF2-40B4-BE49-F238E27FC236}">
-                <a16:creationId xmlns:a16="http://schemas.microsoft.com/office/drawing/2014/main" id="{CCB320B0-EB9E-4107-9824-08DC54BF4B4A}"/>
+          <p:cNvPr id="3" name="Título 2">
+            <a:extLst>
+              <a:ext uri="{FF2B5EF4-FFF2-40B4-BE49-F238E27FC236}">
+                <a16:creationId xmlns:a16="http://schemas.microsoft.com/office/drawing/2014/main" id="{200B3D2B-613A-41BE-987D-E6A1324B456D}"/>
+              </a:ext>
+            </a:extLst>
+          </p:cNvPr>
+          <p:cNvSpPr>
+            <a:spLocks noGrp="1"/>
+          </p:cNvSpPr>
+          <p:nvPr>
+            <p:ph type="ctrTitle"/>
+          </p:nvPr>
+        </p:nvSpPr>
+        <p:spPr>
+          <a:xfrm>
+            <a:off x="2374084" y="3647191"/>
+            <a:ext cx="4887992" cy="2195386"/>
+          </a:xfrm>
+        </p:spPr>
+        <p:txBody>
+          <a:bodyPr rtlCol="0"/>
+          <a:lstStyle/>
+          <a:p>
+            <a:r>
+              <a:rPr lang="ca-ES" sz="4400" dirty="0"/>
+              <a:t>Càlcul de paràmetres II</a:t>
+            </a:r>
+          </a:p>
+        </p:txBody>
+      </p:sp>
+      <p:sp>
+        <p:nvSpPr>
+          <p:cNvPr id="8" name="Rectángulo 7">
+            <a:extLst>
+              <a:ext uri="{FF2B5EF4-FFF2-40B4-BE49-F238E27FC236}">
+                <a16:creationId xmlns:a16="http://schemas.microsoft.com/office/drawing/2014/main" id="{0F2F1659-815F-46D5-B4BA-92407E18AEDC}"/>
               </a:ext>
             </a:extLst>
           </p:cNvPr>
@@ -16754,8 +16853,8 @@
         </p:nvSpPr>
         <p:spPr>
           <a:xfrm>
-            <a:off x="10126980" y="6263640"/>
-            <a:ext cx="2065020" cy="594360"/>
+            <a:off x="10071652" y="6175513"/>
+            <a:ext cx="2120348" cy="682487"/>
           </a:xfrm>
           <a:prstGeom prst="rect">
             <a:avLst/>
@@ -16788,6 +16887,75 @@
           <a:lstStyle/>
           <a:p>
             <a:pPr algn="ctr"/>
+            <a:endParaRPr lang="es-ES"/>
+          </a:p>
+        </p:txBody>
+      </p:sp>
+      <p:pic>
+        <p:nvPicPr>
+          <p:cNvPr id="10" name="Marcador de posición de imagen 6">
+            <a:extLst>
+              <a:ext uri="{FF2B5EF4-FFF2-40B4-BE49-F238E27FC236}">
+                <a16:creationId xmlns:a16="http://schemas.microsoft.com/office/drawing/2014/main" id="{A0CB8A26-6A12-4725-927A-D6238DB830E9}"/>
+              </a:ext>
+            </a:extLst>
+          </p:cNvPr>
+          <p:cNvPicPr>
+            <a:picLocks noChangeAspect="1"/>
+          </p:cNvPicPr>
+          <p:nvPr/>
+        </p:nvPicPr>
+        <p:blipFill rotWithShape="1">
+          <a:blip r:embed="rId3"/>
+          <a:srcRect l="70582" t="3209" r="3840" b="2716"/>
+          <a:stretch/>
+        </p:blipFill>
+        <p:spPr>
+          <a:xfrm>
+            <a:off x="9804400" y="0"/>
+            <a:ext cx="2387601" cy="6858000"/>
+          </a:xfrm>
+          <a:prstGeom prst="rect">
+            <a:avLst/>
+          </a:prstGeom>
+        </p:spPr>
+      </p:pic>
+      <p:sp>
+        <p:nvSpPr>
+          <p:cNvPr id="9" name="Subtítulo 3">
+            <a:extLst>
+              <a:ext uri="{FF2B5EF4-FFF2-40B4-BE49-F238E27FC236}">
+                <a16:creationId xmlns:a16="http://schemas.microsoft.com/office/drawing/2014/main" id="{C23E924E-4905-4260-BAD0-E8A52F9195E5}"/>
+              </a:ext>
+            </a:extLst>
+          </p:cNvPr>
+          <p:cNvSpPr>
+            <a:spLocks noGrp="1"/>
+          </p:cNvSpPr>
+          <p:nvPr>
+            <p:ph type="subTitle" idx="1"/>
+          </p:nvPr>
+        </p:nvSpPr>
+        <p:spPr>
+          <a:xfrm>
+            <a:off x="7606747" y="4026716"/>
+            <a:ext cx="3126409" cy="1815861"/>
+          </a:xfrm>
+          <a:ln w="12700">
+            <a:solidFill>
+              <a:schemeClr val="tx1"/>
+            </a:solidFill>
+          </a:ln>
+        </p:spPr>
+        <p:txBody>
+          <a:bodyPr rtlCol="0"/>
+          <a:lstStyle/>
+          <a:p>
+            <a:pPr algn="ctr" rtl="0"/>
+            <a:r>
+              <a:rPr lang="es-ES" sz="4000" dirty="0"/>
+              <a:t>Extra</a:t>
+            </a:r>
             <a:endParaRPr lang="es-ES" dirty="0"/>
           </a:p>
         </p:txBody>
@@ -16795,20 +16963,13 @@
     </p:spTree>
     <p:extLst>
       <p:ext uri="{BB962C8B-B14F-4D97-AF65-F5344CB8AC3E}">
-        <p14:creationId xmlns:p14="http://schemas.microsoft.com/office/powerpoint/2010/main" val="243485827"/>
+        <p14:creationId xmlns:p14="http://schemas.microsoft.com/office/powerpoint/2010/main" val="3040712437"/>
       </p:ext>
     </p:extLst>
   </p:cSld>
   <p:clrMapOvr>
     <a:masterClrMapping/>
   </p:clrMapOvr>
-  <p:timing>
-    <p:tnLst>
-      <p:par>
-        <p:cTn id="1" dur="indefinite" restart="never" nodeType="tmRoot"/>
-      </p:par>
-    </p:tnLst>
-  </p:timing>
 </p:sld>
 </file>
 
@@ -16831,6 +16992,680 @@
       </p:grpSpPr>
       <p:sp>
         <p:nvSpPr>
+          <p:cNvPr id="2" name="Título 1">
+            <a:extLst>
+              <a:ext uri="{FF2B5EF4-FFF2-40B4-BE49-F238E27FC236}">
+                <a16:creationId xmlns:a16="http://schemas.microsoft.com/office/drawing/2014/main" id="{AEA5083B-CC27-4F1C-AD03-E3DBEC1C9E78}"/>
+              </a:ext>
+            </a:extLst>
+          </p:cNvPr>
+          <p:cNvSpPr>
+            <a:spLocks noGrp="1"/>
+          </p:cNvSpPr>
+          <p:nvPr>
+            <p:ph type="title"/>
+          </p:nvPr>
+        </p:nvSpPr>
+        <p:spPr>
+          <a:xfrm>
+            <a:off x="170779" y="67695"/>
+            <a:ext cx="5925221" cy="1101229"/>
+          </a:xfrm>
+        </p:spPr>
+        <p:txBody>
+          <a:bodyPr rtlCol="0"/>
+          <a:lstStyle/>
+          <a:p>
+            <a:pPr rtl="0"/>
+            <a:r>
+              <a:rPr lang="ca-ES" sz="2800" dirty="0"/>
+              <a:t>Comportament del filtre </a:t>
+            </a:r>
+            <a:r>
+              <a:rPr lang="ca-ES" sz="2800" dirty="0" err="1"/>
+              <a:t>passabaixos</a:t>
+            </a:r>
+            <a:r>
+              <a:rPr lang="ca-ES" sz="2800" dirty="0"/>
+              <a:t> de 34Hz</a:t>
+            </a:r>
+            <a:endParaRPr lang="es-ES" sz="2800" dirty="0"/>
+          </a:p>
+        </p:txBody>
+      </p:sp>
+      <p:sp>
+        <p:nvSpPr>
+          <p:cNvPr id="10" name="Rectángulo 9">
+            <a:extLst>
+              <a:ext uri="{FF2B5EF4-FFF2-40B4-BE49-F238E27FC236}">
+                <a16:creationId xmlns:a16="http://schemas.microsoft.com/office/drawing/2014/main" id="{2EF7F631-717C-4283-B2CA-33A0C8D9E561}"/>
+              </a:ext>
+            </a:extLst>
+          </p:cNvPr>
+          <p:cNvSpPr/>
+          <p:nvPr/>
+        </p:nvSpPr>
+        <p:spPr>
+          <a:xfrm>
+            <a:off x="10126980" y="6263640"/>
+            <a:ext cx="2065020" cy="594360"/>
+          </a:xfrm>
+          <a:prstGeom prst="rect">
+            <a:avLst/>
+          </a:prstGeom>
+          <a:solidFill>
+            <a:schemeClr val="bg1"/>
+          </a:solidFill>
+          <a:ln>
+            <a:noFill/>
+          </a:ln>
+        </p:spPr>
+        <p:style>
+          <a:lnRef idx="2">
+            <a:schemeClr val="accent1">
+              <a:shade val="50000"/>
+            </a:schemeClr>
+          </a:lnRef>
+          <a:fillRef idx="1">
+            <a:schemeClr val="accent1"/>
+          </a:fillRef>
+          <a:effectRef idx="0">
+            <a:schemeClr val="accent1"/>
+          </a:effectRef>
+          <a:fontRef idx="minor">
+            <a:schemeClr val="lt1"/>
+          </a:fontRef>
+        </p:style>
+        <p:txBody>
+          <a:bodyPr rtlCol="0" anchor="ctr"/>
+          <a:lstStyle/>
+          <a:p>
+            <a:pPr algn="ctr"/>
+            <a:endParaRPr lang="es-ES" dirty="0"/>
+          </a:p>
+        </p:txBody>
+      </p:sp>
+      <p:pic>
+        <p:nvPicPr>
+          <p:cNvPr id="5" name="Imatge 4">
+            <a:extLst>
+              <a:ext uri="{FF2B5EF4-FFF2-40B4-BE49-F238E27FC236}">
+                <a16:creationId xmlns:a16="http://schemas.microsoft.com/office/drawing/2014/main" id="{20C0576B-D581-475A-9045-07D86A3514EA}"/>
+              </a:ext>
+            </a:extLst>
+          </p:cNvPr>
+          <p:cNvPicPr>
+            <a:picLocks noChangeAspect="1"/>
+          </p:cNvPicPr>
+          <p:nvPr/>
+        </p:nvPicPr>
+        <p:blipFill rotWithShape="1">
+          <a:blip r:embed="rId3"/>
+          <a:srcRect t="1606"/>
+          <a:stretch/>
+        </p:blipFill>
+        <p:spPr>
+          <a:xfrm>
+            <a:off x="75414" y="1168924"/>
+            <a:ext cx="10932220" cy="5621381"/>
+          </a:xfrm>
+          <a:prstGeom prst="rect">
+            <a:avLst/>
+          </a:prstGeom>
+        </p:spPr>
+      </p:pic>
+      <p:sp>
+        <p:nvSpPr>
+          <p:cNvPr id="7" name="QuadreDeText 6">
+            <a:extLst>
+              <a:ext uri="{FF2B5EF4-FFF2-40B4-BE49-F238E27FC236}">
+                <a16:creationId xmlns:a16="http://schemas.microsoft.com/office/drawing/2014/main" id="{8CCEFEDB-A0BC-4097-831F-1A4FD16F23EA}"/>
+              </a:ext>
+            </a:extLst>
+          </p:cNvPr>
+          <p:cNvSpPr txBox="1"/>
+          <p:nvPr/>
+        </p:nvSpPr>
+        <p:spPr>
+          <a:xfrm>
+            <a:off x="1018903" y="1846216"/>
+            <a:ext cx="2412274" cy="646331"/>
+          </a:xfrm>
+          <a:prstGeom prst="rect">
+            <a:avLst/>
+          </a:prstGeom>
+          <a:noFill/>
+        </p:spPr>
+        <p:txBody>
+          <a:bodyPr wrap="square" rtlCol="0">
+            <a:spAutoFit/>
+          </a:bodyPr>
+          <a:lstStyle/>
+          <a:p>
+            <a:r>
+              <a:rPr lang="ca-ES" dirty="0"/>
+              <a:t>Desfasament no nul per a freqüències baixes</a:t>
+            </a:r>
+          </a:p>
+        </p:txBody>
+      </p:sp>
+    </p:spTree>
+    <p:extLst>
+      <p:ext uri="{BB962C8B-B14F-4D97-AF65-F5344CB8AC3E}">
+        <p14:creationId xmlns:p14="http://schemas.microsoft.com/office/powerpoint/2010/main" val="3517648248"/>
+      </p:ext>
+    </p:extLst>
+  </p:cSld>
+  <p:clrMapOvr>
+    <a:masterClrMapping/>
+  </p:clrMapOvr>
+</p:sld>
+</file>
+
+<file path=ppt/slides/slide33.xml><?xml version="1.0" encoding="utf-8"?>
+<p:sld xmlns:a="http://schemas.openxmlformats.org/drawingml/2006/main" xmlns:r="http://schemas.openxmlformats.org/officeDocument/2006/relationships" xmlns:p="http://schemas.openxmlformats.org/presentationml/2006/main">
+  <p:cSld>
+    <p:spTree>
+      <p:nvGrpSpPr>
+        <p:cNvPr id="1" name=""/>
+        <p:cNvGrpSpPr/>
+        <p:nvPr/>
+      </p:nvGrpSpPr>
+      <p:grpSpPr>
+        <a:xfrm>
+          <a:off x="0" y="0"/>
+          <a:ext cx="0" cy="0"/>
+          <a:chOff x="0" y="0"/>
+          <a:chExt cx="0" cy="0"/>
+        </a:xfrm>
+      </p:grpSpPr>
+      <p:sp>
+        <p:nvSpPr>
+          <p:cNvPr id="2" name="Título 1">
+            <a:extLst>
+              <a:ext uri="{FF2B5EF4-FFF2-40B4-BE49-F238E27FC236}">
+                <a16:creationId xmlns:a16="http://schemas.microsoft.com/office/drawing/2014/main" id="{AEA5083B-CC27-4F1C-AD03-E3DBEC1C9E78}"/>
+              </a:ext>
+            </a:extLst>
+          </p:cNvPr>
+          <p:cNvSpPr>
+            <a:spLocks noGrp="1"/>
+          </p:cNvSpPr>
+          <p:nvPr>
+            <p:ph type="title"/>
+          </p:nvPr>
+        </p:nvSpPr>
+        <p:spPr>
+          <a:xfrm>
+            <a:off x="170779" y="67695"/>
+            <a:ext cx="5925221" cy="1101229"/>
+          </a:xfrm>
+        </p:spPr>
+        <p:txBody>
+          <a:bodyPr rtlCol="0"/>
+          <a:lstStyle/>
+          <a:p>
+            <a:pPr rtl="0"/>
+            <a:r>
+              <a:rPr lang="ca-ES" sz="2800" dirty="0"/>
+              <a:t>Comportament del Derivador per a guany </a:t>
+            </a:r>
+            <a:r>
+              <a:rPr lang="ca-ES" sz="2800" dirty="0" err="1"/>
+              <a:t>Kd</a:t>
+            </a:r>
+            <a:r>
+              <a:rPr lang="ca-ES" sz="2800" dirty="0"/>
+              <a:t> = 0.1</a:t>
+            </a:r>
+            <a:endParaRPr lang="es-ES" sz="2800" dirty="0"/>
+          </a:p>
+        </p:txBody>
+      </p:sp>
+      <p:sp>
+        <p:nvSpPr>
+          <p:cNvPr id="10" name="Rectángulo 9">
+            <a:extLst>
+              <a:ext uri="{FF2B5EF4-FFF2-40B4-BE49-F238E27FC236}">
+                <a16:creationId xmlns:a16="http://schemas.microsoft.com/office/drawing/2014/main" id="{2EF7F631-717C-4283-B2CA-33A0C8D9E561}"/>
+              </a:ext>
+            </a:extLst>
+          </p:cNvPr>
+          <p:cNvSpPr/>
+          <p:nvPr/>
+        </p:nvSpPr>
+        <p:spPr>
+          <a:xfrm>
+            <a:off x="10126980" y="6263640"/>
+            <a:ext cx="2065020" cy="594360"/>
+          </a:xfrm>
+          <a:prstGeom prst="rect">
+            <a:avLst/>
+          </a:prstGeom>
+          <a:solidFill>
+            <a:schemeClr val="bg1"/>
+          </a:solidFill>
+          <a:ln>
+            <a:noFill/>
+          </a:ln>
+        </p:spPr>
+        <p:style>
+          <a:lnRef idx="2">
+            <a:schemeClr val="accent1">
+              <a:shade val="50000"/>
+            </a:schemeClr>
+          </a:lnRef>
+          <a:fillRef idx="1">
+            <a:schemeClr val="accent1"/>
+          </a:fillRef>
+          <a:effectRef idx="0">
+            <a:schemeClr val="accent1"/>
+          </a:effectRef>
+          <a:fontRef idx="minor">
+            <a:schemeClr val="lt1"/>
+          </a:fontRef>
+        </p:style>
+        <p:txBody>
+          <a:bodyPr rtlCol="0" anchor="ctr"/>
+          <a:lstStyle/>
+          <a:p>
+            <a:pPr algn="ctr"/>
+            <a:endParaRPr lang="es-ES" dirty="0"/>
+          </a:p>
+        </p:txBody>
+      </p:sp>
+      <p:pic>
+        <p:nvPicPr>
+          <p:cNvPr id="5" name="Imatge 4">
+            <a:extLst>
+              <a:ext uri="{FF2B5EF4-FFF2-40B4-BE49-F238E27FC236}">
+                <a16:creationId xmlns:a16="http://schemas.microsoft.com/office/drawing/2014/main" id="{20C0576B-D581-475A-9045-07D86A3514EA}"/>
+              </a:ext>
+            </a:extLst>
+          </p:cNvPr>
+          <p:cNvPicPr>
+            <a:picLocks noChangeAspect="1"/>
+          </p:cNvPicPr>
+          <p:nvPr/>
+        </p:nvPicPr>
+        <p:blipFill rotWithShape="1">
+          <a:blip r:embed="rId3"/>
+          <a:srcRect t="1211" b="-18"/>
+          <a:stretch/>
+        </p:blipFill>
+        <p:spPr>
+          <a:xfrm>
+            <a:off x="75413" y="1148954"/>
+            <a:ext cx="10940929" cy="5643056"/>
+          </a:xfrm>
+          <a:prstGeom prst="rect">
+            <a:avLst/>
+          </a:prstGeom>
+        </p:spPr>
+      </p:pic>
+    </p:spTree>
+    <p:extLst>
+      <p:ext uri="{BB962C8B-B14F-4D97-AF65-F5344CB8AC3E}">
+        <p14:creationId xmlns:p14="http://schemas.microsoft.com/office/powerpoint/2010/main" val="1300211140"/>
+      </p:ext>
+    </p:extLst>
+  </p:cSld>
+  <p:clrMapOvr>
+    <a:masterClrMapping/>
+  </p:clrMapOvr>
+</p:sld>
+</file>
+
+<file path=ppt/slides/slide34.xml><?xml version="1.0" encoding="utf-8"?>
+<p:sld xmlns:a="http://schemas.openxmlformats.org/drawingml/2006/main" xmlns:r="http://schemas.openxmlformats.org/officeDocument/2006/relationships" xmlns:p="http://schemas.openxmlformats.org/presentationml/2006/main">
+  <p:cSld>
+    <p:spTree>
+      <p:nvGrpSpPr>
+        <p:cNvPr id="1" name=""/>
+        <p:cNvGrpSpPr/>
+        <p:nvPr/>
+      </p:nvGrpSpPr>
+      <p:grpSpPr>
+        <a:xfrm>
+          <a:off x="0" y="0"/>
+          <a:ext cx="0" cy="0"/>
+          <a:chOff x="0" y="0"/>
+          <a:chExt cx="0" cy="0"/>
+        </a:xfrm>
+      </p:grpSpPr>
+      <p:sp>
+        <p:nvSpPr>
+          <p:cNvPr id="2" name="Título 1">
+            <a:extLst>
+              <a:ext uri="{FF2B5EF4-FFF2-40B4-BE49-F238E27FC236}">
+                <a16:creationId xmlns:a16="http://schemas.microsoft.com/office/drawing/2014/main" id="{AEA5083B-CC27-4F1C-AD03-E3DBEC1C9E78}"/>
+              </a:ext>
+            </a:extLst>
+          </p:cNvPr>
+          <p:cNvSpPr>
+            <a:spLocks noGrp="1"/>
+          </p:cNvSpPr>
+          <p:nvPr>
+            <p:ph type="title"/>
+          </p:nvPr>
+        </p:nvSpPr>
+        <p:spPr>
+          <a:xfrm>
+            <a:off x="170779" y="67695"/>
+            <a:ext cx="5925221" cy="1101229"/>
+          </a:xfrm>
+        </p:spPr>
+        <p:txBody>
+          <a:bodyPr rtlCol="0"/>
+          <a:lstStyle/>
+          <a:p>
+            <a:pPr rtl="0"/>
+            <a:r>
+              <a:rPr lang="ca-ES" sz="2800" dirty="0"/>
+              <a:t>Comportament del Derivador per a guany </a:t>
+            </a:r>
+            <a:r>
+              <a:rPr lang="ca-ES" sz="2800" dirty="0" err="1"/>
+              <a:t>Kd</a:t>
+            </a:r>
+            <a:r>
+              <a:rPr lang="ca-ES" sz="2800" dirty="0"/>
+              <a:t> = 0.01</a:t>
+            </a:r>
+            <a:endParaRPr lang="es-ES" sz="2800" dirty="0"/>
+          </a:p>
+        </p:txBody>
+      </p:sp>
+      <p:sp>
+        <p:nvSpPr>
+          <p:cNvPr id="10" name="Rectángulo 9">
+            <a:extLst>
+              <a:ext uri="{FF2B5EF4-FFF2-40B4-BE49-F238E27FC236}">
+                <a16:creationId xmlns:a16="http://schemas.microsoft.com/office/drawing/2014/main" id="{2EF7F631-717C-4283-B2CA-33A0C8D9E561}"/>
+              </a:ext>
+            </a:extLst>
+          </p:cNvPr>
+          <p:cNvSpPr/>
+          <p:nvPr/>
+        </p:nvSpPr>
+        <p:spPr>
+          <a:xfrm>
+            <a:off x="10126980" y="6263640"/>
+            <a:ext cx="2065020" cy="594360"/>
+          </a:xfrm>
+          <a:prstGeom prst="rect">
+            <a:avLst/>
+          </a:prstGeom>
+          <a:solidFill>
+            <a:schemeClr val="bg1"/>
+          </a:solidFill>
+          <a:ln>
+            <a:noFill/>
+          </a:ln>
+        </p:spPr>
+        <p:style>
+          <a:lnRef idx="2">
+            <a:schemeClr val="accent1">
+              <a:shade val="50000"/>
+            </a:schemeClr>
+          </a:lnRef>
+          <a:fillRef idx="1">
+            <a:schemeClr val="accent1"/>
+          </a:fillRef>
+          <a:effectRef idx="0">
+            <a:schemeClr val="accent1"/>
+          </a:effectRef>
+          <a:fontRef idx="minor">
+            <a:schemeClr val="lt1"/>
+          </a:fontRef>
+        </p:style>
+        <p:txBody>
+          <a:bodyPr rtlCol="0" anchor="ctr"/>
+          <a:lstStyle/>
+          <a:p>
+            <a:pPr algn="ctr"/>
+            <a:endParaRPr lang="es-ES" dirty="0"/>
+          </a:p>
+        </p:txBody>
+      </p:sp>
+      <p:pic>
+        <p:nvPicPr>
+          <p:cNvPr id="5" name="Imatge 4">
+            <a:extLst>
+              <a:ext uri="{FF2B5EF4-FFF2-40B4-BE49-F238E27FC236}">
+                <a16:creationId xmlns:a16="http://schemas.microsoft.com/office/drawing/2014/main" id="{20C0576B-D581-475A-9045-07D86A3514EA}"/>
+              </a:ext>
+            </a:extLst>
+          </p:cNvPr>
+          <p:cNvPicPr>
+            <a:picLocks noChangeAspect="1"/>
+          </p:cNvPicPr>
+          <p:nvPr/>
+        </p:nvPicPr>
+        <p:blipFill rotWithShape="1">
+          <a:blip r:embed="rId3"/>
+          <a:srcRect l="-1" t="1566" r="-326" b="-233"/>
+          <a:stretch/>
+        </p:blipFill>
+        <p:spPr>
+          <a:xfrm>
+            <a:off x="74981" y="1148958"/>
+            <a:ext cx="10976610" cy="5635023"/>
+          </a:xfrm>
+          <a:prstGeom prst="rect">
+            <a:avLst/>
+          </a:prstGeom>
+        </p:spPr>
+      </p:pic>
+    </p:spTree>
+    <p:extLst>
+      <p:ext uri="{BB962C8B-B14F-4D97-AF65-F5344CB8AC3E}">
+        <p14:creationId xmlns:p14="http://schemas.microsoft.com/office/powerpoint/2010/main" val="2177259893"/>
+      </p:ext>
+    </p:extLst>
+  </p:cSld>
+  <p:clrMapOvr>
+    <a:masterClrMapping/>
+  </p:clrMapOvr>
+</p:sld>
+</file>
+
+<file path=ppt/slides/slide35.xml><?xml version="1.0" encoding="utf-8"?>
+<p:sld xmlns:a="http://schemas.openxmlformats.org/drawingml/2006/main" xmlns:r="http://schemas.openxmlformats.org/officeDocument/2006/relationships" xmlns:p="http://schemas.openxmlformats.org/presentationml/2006/main">
+  <p:cSld>
+    <p:spTree>
+      <p:nvGrpSpPr>
+        <p:cNvPr id="1" name=""/>
+        <p:cNvGrpSpPr/>
+        <p:nvPr/>
+      </p:nvGrpSpPr>
+      <p:grpSpPr>
+        <a:xfrm>
+          <a:off x="0" y="0"/>
+          <a:ext cx="0" cy="0"/>
+          <a:chOff x="0" y="0"/>
+          <a:chExt cx="0" cy="0"/>
+        </a:xfrm>
+      </p:grpSpPr>
+      <p:sp>
+        <p:nvSpPr>
+          <p:cNvPr id="2" name="Contenidor de contingut 1">
+            <a:extLst>
+              <a:ext uri="{FF2B5EF4-FFF2-40B4-BE49-F238E27FC236}">
+                <a16:creationId xmlns:a16="http://schemas.microsoft.com/office/drawing/2014/main" id="{90BA015A-20AF-440F-8413-D939C69EAB2F}"/>
+              </a:ext>
+            </a:extLst>
+          </p:cNvPr>
+          <p:cNvSpPr>
+            <a:spLocks noGrp="1"/>
+          </p:cNvSpPr>
+          <p:nvPr>
+            <p:ph sz="half" idx="1"/>
+          </p:nvPr>
+        </p:nvSpPr>
+        <p:spPr>
+          <a:xfrm>
+            <a:off x="3453817" y="2007458"/>
+            <a:ext cx="3735548" cy="2638434"/>
+          </a:xfrm>
+        </p:spPr>
+        <p:txBody>
+          <a:bodyPr/>
+          <a:lstStyle/>
+          <a:p>
+            <a:pPr marL="0" indent="0" algn="just">
+              <a:buNone/>
+            </a:pPr>
+            <a:r>
+              <a:rPr lang="ca-ES" dirty="0"/>
+              <a:t>No activar el filtre si no és necessari</a:t>
+            </a:r>
+          </a:p>
+          <a:p>
+            <a:pPr marL="0" indent="0" algn="just">
+              <a:buNone/>
+            </a:pPr>
+            <a:r>
+              <a:rPr lang="ca-ES" dirty="0"/>
+              <a:t>Per evitar zona morta fer servir PID en velocitat</a:t>
+            </a:r>
+          </a:p>
+          <a:p>
+            <a:pPr marL="0" indent="0" algn="just">
+              <a:buNone/>
+            </a:pPr>
+            <a:r>
+              <a:rPr lang="ca-ES" dirty="0"/>
+              <a:t>Perquè filtre abans de </a:t>
+            </a:r>
+            <a:r>
+              <a:rPr lang="ca-ES" dirty="0" err="1"/>
+              <a:t>Kd</a:t>
+            </a:r>
+            <a:r>
+              <a:rPr lang="ca-ES" dirty="0"/>
+              <a:t> i no després?</a:t>
+            </a:r>
+          </a:p>
+        </p:txBody>
+      </p:sp>
+      <p:sp>
+        <p:nvSpPr>
+          <p:cNvPr id="5" name="Títol 4">
+            <a:extLst>
+              <a:ext uri="{FF2B5EF4-FFF2-40B4-BE49-F238E27FC236}">
+                <a16:creationId xmlns:a16="http://schemas.microsoft.com/office/drawing/2014/main" id="{A0961E97-8F98-4B4D-96F2-5C4364E6ACD3}"/>
+              </a:ext>
+            </a:extLst>
+          </p:cNvPr>
+          <p:cNvSpPr>
+            <a:spLocks noGrp="1"/>
+          </p:cNvSpPr>
+          <p:nvPr>
+            <p:ph type="title"/>
+          </p:nvPr>
+        </p:nvSpPr>
+        <p:spPr>
+          <a:xfrm>
+            <a:off x="247442" y="423611"/>
+            <a:ext cx="9131100" cy="432000"/>
+          </a:xfrm>
+        </p:spPr>
+        <p:txBody>
+          <a:bodyPr/>
+          <a:lstStyle/>
+          <a:p>
+            <a:r>
+              <a:rPr lang="ca-ES" dirty="0"/>
+              <a:t>Punts pendents i propostes</a:t>
+            </a:r>
+          </a:p>
+        </p:txBody>
+      </p:sp>
+      <p:sp>
+        <p:nvSpPr>
+          <p:cNvPr id="7" name="Rectángulo 9">
+            <a:extLst>
+              <a:ext uri="{FF2B5EF4-FFF2-40B4-BE49-F238E27FC236}">
+                <a16:creationId xmlns:a16="http://schemas.microsoft.com/office/drawing/2014/main" id="{CCB320B0-EB9E-4107-9824-08DC54BF4B4A}"/>
+              </a:ext>
+            </a:extLst>
+          </p:cNvPr>
+          <p:cNvSpPr/>
+          <p:nvPr/>
+        </p:nvSpPr>
+        <p:spPr>
+          <a:xfrm>
+            <a:off x="10126980" y="6263640"/>
+            <a:ext cx="2065020" cy="594360"/>
+          </a:xfrm>
+          <a:prstGeom prst="rect">
+            <a:avLst/>
+          </a:prstGeom>
+          <a:solidFill>
+            <a:schemeClr val="bg1"/>
+          </a:solidFill>
+          <a:ln>
+            <a:noFill/>
+          </a:ln>
+        </p:spPr>
+        <p:style>
+          <a:lnRef idx="2">
+            <a:schemeClr val="accent1">
+              <a:shade val="50000"/>
+            </a:schemeClr>
+          </a:lnRef>
+          <a:fillRef idx="1">
+            <a:schemeClr val="accent1"/>
+          </a:fillRef>
+          <a:effectRef idx="0">
+            <a:schemeClr val="accent1"/>
+          </a:effectRef>
+          <a:fontRef idx="minor">
+            <a:schemeClr val="lt1"/>
+          </a:fontRef>
+        </p:style>
+        <p:txBody>
+          <a:bodyPr rtlCol="0" anchor="ctr"/>
+          <a:lstStyle/>
+          <a:p>
+            <a:pPr algn="ctr"/>
+            <a:endParaRPr lang="es-ES" dirty="0"/>
+          </a:p>
+        </p:txBody>
+      </p:sp>
+    </p:spTree>
+    <p:extLst>
+      <p:ext uri="{BB962C8B-B14F-4D97-AF65-F5344CB8AC3E}">
+        <p14:creationId xmlns:p14="http://schemas.microsoft.com/office/powerpoint/2010/main" val="243485827"/>
+      </p:ext>
+    </p:extLst>
+  </p:cSld>
+  <p:clrMapOvr>
+    <a:masterClrMapping/>
+  </p:clrMapOvr>
+</p:sld>
+</file>
+
+<file path=ppt/slides/slide36.xml><?xml version="1.0" encoding="utf-8"?>
+<p:sld xmlns:a="http://schemas.openxmlformats.org/drawingml/2006/main" xmlns:r="http://schemas.openxmlformats.org/officeDocument/2006/relationships" xmlns:p="http://schemas.openxmlformats.org/presentationml/2006/main">
+  <p:cSld>
+    <p:spTree>
+      <p:nvGrpSpPr>
+        <p:cNvPr id="1" name=""/>
+        <p:cNvGrpSpPr/>
+        <p:nvPr/>
+      </p:nvGrpSpPr>
+      <p:grpSpPr>
+        <a:xfrm>
+          <a:off x="0" y="0"/>
+          <a:ext cx="0" cy="0"/>
+          <a:chOff x="0" y="0"/>
+          <a:chExt cx="0" cy="0"/>
+        </a:xfrm>
+      </p:grpSpPr>
+      <p:sp>
+        <p:nvSpPr>
           <p:cNvPr id="20" name="Título 19">
             <a:extLst>
               <a:ext uri="{FF2B5EF4-FFF2-40B4-BE49-F238E27FC236}">
@@ -16868,13 +17703,6 @@
   <p:clrMapOvr>
     <a:masterClrMapping/>
   </p:clrMapOvr>
-  <p:timing>
-    <p:tnLst>
-      <p:par>
-        <p:cTn id="1" dur="indefinite" restart="never" nodeType="tmRoot"/>
-      </p:par>
-    </p:tnLst>
-  </p:timing>
 </p:sld>
 </file>
 
@@ -17029,7 +17857,7 @@
         </p:blipFill>
         <p:spPr>
           <a:xfrm>
-            <a:off x="79515" y="1128634"/>
+            <a:off x="70088" y="1128634"/>
             <a:ext cx="9928196" cy="5660013"/>
           </a:xfrm>
           <a:prstGeom prst="rect">
@@ -17112,13 +17940,6 @@
   <p:clrMapOvr>
     <a:masterClrMapping/>
   </p:clrMapOvr>
-  <p:timing>
-    <p:tnLst>
-      <p:par>
-        <p:cTn id="1" dur="indefinite" restart="never" nodeType="tmRoot"/>
-      </p:par>
-    </p:tnLst>
-  </p:timing>
 </p:sld>
 </file>
 
@@ -17273,7 +18094,7 @@
         </p:blipFill>
         <p:spPr>
           <a:xfrm>
-            <a:off x="79515" y="1128634"/>
+            <a:off x="70088" y="1128634"/>
             <a:ext cx="9928196" cy="5660013"/>
           </a:xfrm>
           <a:prstGeom prst="rect">
@@ -17356,13 +18177,6 @@
   <p:clrMapOvr>
     <a:masterClrMapping/>
   </p:clrMapOvr>
-  <p:timing>
-    <p:tnLst>
-      <p:par>
-        <p:cTn id="1" dur="indefinite" restart="never" nodeType="tmRoot"/>
-      </p:par>
-    </p:tnLst>
-  </p:timing>
 </p:sld>
 </file>
 
@@ -17517,7 +18331,7 @@
         </p:blipFill>
         <p:spPr>
           <a:xfrm>
-            <a:off x="79515" y="1128634"/>
+            <a:off x="70088" y="1128634"/>
             <a:ext cx="9928195" cy="5660012"/>
           </a:xfrm>
           <a:prstGeom prst="rect">
@@ -17600,13 +18414,6 @@
   <p:clrMapOvr>
     <a:masterClrMapping/>
   </p:clrMapOvr>
-  <p:timing>
-    <p:tnLst>
-      <p:par>
-        <p:cTn id="1" dur="indefinite" restart="never" nodeType="tmRoot"/>
-      </p:par>
-    </p:tnLst>
-  </p:timing>
 </p:sld>
 </file>
 
@@ -17752,7 +18559,7 @@
         </p:blipFill>
         <p:spPr>
           <a:xfrm>
-            <a:off x="79515" y="1128634"/>
+            <a:off x="70088" y="1128634"/>
             <a:ext cx="9928195" cy="5660012"/>
           </a:xfrm>
           <a:prstGeom prst="rect">
@@ -17827,13 +18634,6 @@
   <p:clrMapOvr>
     <a:masterClrMapping/>
   </p:clrMapOvr>
-  <p:timing>
-    <p:tnLst>
-      <p:par>
-        <p:cTn id="1" dur="indefinite" restart="never" nodeType="tmRoot"/>
-      </p:par>
-    </p:tnLst>
-  </p:timing>
 </p:sld>
 </file>
 
@@ -17979,7 +18779,7 @@
         </p:blipFill>
         <p:spPr>
           <a:xfrm>
-            <a:off x="79517" y="1128634"/>
+            <a:off x="70090" y="1128634"/>
             <a:ext cx="9928194" cy="5660012"/>
           </a:xfrm>
           <a:prstGeom prst="rect">
@@ -18054,13 +18854,6 @@
   <p:clrMapOvr>
     <a:masterClrMapping/>
   </p:clrMapOvr>
-  <p:timing>
-    <p:tnLst>
-      <p:par>
-        <p:cTn id="1" dur="indefinite" restart="never" nodeType="tmRoot"/>
-      </p:par>
-    </p:tnLst>
-  </p:timing>
 </p:sld>
 </file>
 
@@ -19097,13 +19890,6 @@
   <p:clrMapOvr>
     <a:masterClrMapping/>
   </p:clrMapOvr>
-  <p:timing>
-    <p:tnLst>
-      <p:par>
-        <p:cTn id="1" dur="indefinite" restart="never" nodeType="tmRoot"/>
-      </p:par>
-    </p:tnLst>
-  </p:timing>
 </p:sld>
 </file>
 
@@ -19932,6 +20718,15 @@
 </file>
 
 <file path=customXml/item1.xml><?xml version="1.0" encoding="utf-8"?>
+<p:properties xmlns:p="http://schemas.microsoft.com/office/2006/metadata/properties" xmlns:xsi="http://www.w3.org/2001/XMLSchema-instance" xmlns:pc="http://schemas.microsoft.com/office/infopath/2007/PartnerControls">
+  <documentManagement>
+    <_ip_UnifiedCompliancePolicyUIAction xmlns="http://schemas.microsoft.com/sharepoint/v3" xsi:nil="true"/>
+    <_ip_UnifiedCompliancePolicyProperties xmlns="http://schemas.microsoft.com/sharepoint/v3" xsi:nil="true"/>
+  </documentManagement>
+</p:properties>
+</file>
+
+<file path=customXml/item2.xml><?xml version="1.0" encoding="utf-8"?>
 <ct:contentTypeSchema xmlns:ct="http://schemas.microsoft.com/office/2006/metadata/contentType" xmlns:ma="http://schemas.microsoft.com/office/2006/metadata/properties/metaAttributes" ct:_="" ma:_="" ma:contentTypeName="Document" ma:contentTypeID="0x010100DEEA25CC0A0AC24199CDC46C25B8B0BC" ma:contentTypeVersion="10" ma:contentTypeDescription="Create a new document." ma:contentTypeScope="" ma:versionID="e3b47856d4cf355c0dacb39e1084d14f">
   <xsd:schema xmlns:xsd="http://www.w3.org/2001/XMLSchema" xmlns:xs="http://www.w3.org/2001/XMLSchema" xmlns:p="http://schemas.microsoft.com/office/2006/metadata/properties" xmlns:ns1="http://schemas.microsoft.com/sharepoint/v3" xmlns:ns2="6dc4bcd6-49db-4c07-9060-8acfc67cef9f" xmlns:ns3="fb0879af-3eba-417a-a55a-ffe6dcd6ca77" targetNamespace="http://schemas.microsoft.com/office/2006/metadata/properties" ma:root="true" ma:fieldsID="a845a615265fdb1f7b12cc65ac20ecbd" ns1:_="" ns2:_="" ns3:_="">
     <xsd:import namespace="http://schemas.microsoft.com/sharepoint/v3"/>
@@ -20139,15 +20934,6 @@
 </ct:contentTypeSchema>
 </file>
 
-<file path=customXml/item2.xml><?xml version="1.0" encoding="utf-8"?>
-<p:properties xmlns:p="http://schemas.microsoft.com/office/2006/metadata/properties" xmlns:xsi="http://www.w3.org/2001/XMLSchema-instance" xmlns:pc="http://schemas.microsoft.com/office/infopath/2007/PartnerControls">
-  <documentManagement>
-    <_ip_UnifiedCompliancePolicyUIAction xmlns="http://schemas.microsoft.com/sharepoint/v3" xsi:nil="true"/>
-    <_ip_UnifiedCompliancePolicyProperties xmlns="http://schemas.microsoft.com/sharepoint/v3" xsi:nil="true"/>
-  </documentManagement>
-</p:properties>
-</file>
-
 <file path=customXml/item3.xml><?xml version="1.0" encoding="utf-8"?>
 <?mso-contentType ?>
 <FormTemplates xmlns="http://schemas.microsoft.com/sharepoint/v3/contenttype/forms">
@@ -20158,6 +20944,24 @@
 </file>
 
 <file path=customXml/itemProps1.xml><?xml version="1.0" encoding="utf-8"?>
+<ds:datastoreItem xmlns:ds="http://schemas.openxmlformats.org/officeDocument/2006/customXml" ds:itemID="{E4934E25-8442-49E9-ABDF-3146C4145F3B}">
+  <ds:schemaRefs>
+    <ds:schemaRef ds:uri="http://schemas.microsoft.com/office/infopath/2007/PartnerControls"/>
+    <ds:schemaRef ds:uri="http://purl.org/dc/elements/1.1/"/>
+    <ds:schemaRef ds:uri="http://schemas.microsoft.com/office/2006/metadata/properties"/>
+    <ds:schemaRef ds:uri="6dc4bcd6-49db-4c07-9060-8acfc67cef9f"/>
+    <ds:schemaRef ds:uri="http://www.w3.org/XML/1998/namespace"/>
+    <ds:schemaRef ds:uri="http://schemas.openxmlformats.org/package/2006/metadata/core-properties"/>
+    <ds:schemaRef ds:uri="http://purl.org/dc/terms/"/>
+    <ds:schemaRef ds:uri="http://schemas.microsoft.com/office/2006/documentManagement/types"/>
+    <ds:schemaRef ds:uri="fb0879af-3eba-417a-a55a-ffe6dcd6ca77"/>
+    <ds:schemaRef ds:uri="http://schemas.microsoft.com/sharepoint/v3"/>
+    <ds:schemaRef ds:uri="http://purl.org/dc/dcmitype/"/>
+  </ds:schemaRefs>
+</ds:datastoreItem>
+</file>
+
+<file path=customXml/itemProps2.xml><?xml version="1.0" encoding="utf-8"?>
 <ds:datastoreItem xmlns:ds="http://schemas.openxmlformats.org/officeDocument/2006/customXml" ds:itemID="{1BBB5711-29E1-4F8E-81A0-7947C57B208A}">
   <ds:schemaRefs>
     <ds:schemaRef ds:uri="http://schemas.microsoft.com/office/2006/metadata/contentType"/>
@@ -20177,24 +20981,6 @@
 </ds:datastoreItem>
 </file>
 
-<file path=customXml/itemProps2.xml><?xml version="1.0" encoding="utf-8"?>
-<ds:datastoreItem xmlns:ds="http://schemas.openxmlformats.org/officeDocument/2006/customXml" ds:itemID="{E4934E25-8442-49E9-ABDF-3146C4145F3B}">
-  <ds:schemaRefs>
-    <ds:schemaRef ds:uri="http://schemas.microsoft.com/office/infopath/2007/PartnerControls"/>
-    <ds:schemaRef ds:uri="http://purl.org/dc/elements/1.1/"/>
-    <ds:schemaRef ds:uri="http://schemas.microsoft.com/office/2006/metadata/properties"/>
-    <ds:schemaRef ds:uri="6dc4bcd6-49db-4c07-9060-8acfc67cef9f"/>
-    <ds:schemaRef ds:uri="http://www.w3.org/XML/1998/namespace"/>
-    <ds:schemaRef ds:uri="http://schemas.openxmlformats.org/package/2006/metadata/core-properties"/>
-    <ds:schemaRef ds:uri="http://purl.org/dc/terms/"/>
-    <ds:schemaRef ds:uri="http://schemas.microsoft.com/office/2006/documentManagement/types"/>
-    <ds:schemaRef ds:uri="fb0879af-3eba-417a-a55a-ffe6dcd6ca77"/>
-    <ds:schemaRef ds:uri="http://schemas.microsoft.com/sharepoint/v3"/>
-    <ds:schemaRef ds:uri="http://purl.org/dc/dcmitype/"/>
-  </ds:schemaRefs>
-</ds:datastoreItem>
-</file>
-
 <file path=customXml/itemProps3.xml><?xml version="1.0" encoding="utf-8"?>
 <ds:datastoreItem xmlns:ds="http://schemas.openxmlformats.org/officeDocument/2006/customXml" ds:itemID="{F6CB1848-D3E0-4F10-B640-720BE758B85B}">
   <ds:schemaRefs>

</xml_diff>

<commit_message>
Added Theoretical bode plots for Kd and filter | Added Bibliography document | Fixed main README markdown in 4. | Added filter and derivator analisis to compendium
</commit_message>
<xml_diff>
--- a/Presentacions/Resultats de l’Anàlisi de la Planta de DS - Compendi 1-4 .pptx
+++ b/Presentacions/Resultats de l’Anàlisi de la Planta de DS - Compendi 1-4 .pptx
@@ -5,10 +5,10 @@
     <p:sldMasterId id="2147483648" r:id="rId4"/>
   </p:sldMasterIdLst>
   <p:notesMasterIdLst>
-    <p:notesMasterId r:id="rId41"/>
+    <p:notesMasterId r:id="rId42"/>
   </p:notesMasterIdLst>
   <p:handoutMasterIdLst>
-    <p:handoutMasterId r:id="rId42"/>
+    <p:handoutMasterId r:id="rId43"/>
   </p:handoutMasterIdLst>
   <p:sldIdLst>
     <p:sldId id="282" r:id="rId5"/>
@@ -45,8 +45,9 @@
     <p:sldId id="332" r:id="rId36"/>
     <p:sldId id="334" r:id="rId37"/>
     <p:sldId id="335" r:id="rId38"/>
-    <p:sldId id="330" r:id="rId39"/>
-    <p:sldId id="296" r:id="rId40"/>
+    <p:sldId id="336" r:id="rId39"/>
+    <p:sldId id="330" r:id="rId40"/>
+    <p:sldId id="296" r:id="rId41"/>
   </p:sldIdLst>
   <p:sldSz cx="12192000" cy="6858000"/>
   <p:notesSz cx="6858000" cy="9144000"/>
@@ -252,7 +253,7 @@
             <a:pPr rtl="0"/>
             <a:fld id="{A0CB070B-93E8-4E3F-93BA-4C6F4F890423}" type="datetime1">
               <a:rPr lang="es-ES" smtClean="0"/>
-              <a:t>30/03/2022</a:t>
+              <a:t>06/04/2022</a:t>
             </a:fld>
             <a:endParaRPr lang="es-ES"/>
           </a:p>
@@ -434,7 +435,7 @@
             <a:pPr rtl="0"/>
             <a:fld id="{09EAA754-C899-4020-AF30-0F80416D4F92}" type="datetime1">
               <a:rPr lang="es-ES" noProof="0" smtClean="0"/>
-              <a:t>30/03/2022</a:t>
+              <a:t>06/04/2022</a:t>
             </a:fld>
             <a:endParaRPr lang="es-ES" noProof="0"/>
           </a:p>
@@ -3048,7 +3049,7 @@
       </p:grpSpPr>
       <p:sp>
         <p:nvSpPr>
-          <p:cNvPr id="2" name="Contenidor d'imatge de diapositiva 1"/>
+          <p:cNvPr id="2" name="Marcador de posición de imagen de diapositiva 1"/>
           <p:cNvSpPr>
             <a:spLocks noGrp="1" noRot="1" noChangeAspect="1"/>
           </p:cNvSpPr>
@@ -3060,7 +3061,7 @@
       </p:sp>
       <p:sp>
         <p:nvSpPr>
-          <p:cNvPr id="3" name="Contenidor de notes 2"/>
+          <p:cNvPr id="3" name="Marcador de posición de notas 2"/>
           <p:cNvSpPr>
             <a:spLocks noGrp="1"/>
           </p:cNvSpPr>
@@ -3070,19 +3071,37 @@
         </p:nvSpPr>
         <p:spPr/>
         <p:txBody>
-          <a:bodyPr/>
-          <a:lstStyle/>
-          <a:p>
-            <a:r>
-              <a:rPr lang="ca-ES" dirty="0"/>
-              <a:t>Modelar zona morta de velocitat (A partir de quina velocitat el motor para -&gt; Zona morta 3D en comptes de plana)</a:t>
-            </a:r>
-          </a:p>
-        </p:txBody>
-      </p:sp>
-      <p:sp>
-        <p:nvSpPr>
-          <p:cNvPr id="4" name="Contenidor de número de diapositiva 3"/>
+          <a:bodyPr rtlCol="0"/>
+          <a:lstStyle/>
+          <a:p>
+            <a:pPr rtl="0"/>
+            <a:r>
+              <a:rPr lang="es-ES" dirty="0" err="1"/>
+              <a:t>Util</a:t>
+            </a:r>
+            <a:r>
+              <a:rPr lang="es-ES" dirty="0"/>
+              <a:t> en la zona de </a:t>
+            </a:r>
+            <a:r>
+              <a:rPr lang="es-ES" dirty="0" err="1"/>
+              <a:t>pendent</a:t>
+            </a:r>
+            <a:r>
+              <a:rPr lang="es-ES" dirty="0"/>
+              <a:t> </a:t>
+            </a:r>
+            <a:r>
+              <a:rPr lang="es-ES" dirty="0" err="1"/>
+              <a:t>positiu</a:t>
+            </a:r>
+            <a:endParaRPr lang="es-ES" dirty="0"/>
+          </a:p>
+        </p:txBody>
+      </p:sp>
+      <p:sp>
+        <p:nvSpPr>
+          <p:cNvPr id="4" name="Marcador de posición de número de diapositiva 3"/>
           <p:cNvSpPr>
             <a:spLocks noGrp="1"/>
           </p:cNvSpPr>
@@ -3092,22 +3111,22 @@
         </p:nvSpPr>
         <p:spPr/>
         <p:txBody>
-          <a:bodyPr/>
+          <a:bodyPr rtlCol="0"/>
           <a:lstStyle/>
           <a:p>
             <a:pPr rtl="0"/>
             <a:fld id="{8530193B-564F-4854-8A52-728F3FB19C85}" type="slidenum">
-              <a:rPr lang="es-ES" noProof="0" smtClean="0"/>
+              <a:rPr lang="es-ES" smtClean="0"/>
               <a:t>35</a:t>
             </a:fld>
-            <a:endParaRPr lang="es-ES" noProof="0"/>
+            <a:endParaRPr lang="es-ES" dirty="0"/>
           </a:p>
         </p:txBody>
       </p:sp>
     </p:spTree>
     <p:extLst>
       <p:ext uri="{BB962C8B-B14F-4D97-AF65-F5344CB8AC3E}">
-        <p14:creationId xmlns:p14="http://schemas.microsoft.com/office/powerpoint/2010/main" val="23897768"/>
+        <p14:creationId xmlns:p14="http://schemas.microsoft.com/office/powerpoint/2010/main" val="3523220053"/>
       </p:ext>
     </p:extLst>
   </p:cSld>
@@ -3136,6 +3155,94 @@
       </p:grpSpPr>
       <p:sp>
         <p:nvSpPr>
+          <p:cNvPr id="2" name="Contenidor d'imatge de diapositiva 1"/>
+          <p:cNvSpPr>
+            <a:spLocks noGrp="1" noRot="1" noChangeAspect="1"/>
+          </p:cNvSpPr>
+          <p:nvPr>
+            <p:ph type="sldImg"/>
+          </p:nvPr>
+        </p:nvSpPr>
+        <p:spPr/>
+      </p:sp>
+      <p:sp>
+        <p:nvSpPr>
+          <p:cNvPr id="3" name="Contenidor de notes 2"/>
+          <p:cNvSpPr>
+            <a:spLocks noGrp="1"/>
+          </p:cNvSpPr>
+          <p:nvPr>
+            <p:ph type="body" idx="1"/>
+          </p:nvPr>
+        </p:nvSpPr>
+        <p:spPr/>
+        <p:txBody>
+          <a:bodyPr/>
+          <a:lstStyle/>
+          <a:p>
+            <a:r>
+              <a:rPr lang="ca-ES" dirty="0"/>
+              <a:t>Modelar zona morta de velocitat (A partir de quina velocitat el motor para -&gt; Zona morta 3D en comptes de plana)</a:t>
+            </a:r>
+          </a:p>
+        </p:txBody>
+      </p:sp>
+      <p:sp>
+        <p:nvSpPr>
+          <p:cNvPr id="4" name="Contenidor de número de diapositiva 3"/>
+          <p:cNvSpPr>
+            <a:spLocks noGrp="1"/>
+          </p:cNvSpPr>
+          <p:nvPr>
+            <p:ph type="sldNum" sz="quarter" idx="5"/>
+          </p:nvPr>
+        </p:nvSpPr>
+        <p:spPr/>
+        <p:txBody>
+          <a:bodyPr/>
+          <a:lstStyle/>
+          <a:p>
+            <a:pPr rtl="0"/>
+            <a:fld id="{8530193B-564F-4854-8A52-728F3FB19C85}" type="slidenum">
+              <a:rPr lang="es-ES" noProof="0" smtClean="0"/>
+              <a:t>36</a:t>
+            </a:fld>
+            <a:endParaRPr lang="es-ES" noProof="0"/>
+          </a:p>
+        </p:txBody>
+      </p:sp>
+    </p:spTree>
+    <p:extLst>
+      <p:ext uri="{BB962C8B-B14F-4D97-AF65-F5344CB8AC3E}">
+        <p14:creationId xmlns:p14="http://schemas.microsoft.com/office/powerpoint/2010/main" val="23897768"/>
+      </p:ext>
+    </p:extLst>
+  </p:cSld>
+  <p:clrMapOvr>
+    <a:masterClrMapping/>
+  </p:clrMapOvr>
+</p:notes>
+</file>
+
+<file path=ppt/notesSlides/notesSlide36.xml><?xml version="1.0" encoding="utf-8"?>
+<p:notes xmlns:a="http://schemas.openxmlformats.org/drawingml/2006/main" xmlns:r="http://schemas.openxmlformats.org/officeDocument/2006/relationships" xmlns:p="http://schemas.openxmlformats.org/presentationml/2006/main">
+  <p:cSld>
+    <p:spTree>
+      <p:nvGrpSpPr>
+        <p:cNvPr id="1" name=""/>
+        <p:cNvGrpSpPr/>
+        <p:nvPr/>
+      </p:nvGrpSpPr>
+      <p:grpSpPr>
+        <a:xfrm>
+          <a:off x="0" y="0"/>
+          <a:ext cx="0" cy="0"/>
+          <a:chOff x="0" y="0"/>
+          <a:chExt cx="0" cy="0"/>
+        </a:xfrm>
+      </p:grpSpPr>
+      <p:sp>
+        <p:nvSpPr>
           <p:cNvPr id="2" name="Marcador de posición de imagen de diapositiva 1"/>
           <p:cNvSpPr>
             <a:spLocks noGrp="1" noRot="1" noChangeAspect="1"/>
@@ -3184,7 +3291,7 @@
             <a:pPr rtl="0"/>
             <a:fld id="{8530193B-564F-4854-8A52-728F3FB19C85}" type="slidenum">
               <a:rPr lang="es-ES" smtClean="0"/>
-              <a:t>36</a:t>
+              <a:t>37</a:t>
             </a:fld>
             <a:endParaRPr lang="es-ES"/>
           </a:p>
@@ -17101,13 +17208,13 @@
         </p:nvPicPr>
         <p:blipFill rotWithShape="1">
           <a:blip r:embed="rId3"/>
-          <a:srcRect t="1606"/>
+          <a:srcRect t="1278" b="1697"/>
           <a:stretch/>
         </p:blipFill>
         <p:spPr>
           <a:xfrm>
-            <a:off x="75414" y="1168924"/>
-            <a:ext cx="10932220" cy="5621381"/>
+            <a:off x="75414" y="1117600"/>
+            <a:ext cx="10984472" cy="5672705"/>
           </a:xfrm>
           <a:prstGeom prst="rect">
             <a:avLst/>
@@ -17128,7 +17235,7 @@
         </p:nvSpPr>
         <p:spPr>
           <a:xfrm>
-            <a:off x="1018903" y="1846216"/>
+            <a:off x="1785257" y="1920119"/>
             <a:ext cx="2412274" cy="646331"/>
           </a:xfrm>
           <a:prstGeom prst="rect">
@@ -17145,6 +17252,93 @@
             <a:r>
               <a:rPr lang="ca-ES" dirty="0"/>
               <a:t>Desfasament no nul per a freqüències baixes</a:t>
+            </a:r>
+          </a:p>
+        </p:txBody>
+      </p:sp>
+      <p:sp>
+        <p:nvSpPr>
+          <p:cNvPr id="4" name="Rectangle 3">
+            <a:extLst>
+              <a:ext uri="{FF2B5EF4-FFF2-40B4-BE49-F238E27FC236}">
+                <a16:creationId xmlns:a16="http://schemas.microsoft.com/office/drawing/2014/main" id="{49C7C3E0-7BEC-4498-9523-00C4BD3FA994}"/>
+              </a:ext>
+            </a:extLst>
+          </p:cNvPr>
+          <p:cNvSpPr/>
+          <p:nvPr/>
+        </p:nvSpPr>
+        <p:spPr>
+          <a:xfrm>
+            <a:off x="4454013" y="1117600"/>
+            <a:ext cx="2190135" cy="51324"/>
+          </a:xfrm>
+          <a:prstGeom prst="rect">
+            <a:avLst/>
+          </a:prstGeom>
+          <a:solidFill>
+            <a:srgbClr val="FFFFFF"/>
+          </a:solidFill>
+          <a:ln>
+            <a:noFill/>
+          </a:ln>
+        </p:spPr>
+        <p:style>
+          <a:lnRef idx="2">
+            <a:schemeClr val="accent1">
+              <a:shade val="50000"/>
+            </a:schemeClr>
+          </a:lnRef>
+          <a:fillRef idx="1">
+            <a:schemeClr val="accent1"/>
+          </a:fillRef>
+          <a:effectRef idx="0">
+            <a:schemeClr val="accent1"/>
+          </a:effectRef>
+          <a:fontRef idx="minor">
+            <a:schemeClr val="lt1"/>
+          </a:fontRef>
+        </p:style>
+        <p:txBody>
+          <a:bodyPr rtlCol="0" anchor="ctr"/>
+          <a:lstStyle/>
+          <a:p>
+            <a:pPr algn="ctr"/>
+            <a:endParaRPr lang="ca-ES"/>
+          </a:p>
+        </p:txBody>
+      </p:sp>
+      <p:sp>
+        <p:nvSpPr>
+          <p:cNvPr id="8" name="QuadreDeText 7">
+            <a:extLst>
+              <a:ext uri="{FF2B5EF4-FFF2-40B4-BE49-F238E27FC236}">
+                <a16:creationId xmlns:a16="http://schemas.microsoft.com/office/drawing/2014/main" id="{9C2FB004-8CF0-453D-8DD9-ADB8F07A5296}"/>
+              </a:ext>
+            </a:extLst>
+          </p:cNvPr>
+          <p:cNvSpPr txBox="1"/>
+          <p:nvPr/>
+        </p:nvSpPr>
+        <p:spPr>
+          <a:xfrm>
+            <a:off x="5985615" y="1849497"/>
+            <a:ext cx="2777218" cy="369332"/>
+          </a:xfrm>
+          <a:prstGeom prst="rect">
+            <a:avLst/>
+          </a:prstGeom>
+          <a:noFill/>
+        </p:spPr>
+        <p:txBody>
+          <a:bodyPr wrap="square" rtlCol="0">
+            <a:spAutoFit/>
+          </a:bodyPr>
+          <a:lstStyle/>
+          <a:p>
+            <a:r>
+              <a:rPr lang="ca-ES" dirty="0"/>
+              <a:t>Freqüència de tall a 34 Hz</a:t>
             </a:r>
           </a:p>
         </p:txBody>
@@ -17290,19 +17484,106 @@
         </p:nvPicPr>
         <p:blipFill rotWithShape="1">
           <a:blip r:embed="rId3"/>
-          <a:srcRect t="1211" b="-18"/>
+          <a:srcRect t="1313" b="1741"/>
           <a:stretch/>
         </p:blipFill>
         <p:spPr>
           <a:xfrm>
-            <a:off x="75413" y="1148954"/>
-            <a:ext cx="10940929" cy="5643056"/>
+            <a:off x="75413" y="1117600"/>
+            <a:ext cx="10917301" cy="5674410"/>
           </a:xfrm>
           <a:prstGeom prst="rect">
             <a:avLst/>
           </a:prstGeom>
         </p:spPr>
       </p:pic>
+      <p:sp>
+        <p:nvSpPr>
+          <p:cNvPr id="7" name="Rectangle 6">
+            <a:extLst>
+              <a:ext uri="{FF2B5EF4-FFF2-40B4-BE49-F238E27FC236}">
+                <a16:creationId xmlns:a16="http://schemas.microsoft.com/office/drawing/2014/main" id="{430C64F8-8D0D-41EE-A7DA-CF96516B9C6E}"/>
+              </a:ext>
+            </a:extLst>
+          </p:cNvPr>
+          <p:cNvSpPr/>
+          <p:nvPr/>
+        </p:nvSpPr>
+        <p:spPr>
+          <a:xfrm>
+            <a:off x="4505508" y="1117600"/>
+            <a:ext cx="2190135" cy="45719"/>
+          </a:xfrm>
+          <a:prstGeom prst="rect">
+            <a:avLst/>
+          </a:prstGeom>
+          <a:solidFill>
+            <a:srgbClr val="FFFFFF"/>
+          </a:solidFill>
+          <a:ln>
+            <a:noFill/>
+          </a:ln>
+        </p:spPr>
+        <p:style>
+          <a:lnRef idx="2">
+            <a:schemeClr val="accent1">
+              <a:shade val="50000"/>
+            </a:schemeClr>
+          </a:lnRef>
+          <a:fillRef idx="1">
+            <a:schemeClr val="accent1"/>
+          </a:fillRef>
+          <a:effectRef idx="0">
+            <a:schemeClr val="accent1"/>
+          </a:effectRef>
+          <a:fontRef idx="minor">
+            <a:schemeClr val="lt1"/>
+          </a:fontRef>
+        </p:style>
+        <p:txBody>
+          <a:bodyPr rtlCol="0" anchor="ctr"/>
+          <a:lstStyle/>
+          <a:p>
+            <a:pPr algn="ctr"/>
+            <a:endParaRPr lang="ca-ES"/>
+          </a:p>
+        </p:txBody>
+      </p:sp>
+      <p:sp>
+        <p:nvSpPr>
+          <p:cNvPr id="8" name="QuadreDeText 7">
+            <a:extLst>
+              <a:ext uri="{FF2B5EF4-FFF2-40B4-BE49-F238E27FC236}">
+                <a16:creationId xmlns:a16="http://schemas.microsoft.com/office/drawing/2014/main" id="{500039A5-4803-4FB8-92CD-A9E2D1B2C614}"/>
+              </a:ext>
+            </a:extLst>
+          </p:cNvPr>
+          <p:cNvSpPr txBox="1"/>
+          <p:nvPr/>
+        </p:nvSpPr>
+        <p:spPr>
+          <a:xfrm>
+            <a:off x="5985615" y="1849497"/>
+            <a:ext cx="2777218" cy="369332"/>
+          </a:xfrm>
+          <a:prstGeom prst="rect">
+            <a:avLst/>
+          </a:prstGeom>
+          <a:noFill/>
+        </p:spPr>
+        <p:txBody>
+          <a:bodyPr wrap="square" rtlCol="0">
+            <a:spAutoFit/>
+          </a:bodyPr>
+          <a:lstStyle/>
+          <a:p>
+            <a:r>
+              <a:rPr lang="ca-ES" dirty="0"/>
+              <a:t>Freqüència de tall a 1 Hz</a:t>
+            </a:r>
+          </a:p>
+        </p:txBody>
+      </p:sp>
     </p:spTree>
     <p:extLst>
       <p:ext uri="{BB962C8B-B14F-4D97-AF65-F5344CB8AC3E}">
@@ -17444,19 +17725,106 @@
         </p:nvPicPr>
         <p:blipFill rotWithShape="1">
           <a:blip r:embed="rId3"/>
-          <a:srcRect l="-1" t="1566" r="-326" b="-233"/>
+          <a:srcRect t="1306" b="1767"/>
           <a:stretch/>
         </p:blipFill>
         <p:spPr>
           <a:xfrm>
-            <a:off x="74981" y="1148958"/>
-            <a:ext cx="10976610" cy="5635023"/>
+            <a:off x="74981" y="1117600"/>
+            <a:ext cx="10916450" cy="5672705"/>
           </a:xfrm>
           <a:prstGeom prst="rect">
             <a:avLst/>
           </a:prstGeom>
         </p:spPr>
       </p:pic>
+      <p:sp>
+        <p:nvSpPr>
+          <p:cNvPr id="6" name="QuadreDeText 5">
+            <a:extLst>
+              <a:ext uri="{FF2B5EF4-FFF2-40B4-BE49-F238E27FC236}">
+                <a16:creationId xmlns:a16="http://schemas.microsoft.com/office/drawing/2014/main" id="{568FA015-B1D9-430F-B2DB-2DFF69CC0A17}"/>
+              </a:ext>
+            </a:extLst>
+          </p:cNvPr>
+          <p:cNvSpPr txBox="1"/>
+          <p:nvPr/>
+        </p:nvSpPr>
+        <p:spPr>
+          <a:xfrm>
+            <a:off x="5985615" y="1849497"/>
+            <a:ext cx="2777218" cy="369332"/>
+          </a:xfrm>
+          <a:prstGeom prst="rect">
+            <a:avLst/>
+          </a:prstGeom>
+          <a:noFill/>
+        </p:spPr>
+        <p:txBody>
+          <a:bodyPr wrap="square" rtlCol="0">
+            <a:spAutoFit/>
+          </a:bodyPr>
+          <a:lstStyle/>
+          <a:p>
+            <a:r>
+              <a:rPr lang="ca-ES" dirty="0"/>
+              <a:t>Freqüència de tall a 10,4 Hz</a:t>
+            </a:r>
+          </a:p>
+        </p:txBody>
+      </p:sp>
+      <p:sp>
+        <p:nvSpPr>
+          <p:cNvPr id="7" name="Rectangle 6">
+            <a:extLst>
+              <a:ext uri="{FF2B5EF4-FFF2-40B4-BE49-F238E27FC236}">
+                <a16:creationId xmlns:a16="http://schemas.microsoft.com/office/drawing/2014/main" id="{7D3A6BB5-977B-4BF8-A56A-014C78A6043F}"/>
+              </a:ext>
+            </a:extLst>
+          </p:cNvPr>
+          <p:cNvSpPr/>
+          <p:nvPr/>
+        </p:nvSpPr>
+        <p:spPr>
+          <a:xfrm>
+            <a:off x="4454013" y="1117600"/>
+            <a:ext cx="2190135" cy="51324"/>
+          </a:xfrm>
+          <a:prstGeom prst="rect">
+            <a:avLst/>
+          </a:prstGeom>
+          <a:solidFill>
+            <a:srgbClr val="FFFFFF"/>
+          </a:solidFill>
+          <a:ln>
+            <a:noFill/>
+          </a:ln>
+        </p:spPr>
+        <p:style>
+          <a:lnRef idx="2">
+            <a:schemeClr val="accent1">
+              <a:shade val="50000"/>
+            </a:schemeClr>
+          </a:lnRef>
+          <a:fillRef idx="1">
+            <a:schemeClr val="accent1"/>
+          </a:fillRef>
+          <a:effectRef idx="0">
+            <a:schemeClr val="accent1"/>
+          </a:effectRef>
+          <a:fontRef idx="minor">
+            <a:schemeClr val="lt1"/>
+          </a:fontRef>
+        </p:style>
+        <p:txBody>
+          <a:bodyPr rtlCol="0" anchor="ctr"/>
+          <a:lstStyle/>
+          <a:p>
+            <a:pPr algn="ctr"/>
+            <a:endParaRPr lang="ca-ES"/>
+          </a:p>
+        </p:txBody>
+      </p:sp>
     </p:spTree>
     <p:extLst>
       <p:ext uri="{BB962C8B-B14F-4D97-AF65-F5344CB8AC3E}">
@@ -17489,105 +17857,49 @@
       </p:grpSpPr>
       <p:sp>
         <p:nvSpPr>
-          <p:cNvPr id="2" name="Contenidor de contingut 1">
-            <a:extLst>
-              <a:ext uri="{FF2B5EF4-FFF2-40B4-BE49-F238E27FC236}">
-                <a16:creationId xmlns:a16="http://schemas.microsoft.com/office/drawing/2014/main" id="{90BA015A-20AF-440F-8413-D939C69EAB2F}"/>
-              </a:ext>
-            </a:extLst>
-          </p:cNvPr>
-          <p:cNvSpPr>
-            <a:spLocks noGrp="1"/>
-          </p:cNvSpPr>
-          <p:nvPr>
-            <p:ph sz="half" idx="1"/>
-          </p:nvPr>
-        </p:nvSpPr>
-        <p:spPr>
-          <a:xfrm>
-            <a:off x="3453817" y="2007458"/>
-            <a:ext cx="3735548" cy="2638434"/>
-          </a:xfrm>
-        </p:spPr>
-        <p:txBody>
-          <a:bodyPr/>
-          <a:lstStyle/>
-          <a:p>
-            <a:pPr marL="0" indent="0" algn="just">
-              <a:buNone/>
-            </a:pPr>
-            <a:r>
-              <a:rPr lang="ca-ES" dirty="0"/>
-              <a:t>No activar el filtre si no és necessari</a:t>
-            </a:r>
-          </a:p>
-          <a:p>
-            <a:pPr marL="0" indent="0" algn="just">
-              <a:buNone/>
-            </a:pPr>
-            <a:r>
-              <a:rPr lang="ca-ES" dirty="0"/>
-              <a:t>Per evitar zona morta fer servir PID en velocitat</a:t>
-            </a:r>
-          </a:p>
-          <a:p>
-            <a:pPr marL="0" indent="0" algn="just">
-              <a:buNone/>
-            </a:pPr>
-            <a:r>
-              <a:rPr lang="ca-ES" dirty="0"/>
-              <a:t>Perquè filtre abans de </a:t>
-            </a:r>
-            <a:r>
-              <a:rPr lang="ca-ES" dirty="0" err="1"/>
+          <p:cNvPr id="2" name="Título 1">
+            <a:extLst>
+              <a:ext uri="{FF2B5EF4-FFF2-40B4-BE49-F238E27FC236}">
+                <a16:creationId xmlns:a16="http://schemas.microsoft.com/office/drawing/2014/main" id="{AEA5083B-CC27-4F1C-AD03-E3DBEC1C9E78}"/>
+              </a:ext>
+            </a:extLst>
+          </p:cNvPr>
+          <p:cNvSpPr>
+            <a:spLocks noGrp="1"/>
+          </p:cNvSpPr>
+          <p:nvPr>
+            <p:ph type="title"/>
+          </p:nvPr>
+        </p:nvSpPr>
+        <p:spPr>
+          <a:xfrm>
+            <a:off x="170779" y="67695"/>
+            <a:ext cx="5925221" cy="1101229"/>
+          </a:xfrm>
+        </p:spPr>
+        <p:txBody>
+          <a:bodyPr rtlCol="0"/>
+          <a:lstStyle/>
+          <a:p>
+            <a:pPr rtl="0"/>
+            <a:r>
+              <a:rPr lang="ca-ES" sz="2800" dirty="0"/>
+              <a:t>Bode Teòric del derivador per a múltiples </a:t>
+            </a:r>
+            <a:r>
+              <a:rPr lang="ca-ES" sz="2800" dirty="0" err="1"/>
               <a:t>Kd</a:t>
             </a:r>
-            <a:r>
-              <a:rPr lang="ca-ES" dirty="0"/>
-              <a:t> i no després?</a:t>
-            </a:r>
-          </a:p>
-        </p:txBody>
-      </p:sp>
-      <p:sp>
-        <p:nvSpPr>
-          <p:cNvPr id="5" name="Títol 4">
-            <a:extLst>
-              <a:ext uri="{FF2B5EF4-FFF2-40B4-BE49-F238E27FC236}">
-                <a16:creationId xmlns:a16="http://schemas.microsoft.com/office/drawing/2014/main" id="{A0961E97-8F98-4B4D-96F2-5C4364E6ACD3}"/>
-              </a:ext>
-            </a:extLst>
-          </p:cNvPr>
-          <p:cNvSpPr>
-            <a:spLocks noGrp="1"/>
-          </p:cNvSpPr>
-          <p:nvPr>
-            <p:ph type="title"/>
-          </p:nvPr>
-        </p:nvSpPr>
-        <p:spPr>
-          <a:xfrm>
-            <a:off x="247442" y="423611"/>
-            <a:ext cx="9131100" cy="432000"/>
-          </a:xfrm>
-        </p:spPr>
-        <p:txBody>
-          <a:bodyPr/>
-          <a:lstStyle/>
-          <a:p>
-            <a:r>
-              <a:rPr lang="ca-ES" dirty="0"/>
-              <a:t>Punts pendents i propostes</a:t>
-            </a:r>
-          </a:p>
-        </p:txBody>
-      </p:sp>
-      <p:sp>
-        <p:nvSpPr>
-          <p:cNvPr id="7" name="Rectángulo 9">
-            <a:extLst>
-              <a:ext uri="{FF2B5EF4-FFF2-40B4-BE49-F238E27FC236}">
-                <a16:creationId xmlns:a16="http://schemas.microsoft.com/office/drawing/2014/main" id="{CCB320B0-EB9E-4107-9824-08DC54BF4B4A}"/>
+            <a:endParaRPr lang="es-ES" sz="2800" dirty="0"/>
+          </a:p>
+        </p:txBody>
+      </p:sp>
+      <p:sp>
+        <p:nvSpPr>
+          <p:cNvPr id="10" name="Rectángulo 9">
+            <a:extLst>
+              <a:ext uri="{FF2B5EF4-FFF2-40B4-BE49-F238E27FC236}">
+                <a16:creationId xmlns:a16="http://schemas.microsoft.com/office/drawing/2014/main" id="{2EF7F631-717C-4283-B2CA-33A0C8D9E561}"/>
               </a:ext>
             </a:extLst>
           </p:cNvPr>
@@ -17634,6 +17946,264 @@
           </a:p>
         </p:txBody>
       </p:sp>
+      <p:pic>
+        <p:nvPicPr>
+          <p:cNvPr id="5" name="Imatge 4">
+            <a:extLst>
+              <a:ext uri="{FF2B5EF4-FFF2-40B4-BE49-F238E27FC236}">
+                <a16:creationId xmlns:a16="http://schemas.microsoft.com/office/drawing/2014/main" id="{20C0576B-D581-475A-9045-07D86A3514EA}"/>
+              </a:ext>
+            </a:extLst>
+          </p:cNvPr>
+          <p:cNvPicPr>
+            <a:picLocks noChangeAspect="1"/>
+          </p:cNvPicPr>
+          <p:nvPr/>
+        </p:nvPicPr>
+        <p:blipFill rotWithShape="1">
+          <a:blip r:embed="rId3"/>
+          <a:srcRect t="1193" b="1839"/>
+          <a:stretch/>
+        </p:blipFill>
+        <p:spPr>
+          <a:xfrm>
+            <a:off x="69869" y="1117600"/>
+            <a:ext cx="10844951" cy="5673240"/>
+          </a:xfrm>
+          <a:prstGeom prst="rect">
+            <a:avLst/>
+          </a:prstGeom>
+        </p:spPr>
+      </p:pic>
+      <p:sp>
+        <p:nvSpPr>
+          <p:cNvPr id="7" name="Rectangle 6">
+            <a:extLst>
+              <a:ext uri="{FF2B5EF4-FFF2-40B4-BE49-F238E27FC236}">
+                <a16:creationId xmlns:a16="http://schemas.microsoft.com/office/drawing/2014/main" id="{7D3A6BB5-977B-4BF8-A56A-014C78A6043F}"/>
+              </a:ext>
+            </a:extLst>
+          </p:cNvPr>
+          <p:cNvSpPr/>
+          <p:nvPr/>
+        </p:nvSpPr>
+        <p:spPr>
+          <a:xfrm>
+            <a:off x="4454013" y="1117600"/>
+            <a:ext cx="2190135" cy="51324"/>
+          </a:xfrm>
+          <a:prstGeom prst="rect">
+            <a:avLst/>
+          </a:prstGeom>
+          <a:solidFill>
+            <a:srgbClr val="FFFFFF"/>
+          </a:solidFill>
+          <a:ln>
+            <a:noFill/>
+          </a:ln>
+        </p:spPr>
+        <p:style>
+          <a:lnRef idx="2">
+            <a:schemeClr val="accent1">
+              <a:shade val="50000"/>
+            </a:schemeClr>
+          </a:lnRef>
+          <a:fillRef idx="1">
+            <a:schemeClr val="accent1"/>
+          </a:fillRef>
+          <a:effectRef idx="0">
+            <a:schemeClr val="accent1"/>
+          </a:effectRef>
+          <a:fontRef idx="minor">
+            <a:schemeClr val="lt1"/>
+          </a:fontRef>
+        </p:style>
+        <p:txBody>
+          <a:bodyPr rtlCol="0" anchor="ctr"/>
+          <a:lstStyle/>
+          <a:p>
+            <a:pPr algn="ctr"/>
+            <a:endParaRPr lang="ca-ES"/>
+          </a:p>
+        </p:txBody>
+      </p:sp>
+    </p:spTree>
+    <p:extLst>
+      <p:ext uri="{BB962C8B-B14F-4D97-AF65-F5344CB8AC3E}">
+        <p14:creationId xmlns:p14="http://schemas.microsoft.com/office/powerpoint/2010/main" val="1318521528"/>
+      </p:ext>
+    </p:extLst>
+  </p:cSld>
+  <p:clrMapOvr>
+    <a:masterClrMapping/>
+  </p:clrMapOvr>
+</p:sld>
+</file>
+
+<file path=ppt/slides/slide36.xml><?xml version="1.0" encoding="utf-8"?>
+<p:sld xmlns:a="http://schemas.openxmlformats.org/drawingml/2006/main" xmlns:r="http://schemas.openxmlformats.org/officeDocument/2006/relationships" xmlns:p="http://schemas.openxmlformats.org/presentationml/2006/main">
+  <p:cSld>
+    <p:spTree>
+      <p:nvGrpSpPr>
+        <p:cNvPr id="1" name=""/>
+        <p:cNvGrpSpPr/>
+        <p:nvPr/>
+      </p:nvGrpSpPr>
+      <p:grpSpPr>
+        <a:xfrm>
+          <a:off x="0" y="0"/>
+          <a:ext cx="0" cy="0"/>
+          <a:chOff x="0" y="0"/>
+          <a:chExt cx="0" cy="0"/>
+        </a:xfrm>
+      </p:grpSpPr>
+      <p:sp>
+        <p:nvSpPr>
+          <p:cNvPr id="2" name="Contenidor de contingut 1">
+            <a:extLst>
+              <a:ext uri="{FF2B5EF4-FFF2-40B4-BE49-F238E27FC236}">
+                <a16:creationId xmlns:a16="http://schemas.microsoft.com/office/drawing/2014/main" id="{90BA015A-20AF-440F-8413-D939C69EAB2F}"/>
+              </a:ext>
+            </a:extLst>
+          </p:cNvPr>
+          <p:cNvSpPr>
+            <a:spLocks noGrp="1"/>
+          </p:cNvSpPr>
+          <p:nvPr>
+            <p:ph sz="half" idx="1"/>
+          </p:nvPr>
+        </p:nvSpPr>
+        <p:spPr>
+          <a:xfrm>
+            <a:off x="3453817" y="2007458"/>
+            <a:ext cx="3735548" cy="2638434"/>
+          </a:xfrm>
+        </p:spPr>
+        <p:txBody>
+          <a:bodyPr/>
+          <a:lstStyle/>
+          <a:p>
+            <a:pPr marL="0" indent="0" algn="just">
+              <a:buNone/>
+            </a:pPr>
+            <a:r>
+              <a:rPr lang="ca-ES" dirty="0"/>
+              <a:t>No activar el filtre si no és necessari</a:t>
+            </a:r>
+          </a:p>
+          <a:p>
+            <a:pPr marL="0" indent="0" algn="just">
+              <a:buNone/>
+            </a:pPr>
+            <a:r>
+              <a:rPr lang="ca-ES" dirty="0"/>
+              <a:t>Per evitar zona morta fer servir PID en velocitat</a:t>
+            </a:r>
+          </a:p>
+          <a:p>
+            <a:pPr marL="0" indent="0" algn="just">
+              <a:buNone/>
+            </a:pPr>
+            <a:r>
+              <a:rPr lang="ca-ES" dirty="0"/>
+              <a:t>Perquè filtre abans de </a:t>
+            </a:r>
+            <a:r>
+              <a:rPr lang="ca-ES" dirty="0" err="1"/>
+              <a:t>Kd</a:t>
+            </a:r>
+            <a:r>
+              <a:rPr lang="ca-ES" dirty="0"/>
+              <a:t> i no després?</a:t>
+            </a:r>
+          </a:p>
+        </p:txBody>
+      </p:sp>
+      <p:sp>
+        <p:nvSpPr>
+          <p:cNvPr id="5" name="Títol 4">
+            <a:extLst>
+              <a:ext uri="{FF2B5EF4-FFF2-40B4-BE49-F238E27FC236}">
+                <a16:creationId xmlns:a16="http://schemas.microsoft.com/office/drawing/2014/main" id="{A0961E97-8F98-4B4D-96F2-5C4364E6ACD3}"/>
+              </a:ext>
+            </a:extLst>
+          </p:cNvPr>
+          <p:cNvSpPr>
+            <a:spLocks noGrp="1"/>
+          </p:cNvSpPr>
+          <p:nvPr>
+            <p:ph type="title"/>
+          </p:nvPr>
+        </p:nvSpPr>
+        <p:spPr>
+          <a:xfrm>
+            <a:off x="247442" y="423611"/>
+            <a:ext cx="9131100" cy="432000"/>
+          </a:xfrm>
+        </p:spPr>
+        <p:txBody>
+          <a:bodyPr/>
+          <a:lstStyle/>
+          <a:p>
+            <a:r>
+              <a:rPr lang="ca-ES" dirty="0"/>
+              <a:t>Punts pendents i propostes</a:t>
+            </a:r>
+          </a:p>
+        </p:txBody>
+      </p:sp>
+      <p:sp>
+        <p:nvSpPr>
+          <p:cNvPr id="7" name="Rectángulo 9">
+            <a:extLst>
+              <a:ext uri="{FF2B5EF4-FFF2-40B4-BE49-F238E27FC236}">
+                <a16:creationId xmlns:a16="http://schemas.microsoft.com/office/drawing/2014/main" id="{CCB320B0-EB9E-4107-9824-08DC54BF4B4A}"/>
+              </a:ext>
+            </a:extLst>
+          </p:cNvPr>
+          <p:cNvSpPr/>
+          <p:nvPr/>
+        </p:nvSpPr>
+        <p:spPr>
+          <a:xfrm>
+            <a:off x="10126980" y="6263640"/>
+            <a:ext cx="2065020" cy="594360"/>
+          </a:xfrm>
+          <a:prstGeom prst="rect">
+            <a:avLst/>
+          </a:prstGeom>
+          <a:solidFill>
+            <a:schemeClr val="bg1"/>
+          </a:solidFill>
+          <a:ln>
+            <a:noFill/>
+          </a:ln>
+        </p:spPr>
+        <p:style>
+          <a:lnRef idx="2">
+            <a:schemeClr val="accent1">
+              <a:shade val="50000"/>
+            </a:schemeClr>
+          </a:lnRef>
+          <a:fillRef idx="1">
+            <a:schemeClr val="accent1"/>
+          </a:fillRef>
+          <a:effectRef idx="0">
+            <a:schemeClr val="accent1"/>
+          </a:effectRef>
+          <a:fontRef idx="minor">
+            <a:schemeClr val="lt1"/>
+          </a:fontRef>
+        </p:style>
+        <p:txBody>
+          <a:bodyPr rtlCol="0" anchor="ctr"/>
+          <a:lstStyle/>
+          <a:p>
+            <a:pPr algn="ctr"/>
+            <a:endParaRPr lang="es-ES" dirty="0"/>
+          </a:p>
+        </p:txBody>
+      </p:sp>
     </p:spTree>
     <p:extLst>
       <p:ext uri="{BB962C8B-B14F-4D97-AF65-F5344CB8AC3E}">
@@ -17647,7 +18217,7 @@
 </p:sld>
 </file>
 
-<file path=ppt/slides/slide36.xml><?xml version="1.0" encoding="utf-8"?>
+<file path=ppt/slides/slide37.xml><?xml version="1.0" encoding="utf-8"?>
 <p:sld xmlns:a="http://schemas.openxmlformats.org/drawingml/2006/main" xmlns:r="http://schemas.openxmlformats.org/officeDocument/2006/relationships" xmlns:p="http://schemas.openxmlformats.org/presentationml/2006/main">
   <p:cSld>
     <p:spTree>

</xml_diff>